<commit_message>
Updated with a pic of my intent for the rest of the powerpoint.
</commit_message>
<xml_diff>
--- a/vishal-sensors-lecture/Sensor Lecture.pptx
+++ b/vishal-sensors-lecture/Sensor Lecture.pptx
@@ -3834,25 +3834,35 @@
           </a:p>
         </p:txBody>
       </p:sp>
-      <p:sp>
-        <p:nvSpPr>
-          <p:cNvPr id="3" name="Content Placeholder 2"/>
-          <p:cNvSpPr>
-            <a:spLocks noGrp="1"/>
-          </p:cNvSpPr>
+      <p:pic>
+        <p:nvPicPr>
+          <p:cNvPr id="5" name="Content Placeholder 4"/>
+          <p:cNvPicPr>
+            <a:picLocks noGrp="1" noChangeAspect="1"/>
+          </p:cNvPicPr>
           <p:nvPr>
             <p:ph idx="1"/>
           </p:nvPr>
-        </p:nvSpPr>
-        <p:spPr/>
-        <p:txBody>
-          <a:bodyPr/>
-          <a:lstStyle/>
-          <a:p>
-            <a:endParaRPr lang="en-US"/>
-          </a:p>
-        </p:txBody>
-      </p:sp>
+        </p:nvPicPr>
+        <p:blipFill>
+          <a:blip r:embed="rId2">
+            <a:extLst>
+              <a:ext uri="{28A0092B-C50C-407E-A947-70E740481C1C}">
+                <a14:useLocalDpi xmlns:a14="http://schemas.microsoft.com/office/drawing/2010/main" val="0"/>
+              </a:ext>
+            </a:extLst>
+          </a:blip>
+          <a:stretch>
+            <a:fillRect/>
+          </a:stretch>
+        </p:blipFill>
+        <p:spPr>
+          <a:xfrm rot="5400000">
+            <a:off x="2508617" y="896847"/>
+            <a:ext cx="7174766" cy="5381073"/>
+          </a:xfrm>
+        </p:spPr>
+      </p:pic>
     </p:spTree>
     <p:extLst>
       <p:ext uri="{BB962C8B-B14F-4D97-AF65-F5344CB8AC3E}">

</xml_diff>

<commit_message>
Added final content. Need to format and animate and see if there are other changes to be made.
</commit_message>
<xml_diff>
--- a/vishal-sensors-lecture/Sensor Lecture.pptx
+++ b/vishal-sensors-lecture/Sensor Lecture.pptx
@@ -4,6 +4,9 @@
   <p:sldMasterIdLst>
     <p:sldMasterId id="2147483648" r:id="rId1"/>
   </p:sldMasterIdLst>
+  <p:notesMasterIdLst>
+    <p:notesMasterId r:id="rId20"/>
+  </p:notesMasterIdLst>
   <p:sldIdLst>
     <p:sldId id="256" r:id="rId2"/>
     <p:sldId id="257" r:id="rId3"/>
@@ -20,7 +23,9 @@
     <p:sldId id="268" r:id="rId14"/>
     <p:sldId id="269" r:id="rId15"/>
     <p:sldId id="270" r:id="rId16"/>
-    <p:sldId id="271" r:id="rId17"/>
+    <p:sldId id="272" r:id="rId17"/>
+    <p:sldId id="273" r:id="rId18"/>
+    <p:sldId id="271" r:id="rId19"/>
   </p:sldIdLst>
   <p:sldSz cx="12192000" cy="6858000"/>
   <p:notesSz cx="6858000" cy="9144000"/>
@@ -131,6 +136,529 @@
 <p1510:revInfo xmlns:a="http://schemas.openxmlformats.org/drawingml/2006/main" xmlns:r="http://schemas.openxmlformats.org/officeDocument/2006/relationships" xmlns:p1510="http://schemas.microsoft.com/office/powerpoint/2015/10/main"/>
 </file>
 
+<file path=ppt/notesMasters/notesMaster1.xml><?xml version="1.0" encoding="utf-8"?>
+<p:notesMaster xmlns:a="http://schemas.openxmlformats.org/drawingml/2006/main" xmlns:r="http://schemas.openxmlformats.org/officeDocument/2006/relationships" xmlns:p="http://schemas.openxmlformats.org/presentationml/2006/main">
+  <p:cSld>
+    <p:bg>
+      <p:bgRef idx="1001">
+        <a:schemeClr val="bg1"/>
+      </p:bgRef>
+    </p:bg>
+    <p:spTree>
+      <p:nvGrpSpPr>
+        <p:cNvPr id="1" name=""/>
+        <p:cNvGrpSpPr/>
+        <p:nvPr/>
+      </p:nvGrpSpPr>
+      <p:grpSpPr>
+        <a:xfrm>
+          <a:off x="0" y="0"/>
+          <a:ext cx="0" cy="0"/>
+          <a:chOff x="0" y="0"/>
+          <a:chExt cx="0" cy="0"/>
+        </a:xfrm>
+      </p:grpSpPr>
+      <p:sp>
+        <p:nvSpPr>
+          <p:cNvPr id="2" name="Header Placeholder 1"/>
+          <p:cNvSpPr>
+            <a:spLocks noGrp="1"/>
+          </p:cNvSpPr>
+          <p:nvPr>
+            <p:ph type="hdr" sz="quarter"/>
+          </p:nvPr>
+        </p:nvSpPr>
+        <p:spPr>
+          <a:xfrm>
+            <a:off x="0" y="0"/>
+            <a:ext cx="2971800" cy="458788"/>
+          </a:xfrm>
+          <a:prstGeom prst="rect">
+            <a:avLst/>
+          </a:prstGeom>
+        </p:spPr>
+        <p:txBody>
+          <a:bodyPr vert="horz" lIns="91440" tIns="45720" rIns="91440" bIns="45720" rtlCol="0"/>
+          <a:lstStyle>
+            <a:lvl1pPr algn="l">
+              <a:defRPr sz="1200"/>
+            </a:lvl1pPr>
+          </a:lstStyle>
+          <a:p>
+            <a:endParaRPr lang="en-US"/>
+          </a:p>
+        </p:txBody>
+      </p:sp>
+      <p:sp>
+        <p:nvSpPr>
+          <p:cNvPr id="3" name="Date Placeholder 2"/>
+          <p:cNvSpPr>
+            <a:spLocks noGrp="1"/>
+          </p:cNvSpPr>
+          <p:nvPr>
+            <p:ph type="dt" idx="1"/>
+          </p:nvPr>
+        </p:nvSpPr>
+        <p:spPr>
+          <a:xfrm>
+            <a:off x="3884613" y="0"/>
+            <a:ext cx="2971800" cy="458788"/>
+          </a:xfrm>
+          <a:prstGeom prst="rect">
+            <a:avLst/>
+          </a:prstGeom>
+        </p:spPr>
+        <p:txBody>
+          <a:bodyPr vert="horz" lIns="91440" tIns="45720" rIns="91440" bIns="45720" rtlCol="0"/>
+          <a:lstStyle>
+            <a:lvl1pPr algn="r">
+              <a:defRPr sz="1200"/>
+            </a:lvl1pPr>
+          </a:lstStyle>
+          <a:p>
+            <a:fld id="{78CA9460-7BF7-4E53-9348-A2D93A4A4960}" type="datetimeFigureOut">
+              <a:rPr lang="en-US" smtClean="0"/>
+              <a:t>7/1/2017</a:t>
+            </a:fld>
+            <a:endParaRPr lang="en-US"/>
+          </a:p>
+        </p:txBody>
+      </p:sp>
+      <p:sp>
+        <p:nvSpPr>
+          <p:cNvPr id="4" name="Slide Image Placeholder 3"/>
+          <p:cNvSpPr>
+            <a:spLocks noGrp="1" noRot="1" noChangeAspect="1"/>
+          </p:cNvSpPr>
+          <p:nvPr>
+            <p:ph type="sldImg" idx="2"/>
+          </p:nvPr>
+        </p:nvSpPr>
+        <p:spPr>
+          <a:xfrm>
+            <a:off x="685800" y="1143000"/>
+            <a:ext cx="5486400" cy="3086100"/>
+          </a:xfrm>
+          <a:prstGeom prst="rect">
+            <a:avLst/>
+          </a:prstGeom>
+          <a:noFill/>
+          <a:ln w="12700">
+            <a:solidFill>
+              <a:prstClr val="black"/>
+            </a:solidFill>
+          </a:ln>
+        </p:spPr>
+        <p:txBody>
+          <a:bodyPr vert="horz" lIns="91440" tIns="45720" rIns="91440" bIns="45720" rtlCol="0" anchor="ctr"/>
+          <a:lstStyle/>
+          <a:p>
+            <a:endParaRPr lang="en-US"/>
+          </a:p>
+        </p:txBody>
+      </p:sp>
+      <p:sp>
+        <p:nvSpPr>
+          <p:cNvPr id="5" name="Notes Placeholder 4"/>
+          <p:cNvSpPr>
+            <a:spLocks noGrp="1"/>
+          </p:cNvSpPr>
+          <p:nvPr>
+            <p:ph type="body" sz="quarter" idx="3"/>
+          </p:nvPr>
+        </p:nvSpPr>
+        <p:spPr>
+          <a:xfrm>
+            <a:off x="685800" y="4400550"/>
+            <a:ext cx="5486400" cy="3600450"/>
+          </a:xfrm>
+          <a:prstGeom prst="rect">
+            <a:avLst/>
+          </a:prstGeom>
+        </p:spPr>
+        <p:txBody>
+          <a:bodyPr vert="horz" lIns="91440" tIns="45720" rIns="91440" bIns="45720" rtlCol="0"/>
+          <a:lstStyle/>
+          <a:p>
+            <a:pPr lvl="0"/>
+            <a:r>
+              <a:rPr lang="en-US"/>
+              <a:t>Edit Master text styles</a:t>
+            </a:r>
+          </a:p>
+          <a:p>
+            <a:pPr lvl="1"/>
+            <a:r>
+              <a:rPr lang="en-US"/>
+              <a:t>Second level</a:t>
+            </a:r>
+          </a:p>
+          <a:p>
+            <a:pPr lvl="2"/>
+            <a:r>
+              <a:rPr lang="en-US"/>
+              <a:t>Third level</a:t>
+            </a:r>
+          </a:p>
+          <a:p>
+            <a:pPr lvl="3"/>
+            <a:r>
+              <a:rPr lang="en-US"/>
+              <a:t>Fourth level</a:t>
+            </a:r>
+          </a:p>
+          <a:p>
+            <a:pPr lvl="4"/>
+            <a:r>
+              <a:rPr lang="en-US"/>
+              <a:t>Fifth level</a:t>
+            </a:r>
+          </a:p>
+        </p:txBody>
+      </p:sp>
+      <p:sp>
+        <p:nvSpPr>
+          <p:cNvPr id="6" name="Footer Placeholder 5"/>
+          <p:cNvSpPr>
+            <a:spLocks noGrp="1"/>
+          </p:cNvSpPr>
+          <p:nvPr>
+            <p:ph type="ftr" sz="quarter" idx="4"/>
+          </p:nvPr>
+        </p:nvSpPr>
+        <p:spPr>
+          <a:xfrm>
+            <a:off x="0" y="8685213"/>
+            <a:ext cx="2971800" cy="458787"/>
+          </a:xfrm>
+          <a:prstGeom prst="rect">
+            <a:avLst/>
+          </a:prstGeom>
+        </p:spPr>
+        <p:txBody>
+          <a:bodyPr vert="horz" lIns="91440" tIns="45720" rIns="91440" bIns="45720" rtlCol="0" anchor="b"/>
+          <a:lstStyle>
+            <a:lvl1pPr algn="l">
+              <a:defRPr sz="1200"/>
+            </a:lvl1pPr>
+          </a:lstStyle>
+          <a:p>
+            <a:endParaRPr lang="en-US"/>
+          </a:p>
+        </p:txBody>
+      </p:sp>
+      <p:sp>
+        <p:nvSpPr>
+          <p:cNvPr id="7" name="Slide Number Placeholder 6"/>
+          <p:cNvSpPr>
+            <a:spLocks noGrp="1"/>
+          </p:cNvSpPr>
+          <p:nvPr>
+            <p:ph type="sldNum" sz="quarter" idx="5"/>
+          </p:nvPr>
+        </p:nvSpPr>
+        <p:spPr>
+          <a:xfrm>
+            <a:off x="3884613" y="8685213"/>
+            <a:ext cx="2971800" cy="458787"/>
+          </a:xfrm>
+          <a:prstGeom prst="rect">
+            <a:avLst/>
+          </a:prstGeom>
+        </p:spPr>
+        <p:txBody>
+          <a:bodyPr vert="horz" lIns="91440" tIns="45720" rIns="91440" bIns="45720" rtlCol="0" anchor="b"/>
+          <a:lstStyle>
+            <a:lvl1pPr algn="r">
+              <a:defRPr sz="1200"/>
+            </a:lvl1pPr>
+          </a:lstStyle>
+          <a:p>
+            <a:fld id="{1B057D52-65A4-4642-8DCB-0D0611C8D40C}" type="slidenum">
+              <a:rPr lang="en-US" smtClean="0"/>
+              <a:t>‹#›</a:t>
+            </a:fld>
+            <a:endParaRPr lang="en-US"/>
+          </a:p>
+        </p:txBody>
+      </p:sp>
+    </p:spTree>
+    <p:extLst>
+      <p:ext uri="{BB962C8B-B14F-4D97-AF65-F5344CB8AC3E}">
+        <p14:creationId xmlns:p14="http://schemas.microsoft.com/office/powerpoint/2010/main" val="2119983199"/>
+      </p:ext>
+    </p:extLst>
+  </p:cSld>
+  <p:clrMap bg1="lt1" tx1="dk1" bg2="lt2" tx2="dk2" accent1="accent1" accent2="accent2" accent3="accent3" accent4="accent4" accent5="accent5" accent6="accent6" hlink="hlink" folHlink="folHlink"/>
+  <p:notesStyle>
+    <a:lvl1pPr marL="0" algn="l" defTabSz="914400" rtl="0" eaLnBrk="1" latinLnBrk="0" hangingPunct="1">
+      <a:defRPr sz="1200" kern="1200">
+        <a:solidFill>
+          <a:schemeClr val="tx1"/>
+        </a:solidFill>
+        <a:latin typeface="+mn-lt"/>
+        <a:ea typeface="+mn-ea"/>
+        <a:cs typeface="+mn-cs"/>
+      </a:defRPr>
+    </a:lvl1pPr>
+    <a:lvl2pPr marL="457200" algn="l" defTabSz="914400" rtl="0" eaLnBrk="1" latinLnBrk="0" hangingPunct="1">
+      <a:defRPr sz="1200" kern="1200">
+        <a:solidFill>
+          <a:schemeClr val="tx1"/>
+        </a:solidFill>
+        <a:latin typeface="+mn-lt"/>
+        <a:ea typeface="+mn-ea"/>
+        <a:cs typeface="+mn-cs"/>
+      </a:defRPr>
+    </a:lvl2pPr>
+    <a:lvl3pPr marL="914400" algn="l" defTabSz="914400" rtl="0" eaLnBrk="1" latinLnBrk="0" hangingPunct="1">
+      <a:defRPr sz="1200" kern="1200">
+        <a:solidFill>
+          <a:schemeClr val="tx1"/>
+        </a:solidFill>
+        <a:latin typeface="+mn-lt"/>
+        <a:ea typeface="+mn-ea"/>
+        <a:cs typeface="+mn-cs"/>
+      </a:defRPr>
+    </a:lvl3pPr>
+    <a:lvl4pPr marL="1371600" algn="l" defTabSz="914400" rtl="0" eaLnBrk="1" latinLnBrk="0" hangingPunct="1">
+      <a:defRPr sz="1200" kern="1200">
+        <a:solidFill>
+          <a:schemeClr val="tx1"/>
+        </a:solidFill>
+        <a:latin typeface="+mn-lt"/>
+        <a:ea typeface="+mn-ea"/>
+        <a:cs typeface="+mn-cs"/>
+      </a:defRPr>
+    </a:lvl4pPr>
+    <a:lvl5pPr marL="1828800" algn="l" defTabSz="914400" rtl="0" eaLnBrk="1" latinLnBrk="0" hangingPunct="1">
+      <a:defRPr sz="1200" kern="1200">
+        <a:solidFill>
+          <a:schemeClr val="tx1"/>
+        </a:solidFill>
+        <a:latin typeface="+mn-lt"/>
+        <a:ea typeface="+mn-ea"/>
+        <a:cs typeface="+mn-cs"/>
+      </a:defRPr>
+    </a:lvl5pPr>
+    <a:lvl6pPr marL="2286000" algn="l" defTabSz="914400" rtl="0" eaLnBrk="1" latinLnBrk="0" hangingPunct="1">
+      <a:defRPr sz="1200" kern="1200">
+        <a:solidFill>
+          <a:schemeClr val="tx1"/>
+        </a:solidFill>
+        <a:latin typeface="+mn-lt"/>
+        <a:ea typeface="+mn-ea"/>
+        <a:cs typeface="+mn-cs"/>
+      </a:defRPr>
+    </a:lvl6pPr>
+    <a:lvl7pPr marL="2743200" algn="l" defTabSz="914400" rtl="0" eaLnBrk="1" latinLnBrk="0" hangingPunct="1">
+      <a:defRPr sz="1200" kern="1200">
+        <a:solidFill>
+          <a:schemeClr val="tx1"/>
+        </a:solidFill>
+        <a:latin typeface="+mn-lt"/>
+        <a:ea typeface="+mn-ea"/>
+        <a:cs typeface="+mn-cs"/>
+      </a:defRPr>
+    </a:lvl7pPr>
+    <a:lvl8pPr marL="3200400" algn="l" defTabSz="914400" rtl="0" eaLnBrk="1" latinLnBrk="0" hangingPunct="1">
+      <a:defRPr sz="1200" kern="1200">
+        <a:solidFill>
+          <a:schemeClr val="tx1"/>
+        </a:solidFill>
+        <a:latin typeface="+mn-lt"/>
+        <a:ea typeface="+mn-ea"/>
+        <a:cs typeface="+mn-cs"/>
+      </a:defRPr>
+    </a:lvl8pPr>
+    <a:lvl9pPr marL="3657600" algn="l" defTabSz="914400" rtl="0" eaLnBrk="1" latinLnBrk="0" hangingPunct="1">
+      <a:defRPr sz="1200" kern="1200">
+        <a:solidFill>
+          <a:schemeClr val="tx1"/>
+        </a:solidFill>
+        <a:latin typeface="+mn-lt"/>
+        <a:ea typeface="+mn-ea"/>
+        <a:cs typeface="+mn-cs"/>
+      </a:defRPr>
+    </a:lvl9pPr>
+  </p:notesStyle>
+</p:notesMaster>
+</file>
+
+<file path=ppt/notesSlides/notesSlide1.xml><?xml version="1.0" encoding="utf-8"?>
+<p:notes xmlns:a="http://schemas.openxmlformats.org/drawingml/2006/main" xmlns:r="http://schemas.openxmlformats.org/officeDocument/2006/relationships" xmlns:p="http://schemas.openxmlformats.org/presentationml/2006/main">
+  <p:cSld>
+    <p:spTree>
+      <p:nvGrpSpPr>
+        <p:cNvPr id="1" name=""/>
+        <p:cNvGrpSpPr/>
+        <p:nvPr/>
+      </p:nvGrpSpPr>
+      <p:grpSpPr>
+        <a:xfrm>
+          <a:off x="0" y="0"/>
+          <a:ext cx="0" cy="0"/>
+          <a:chOff x="0" y="0"/>
+          <a:chExt cx="0" cy="0"/>
+        </a:xfrm>
+      </p:grpSpPr>
+      <p:sp>
+        <p:nvSpPr>
+          <p:cNvPr id="2" name="Slide Image Placeholder 1"/>
+          <p:cNvSpPr>
+            <a:spLocks noGrp="1" noRot="1" noChangeAspect="1"/>
+          </p:cNvSpPr>
+          <p:nvPr>
+            <p:ph type="sldImg"/>
+          </p:nvPr>
+        </p:nvSpPr>
+        <p:spPr/>
+      </p:sp>
+      <p:sp>
+        <p:nvSpPr>
+          <p:cNvPr id="3" name="Notes Placeholder 2"/>
+          <p:cNvSpPr>
+            <a:spLocks noGrp="1"/>
+          </p:cNvSpPr>
+          <p:nvPr>
+            <p:ph type="body" idx="1"/>
+          </p:nvPr>
+        </p:nvSpPr>
+        <p:spPr/>
+        <p:txBody>
+          <a:bodyPr/>
+          <a:lstStyle/>
+          <a:p>
+            <a:r>
+              <a:rPr lang="en-US" dirty="0"/>
+              <a:t>https://www.open-electronics.org/the-power-of-arduino-this-unknown/</a:t>
+            </a:r>
+          </a:p>
+        </p:txBody>
+      </p:sp>
+      <p:sp>
+        <p:nvSpPr>
+          <p:cNvPr id="4" name="Slide Number Placeholder 3"/>
+          <p:cNvSpPr>
+            <a:spLocks noGrp="1"/>
+          </p:cNvSpPr>
+          <p:nvPr>
+            <p:ph type="sldNum" sz="quarter" idx="10"/>
+          </p:nvPr>
+        </p:nvSpPr>
+        <p:spPr/>
+        <p:txBody>
+          <a:bodyPr/>
+          <a:lstStyle/>
+          <a:p>
+            <a:fld id="{1B057D52-65A4-4642-8DCB-0D0611C8D40C}" type="slidenum">
+              <a:rPr lang="en-US" smtClean="0"/>
+              <a:t>16</a:t>
+            </a:fld>
+            <a:endParaRPr lang="en-US"/>
+          </a:p>
+        </p:txBody>
+      </p:sp>
+    </p:spTree>
+    <p:extLst>
+      <p:ext uri="{BB962C8B-B14F-4D97-AF65-F5344CB8AC3E}">
+        <p14:creationId xmlns:p14="http://schemas.microsoft.com/office/powerpoint/2010/main" val="835829744"/>
+      </p:ext>
+    </p:extLst>
+  </p:cSld>
+  <p:clrMapOvr>
+    <a:masterClrMapping/>
+  </p:clrMapOvr>
+</p:notes>
+</file>
+
+<file path=ppt/notesSlides/notesSlide2.xml><?xml version="1.0" encoding="utf-8"?>
+<p:notes xmlns:a="http://schemas.openxmlformats.org/drawingml/2006/main" xmlns:r="http://schemas.openxmlformats.org/officeDocument/2006/relationships" xmlns:p="http://schemas.openxmlformats.org/presentationml/2006/main">
+  <p:cSld>
+    <p:spTree>
+      <p:nvGrpSpPr>
+        <p:cNvPr id="1" name=""/>
+        <p:cNvGrpSpPr/>
+        <p:nvPr/>
+      </p:nvGrpSpPr>
+      <p:grpSpPr>
+        <a:xfrm>
+          <a:off x="0" y="0"/>
+          <a:ext cx="0" cy="0"/>
+          <a:chOff x="0" y="0"/>
+          <a:chExt cx="0" cy="0"/>
+        </a:xfrm>
+      </p:grpSpPr>
+      <p:sp>
+        <p:nvSpPr>
+          <p:cNvPr id="2" name="Slide Image Placeholder 1"/>
+          <p:cNvSpPr>
+            <a:spLocks noGrp="1" noRot="1" noChangeAspect="1"/>
+          </p:cNvSpPr>
+          <p:nvPr>
+            <p:ph type="sldImg"/>
+          </p:nvPr>
+        </p:nvSpPr>
+        <p:spPr/>
+      </p:sp>
+      <p:sp>
+        <p:nvSpPr>
+          <p:cNvPr id="3" name="Notes Placeholder 2"/>
+          <p:cNvSpPr>
+            <a:spLocks noGrp="1"/>
+          </p:cNvSpPr>
+          <p:nvPr>
+            <p:ph type="body" idx="1"/>
+          </p:nvPr>
+        </p:nvSpPr>
+        <p:spPr/>
+        <p:txBody>
+          <a:bodyPr/>
+          <a:lstStyle/>
+          <a:p>
+            <a:r>
+              <a:rPr lang="en-US" dirty="0"/>
+              <a:t>https://www.arduino.cc/en/Tutorial/Blink</a:t>
+            </a:r>
+          </a:p>
+        </p:txBody>
+      </p:sp>
+      <p:sp>
+        <p:nvSpPr>
+          <p:cNvPr id="4" name="Slide Number Placeholder 3"/>
+          <p:cNvSpPr>
+            <a:spLocks noGrp="1"/>
+          </p:cNvSpPr>
+          <p:nvPr>
+            <p:ph type="sldNum" sz="quarter" idx="10"/>
+          </p:nvPr>
+        </p:nvSpPr>
+        <p:spPr/>
+        <p:txBody>
+          <a:bodyPr/>
+          <a:lstStyle/>
+          <a:p>
+            <a:fld id="{1B057D52-65A4-4642-8DCB-0D0611C8D40C}" type="slidenum">
+              <a:rPr lang="en-US" smtClean="0"/>
+              <a:t>18</a:t>
+            </a:fld>
+            <a:endParaRPr lang="en-US"/>
+          </a:p>
+        </p:txBody>
+      </p:sp>
+    </p:spTree>
+    <p:extLst>
+      <p:ext uri="{BB962C8B-B14F-4D97-AF65-F5344CB8AC3E}">
+        <p14:creationId xmlns:p14="http://schemas.microsoft.com/office/powerpoint/2010/main" val="1221707977"/>
+      </p:ext>
+    </p:extLst>
+  </p:cSld>
+  <p:clrMapOvr>
+    <a:masterClrMapping/>
+  </p:clrMapOvr>
+</p:notes>
+</file>
+
 <file path=ppt/slideLayouts/slideLayout1.xml><?xml version="1.0" encoding="utf-8"?>
 <p:sldLayout xmlns:a="http://schemas.openxmlformats.org/drawingml/2006/main" xmlns:r="http://schemas.openxmlformats.org/officeDocument/2006/relationships" xmlns:p="http://schemas.openxmlformats.org/presentationml/2006/main" type="title" preserve="1">
   <p:cSld name="Title Slide">
@@ -260,7 +788,7 @@
           <a:p>
             <a:fld id="{141AF85B-C30D-463B-80F6-39CACF568CE0}" type="datetimeFigureOut">
               <a:rPr lang="en-US" smtClean="0"/>
-              <a:t>6/21/2017</a:t>
+              <a:t>7/1/2017</a:t>
             </a:fld>
             <a:endParaRPr lang="en-US"/>
           </a:p>
@@ -428,7 +956,7 @@
           <a:p>
             <a:fld id="{141AF85B-C30D-463B-80F6-39CACF568CE0}" type="datetimeFigureOut">
               <a:rPr lang="en-US" smtClean="0"/>
-              <a:t>6/21/2017</a:t>
+              <a:t>7/1/2017</a:t>
             </a:fld>
             <a:endParaRPr lang="en-US"/>
           </a:p>
@@ -606,7 +1134,7 @@
           <a:p>
             <a:fld id="{141AF85B-C30D-463B-80F6-39CACF568CE0}" type="datetimeFigureOut">
               <a:rPr lang="en-US" smtClean="0"/>
-              <a:t>6/21/2017</a:t>
+              <a:t>7/1/2017</a:t>
             </a:fld>
             <a:endParaRPr lang="en-US"/>
           </a:p>
@@ -774,7 +1302,7 @@
           <a:p>
             <a:fld id="{141AF85B-C30D-463B-80F6-39CACF568CE0}" type="datetimeFigureOut">
               <a:rPr lang="en-US" smtClean="0"/>
-              <a:t>6/21/2017</a:t>
+              <a:t>7/1/2017</a:t>
             </a:fld>
             <a:endParaRPr lang="en-US"/>
           </a:p>
@@ -1019,7 +1547,7 @@
           <a:p>
             <a:fld id="{141AF85B-C30D-463B-80F6-39CACF568CE0}" type="datetimeFigureOut">
               <a:rPr lang="en-US" smtClean="0"/>
-              <a:t>6/21/2017</a:t>
+              <a:t>7/1/2017</a:t>
             </a:fld>
             <a:endParaRPr lang="en-US"/>
           </a:p>
@@ -1248,7 +1776,7 @@
           <a:p>
             <a:fld id="{141AF85B-C30D-463B-80F6-39CACF568CE0}" type="datetimeFigureOut">
               <a:rPr lang="en-US" smtClean="0"/>
-              <a:t>6/21/2017</a:t>
+              <a:t>7/1/2017</a:t>
             </a:fld>
             <a:endParaRPr lang="en-US"/>
           </a:p>
@@ -1612,7 +2140,7 @@
           <a:p>
             <a:fld id="{141AF85B-C30D-463B-80F6-39CACF568CE0}" type="datetimeFigureOut">
               <a:rPr lang="en-US" smtClean="0"/>
-              <a:t>6/21/2017</a:t>
+              <a:t>7/1/2017</a:t>
             </a:fld>
             <a:endParaRPr lang="en-US"/>
           </a:p>
@@ -1729,7 +2257,7 @@
           <a:p>
             <a:fld id="{141AF85B-C30D-463B-80F6-39CACF568CE0}" type="datetimeFigureOut">
               <a:rPr lang="en-US" smtClean="0"/>
-              <a:t>6/21/2017</a:t>
+              <a:t>7/1/2017</a:t>
             </a:fld>
             <a:endParaRPr lang="en-US"/>
           </a:p>
@@ -1824,7 +2352,7 @@
           <a:p>
             <a:fld id="{141AF85B-C30D-463B-80F6-39CACF568CE0}" type="datetimeFigureOut">
               <a:rPr lang="en-US" smtClean="0"/>
-              <a:t>6/21/2017</a:t>
+              <a:t>7/1/2017</a:t>
             </a:fld>
             <a:endParaRPr lang="en-US"/>
           </a:p>
@@ -2099,7 +2627,7 @@
           <a:p>
             <a:fld id="{141AF85B-C30D-463B-80F6-39CACF568CE0}" type="datetimeFigureOut">
               <a:rPr lang="en-US" smtClean="0"/>
-              <a:t>6/21/2017</a:t>
+              <a:t>7/1/2017</a:t>
             </a:fld>
             <a:endParaRPr lang="en-US"/>
           </a:p>
@@ -2351,7 +2879,7 @@
           <a:p>
             <a:fld id="{141AF85B-C30D-463B-80F6-39CACF568CE0}" type="datetimeFigureOut">
               <a:rPr lang="en-US" smtClean="0"/>
-              <a:t>6/21/2017</a:t>
+              <a:t>7/1/2017</a:t>
             </a:fld>
             <a:endParaRPr lang="en-US"/>
           </a:p>
@@ -2562,7 +3090,7 @@
           <a:p>
             <a:fld id="{141AF85B-C30D-463B-80F6-39CACF568CE0}" type="datetimeFigureOut">
               <a:rPr lang="en-US" smtClean="0"/>
-              <a:t>6/21/2017</a:t>
+              <a:t>7/1/2017</a:t>
             </a:fld>
             <a:endParaRPr lang="en-US"/>
           </a:p>
@@ -3005,7 +3533,10 @@
           <a:bodyPr/>
           <a:lstStyle/>
           <a:p>
-            <a:endParaRPr lang="en-US"/>
+            <a:r>
+              <a:rPr lang="en-US" dirty="0"/>
+              <a:t>Vishal Jagannathan</a:t>
+            </a:r>
           </a:p>
         </p:txBody>
       </p:sp>
@@ -3318,7 +3849,12 @@
             <p:ph type="title"/>
           </p:nvPr>
         </p:nvSpPr>
-        <p:spPr/>
+        <p:spPr>
+          <a:xfrm>
+            <a:off x="838200" y="186223"/>
+            <a:ext cx="10515600" cy="1325563"/>
+          </a:xfrm>
+        </p:spPr>
         <p:txBody>
           <a:bodyPr/>
           <a:lstStyle/>
@@ -3372,7 +3908,7 @@
         </p:blipFill>
         <p:spPr bwMode="auto">
           <a:xfrm>
-            <a:off x="838200" y="1368065"/>
+            <a:off x="838200" y="1189163"/>
             <a:ext cx="9759885" cy="5489935"/>
           </a:xfrm>
           <a:prstGeom prst="rect">
@@ -3452,7 +3988,12 @@
             <p:ph idx="1"/>
           </p:nvPr>
         </p:nvSpPr>
-        <p:spPr/>
+        <p:spPr>
+          <a:xfrm>
+            <a:off x="546652" y="2128490"/>
+            <a:ext cx="10807148" cy="4714323"/>
+          </a:xfrm>
+        </p:spPr>
         <p:txBody>
           <a:bodyPr>
             <a:normAutofit/>
@@ -3461,42 +4002,19 @@
           <a:p>
             <a:r>
               <a:rPr lang="en-US" sz="3500" dirty="0"/>
-              <a:t>This is used to </a:t>
-            </a:r>
-            <a:r>
-              <a:rPr lang="en-US" sz="3500" dirty="0" err="1"/>
-              <a:t>signin</a:t>
-            </a:r>
+              <a:t>This is used to sign-in here!</a:t>
+            </a:r>
+          </a:p>
+          <a:p>
             <a:r>
               <a:rPr lang="en-US" sz="3500" dirty="0"/>
-              <a:t> as a makerspace volunteer!</a:t>
+              <a:t>Note that this is 3.3V</a:t>
             </a:r>
           </a:p>
           <a:p>
             <a:r>
               <a:rPr lang="en-US" sz="3500" dirty="0"/>
-              <a:t>Much more complicated than other sensors</a:t>
-            </a:r>
-          </a:p>
-          <a:p>
-            <a:r>
-              <a:rPr lang="en-US" sz="3500" dirty="0"/>
-              <a:t>Talk about V, GND, RST purposes</a:t>
-            </a:r>
-          </a:p>
-          <a:p>
-            <a:r>
-              <a:rPr lang="en-US" sz="3500" dirty="0"/>
-              <a:t>Simply put, data is sent over SDA, SCK, MOSI, MISO</a:t>
-            </a:r>
-          </a:p>
-          <a:p>
-            <a:pPr marL="0" indent="0">
-              <a:buNone/>
-            </a:pPr>
-            <a:r>
-              <a:rPr lang="en-US" sz="3500" dirty="0"/>
-              <a:t>When an RFID tag is tapped to the sensing area of the board</a:t>
+              <a:t>Simply put, data is sent over SDA, SCK, MOSI, MISO when an RFID tag is tapped to the sensing area of the board</a:t>
             </a:r>
           </a:p>
           <a:p>
@@ -3533,7 +4051,7 @@
         </p:blipFill>
         <p:spPr bwMode="auto">
           <a:xfrm>
-            <a:off x="7452823" y="536967"/>
+            <a:off x="7194406" y="-587057"/>
             <a:ext cx="4509792" cy="3700726"/>
           </a:xfrm>
           <a:prstGeom prst="rect">
@@ -3551,6 +4069,186 @@
           </a:extLst>
         </p:spPr>
       </p:pic>
+      <p:sp>
+        <p:nvSpPr>
+          <p:cNvPr id="4" name="Left Brace 3">
+            <a:extLst>
+              <a:ext uri="{FF2B5EF4-FFF2-40B4-BE49-F238E27FC236}">
+                <a16:creationId xmlns:a16="http://schemas.microsoft.com/office/drawing/2014/main" id="{E828A845-869D-41A4-84D2-1B8C94CDCC8B}"/>
+              </a:ext>
+            </a:extLst>
+          </p:cNvPr>
+          <p:cNvSpPr/>
+          <p:nvPr/>
+        </p:nvSpPr>
+        <p:spPr>
+          <a:xfrm>
+            <a:off x="6887817" y="248478"/>
+            <a:ext cx="685800" cy="805070"/>
+          </a:xfrm>
+          <a:prstGeom prst="leftBrace">
+            <a:avLst/>
+          </a:prstGeom>
+          <a:ln w="34925">
+            <a:solidFill>
+              <a:srgbClr val="FF0000"/>
+            </a:solidFill>
+          </a:ln>
+        </p:spPr>
+        <p:style>
+          <a:lnRef idx="1">
+            <a:schemeClr val="accent1"/>
+          </a:lnRef>
+          <a:fillRef idx="0">
+            <a:schemeClr val="accent1"/>
+          </a:fillRef>
+          <a:effectRef idx="0">
+            <a:schemeClr val="accent1"/>
+          </a:effectRef>
+          <a:fontRef idx="minor">
+            <a:schemeClr val="tx1"/>
+          </a:fontRef>
+        </p:style>
+        <p:txBody>
+          <a:bodyPr rtlCol="0" anchor="ctr"/>
+          <a:lstStyle/>
+          <a:p>
+            <a:pPr algn="ctr"/>
+            <a:endParaRPr lang="en-US"/>
+          </a:p>
+        </p:txBody>
+      </p:sp>
+      <p:sp>
+        <p:nvSpPr>
+          <p:cNvPr id="6" name="Left Brace 5">
+            <a:extLst>
+              <a:ext uri="{FF2B5EF4-FFF2-40B4-BE49-F238E27FC236}">
+                <a16:creationId xmlns:a16="http://schemas.microsoft.com/office/drawing/2014/main" id="{4E0ECB02-06C4-4ACC-9119-BBC56584B5B0}"/>
+              </a:ext>
+            </a:extLst>
+          </p:cNvPr>
+          <p:cNvSpPr/>
+          <p:nvPr/>
+        </p:nvSpPr>
+        <p:spPr>
+          <a:xfrm>
+            <a:off x="6887817" y="1188484"/>
+            <a:ext cx="685800" cy="805070"/>
+          </a:xfrm>
+          <a:prstGeom prst="leftBrace">
+            <a:avLst/>
+          </a:prstGeom>
+          <a:ln w="34925">
+            <a:solidFill>
+              <a:srgbClr val="FF0000"/>
+            </a:solidFill>
+          </a:ln>
+        </p:spPr>
+        <p:style>
+          <a:lnRef idx="1">
+            <a:schemeClr val="accent1"/>
+          </a:lnRef>
+          <a:fillRef idx="0">
+            <a:schemeClr val="accent1"/>
+          </a:fillRef>
+          <a:effectRef idx="0">
+            <a:schemeClr val="accent1"/>
+          </a:effectRef>
+          <a:fontRef idx="minor">
+            <a:schemeClr val="tx1"/>
+          </a:fontRef>
+        </p:style>
+        <p:txBody>
+          <a:bodyPr rtlCol="0" anchor="ctr"/>
+          <a:lstStyle/>
+          <a:p>
+            <a:pPr algn="ctr"/>
+            <a:endParaRPr lang="en-US"/>
+          </a:p>
+        </p:txBody>
+      </p:sp>
+      <p:sp>
+        <p:nvSpPr>
+          <p:cNvPr id="5" name="TextBox 4">
+            <a:extLst>
+              <a:ext uri="{FF2B5EF4-FFF2-40B4-BE49-F238E27FC236}">
+                <a16:creationId xmlns:a16="http://schemas.microsoft.com/office/drawing/2014/main" id="{754FC17F-B884-4936-A8DB-4CF385B0615A}"/>
+              </a:ext>
+            </a:extLst>
+          </p:cNvPr>
+          <p:cNvSpPr txBox="1"/>
+          <p:nvPr/>
+        </p:nvSpPr>
+        <p:spPr>
+          <a:xfrm>
+            <a:off x="5742289" y="372441"/>
+            <a:ext cx="795130" cy="477054"/>
+          </a:xfrm>
+          <a:prstGeom prst="rect">
+            <a:avLst/>
+          </a:prstGeom>
+          <a:noFill/>
+        </p:spPr>
+        <p:txBody>
+          <a:bodyPr wrap="square" rtlCol="0">
+            <a:spAutoFit/>
+          </a:bodyPr>
+          <a:lstStyle/>
+          <a:p>
+            <a:r>
+              <a:rPr lang="en-US" sz="2500" dirty="0">
+                <a:solidFill>
+                  <a:schemeClr val="accent1">
+                    <a:lumMod val="75000"/>
+                  </a:schemeClr>
+                </a:solidFill>
+              </a:rPr>
+              <a:t>Data</a:t>
+            </a:r>
+          </a:p>
+        </p:txBody>
+      </p:sp>
+      <p:sp>
+        <p:nvSpPr>
+          <p:cNvPr id="9" name="TextBox 8">
+            <a:extLst>
+              <a:ext uri="{FF2B5EF4-FFF2-40B4-BE49-F238E27FC236}">
+                <a16:creationId xmlns:a16="http://schemas.microsoft.com/office/drawing/2014/main" id="{050DE5A5-7C19-426D-9678-14710B697518}"/>
+              </a:ext>
+            </a:extLst>
+          </p:cNvPr>
+          <p:cNvSpPr txBox="1"/>
+          <p:nvPr/>
+        </p:nvSpPr>
+        <p:spPr>
+          <a:xfrm>
+            <a:off x="5641217" y="1330281"/>
+            <a:ext cx="1169505" cy="477054"/>
+          </a:xfrm>
+          <a:prstGeom prst="rect">
+            <a:avLst/>
+          </a:prstGeom>
+          <a:noFill/>
+        </p:spPr>
+        <p:txBody>
+          <a:bodyPr wrap="square" rtlCol="0">
+            <a:spAutoFit/>
+          </a:bodyPr>
+          <a:lstStyle/>
+          <a:p>
+            <a:r>
+              <a:rPr lang="en-US" sz="2500" dirty="0">
+                <a:solidFill>
+                  <a:schemeClr val="accent1">
+                    <a:lumMod val="75000"/>
+                  </a:schemeClr>
+                </a:solidFill>
+              </a:rPr>
+              <a:t>Power</a:t>
+            </a:r>
+          </a:p>
+        </p:txBody>
+      </p:sp>
     </p:spTree>
     <p:extLst>
       <p:ext uri="{BB962C8B-B14F-4D97-AF65-F5344CB8AC3E}">
@@ -3603,33 +4301,14 @@
           <a:p>
             <a:r>
               <a:rPr lang="en-US" dirty="0"/>
-              <a:t>Arduino Communication with sensors</a:t>
-            </a:r>
-          </a:p>
-        </p:txBody>
-      </p:sp>
-      <p:sp>
-        <p:nvSpPr>
-          <p:cNvPr id="3" name="Content Placeholder 2"/>
-          <p:cNvSpPr>
-            <a:spLocks noGrp="1"/>
-          </p:cNvSpPr>
-          <p:nvPr>
-            <p:ph idx="1"/>
-          </p:nvPr>
-        </p:nvSpPr>
-        <p:spPr/>
-        <p:txBody>
-          <a:bodyPr/>
-          <a:lstStyle/>
-          <a:p>
-            <a:endParaRPr lang="en-US"/>
+              <a:t>Arduino</a:t>
+            </a:r>
           </a:p>
         </p:txBody>
       </p:sp>
       <p:pic>
         <p:nvPicPr>
-          <p:cNvPr id="1026" name="Picture 2" descr="http://static.arduino.org/media/k2/galleries/90/A000066-Arduino-Uno-TH-1front.jpg"/>
+          <p:cNvPr id="4" name="Picture 2" descr="https://a.pololu-files.com/picture/0J3975.1200.jpg?773731625ebad6f459b06cf5cde22f5c"/>
           <p:cNvPicPr>
             <a:picLocks noChangeAspect="1" noChangeArrowheads="1"/>
           </p:cNvPicPr>
@@ -3650,8 +4329,172 @@
         </p:blipFill>
         <p:spPr bwMode="auto">
           <a:xfrm>
-            <a:off x="2578625" y="1690688"/>
-            <a:ext cx="6291998" cy="4718999"/>
+            <a:off x="6665863" y="0"/>
+            <a:ext cx="5598966" cy="4442155"/>
+          </a:xfrm>
+          <a:prstGeom prst="rect">
+            <a:avLst/>
+          </a:prstGeom>
+          <a:noFill/>
+          <a:extLst>
+            <a:ext uri="{909E8E84-426E-40DD-AFC4-6F175D3DCCD1}">
+              <a14:hiddenFill xmlns:a14="http://schemas.microsoft.com/office/drawing/2010/main">
+                <a:solidFill>
+                  <a:srgbClr val="FFFFFF"/>
+                </a:solidFill>
+              </a14:hiddenFill>
+            </a:ext>
+          </a:extLst>
+        </p:spPr>
+      </p:pic>
+      <p:pic>
+        <p:nvPicPr>
+          <p:cNvPr id="1028" name="Picture 4" descr="https://www.arduino.cc/en/uploads/Main/ArduinoMega.jpg"/>
+          <p:cNvPicPr>
+            <a:picLocks noGrp="1" noChangeAspect="1" noChangeArrowheads="1"/>
+          </p:cNvPicPr>
+          <p:nvPr>
+            <p:ph idx="1"/>
+          </p:nvPr>
+        </p:nvPicPr>
+        <p:blipFill>
+          <a:blip r:embed="rId3">
+            <a:extLst>
+              <a:ext uri="{28A0092B-C50C-407E-A947-70E740481C1C}">
+                <a14:useLocalDpi xmlns:a14="http://schemas.microsoft.com/office/drawing/2010/main" val="0"/>
+              </a:ext>
+            </a:extLst>
+          </a:blip>
+          <a:srcRect/>
+          <a:stretch>
+            <a:fillRect/>
+          </a:stretch>
+        </p:blipFill>
+        <p:spPr bwMode="auto">
+          <a:xfrm>
+            <a:off x="336451" y="2786757"/>
+            <a:ext cx="6674047" cy="4443601"/>
+          </a:xfrm>
+          <a:prstGeom prst="rect">
+            <a:avLst/>
+          </a:prstGeom>
+          <a:noFill/>
+          <a:extLst>
+            <a:ext uri="{909E8E84-426E-40DD-AFC4-6F175D3DCCD1}">
+              <a14:hiddenFill xmlns:a14="http://schemas.microsoft.com/office/drawing/2010/main">
+                <a:solidFill>
+                  <a:srgbClr val="FFFFFF"/>
+                </a:solidFill>
+              </a14:hiddenFill>
+            </a:ext>
+          </a:extLst>
+        </p:spPr>
+      </p:pic>
+      <p:pic>
+        <p:nvPicPr>
+          <p:cNvPr id="1026" name="Picture 2" descr="http://static.arduino.org/media/k2/galleries/90/A000066-Arduino-Uno-TH-1front.jpg"/>
+          <p:cNvPicPr>
+            <a:picLocks noChangeAspect="1" noChangeArrowheads="1"/>
+          </p:cNvPicPr>
+          <p:nvPr/>
+        </p:nvPicPr>
+        <p:blipFill>
+          <a:blip r:embed="rId4">
+            <a:extLst>
+              <a:ext uri="{28A0092B-C50C-407E-A947-70E740481C1C}">
+                <a14:useLocalDpi xmlns:a14="http://schemas.microsoft.com/office/drawing/2010/main" val="0"/>
+              </a:ext>
+            </a:extLst>
+          </a:blip>
+          <a:srcRect/>
+          <a:stretch>
+            <a:fillRect/>
+          </a:stretch>
+        </p:blipFill>
+        <p:spPr bwMode="auto">
+          <a:xfrm>
+            <a:off x="2946270" y="512679"/>
+            <a:ext cx="3980009" cy="2985007"/>
+          </a:xfrm>
+          <a:prstGeom prst="rect">
+            <a:avLst/>
+          </a:prstGeom>
+          <a:noFill/>
+          <a:extLst>
+            <a:ext uri="{909E8E84-426E-40DD-AFC4-6F175D3DCCD1}">
+              <a14:hiddenFill xmlns:a14="http://schemas.microsoft.com/office/drawing/2010/main">
+                <a:solidFill>
+                  <a:srgbClr val="FFFFFF"/>
+                </a:solidFill>
+              </a14:hiddenFill>
+            </a:ext>
+          </a:extLst>
+        </p:spPr>
+      </p:pic>
+      <p:sp>
+        <p:nvSpPr>
+          <p:cNvPr id="5" name="AutoShape 6" descr="http://artofcircuits.com/wp-content/uploads/2014/04/Arduino-Pro-Micro-1.jpg"/>
+          <p:cNvSpPr>
+            <a:spLocks noChangeAspect="1" noChangeArrowheads="1"/>
+          </p:cNvSpPr>
+          <p:nvPr/>
+        </p:nvSpPr>
+        <p:spPr bwMode="auto">
+          <a:xfrm>
+            <a:off x="5943600" y="3276600"/>
+            <a:ext cx="304800" cy="304800"/>
+          </a:xfrm>
+          <a:prstGeom prst="rect">
+            <a:avLst/>
+          </a:prstGeom>
+          <a:noFill/>
+          <a:extLst>
+            <a:ext uri="{909E8E84-426E-40DD-AFC4-6F175D3DCCD1}">
+              <a14:hiddenFill xmlns:a14="http://schemas.microsoft.com/office/drawing/2010/main">
+                <a:solidFill>
+                  <a:srgbClr val="FFFFFF"/>
+                </a:solidFill>
+              </a14:hiddenFill>
+            </a:ext>
+          </a:extLst>
+        </p:spPr>
+        <p:txBody>
+          <a:bodyPr vert="horz" wrap="square" lIns="91440" tIns="45720" rIns="91440" bIns="45720" numCol="1" anchor="t" anchorCtr="0" compatLnSpc="1">
+            <a:prstTxWarp prst="textNoShape">
+              <a:avLst/>
+            </a:prstTxWarp>
+          </a:bodyPr>
+          <a:lstStyle/>
+          <a:p>
+            <a:endParaRPr lang="en-US"/>
+          </a:p>
+        </p:txBody>
+      </p:sp>
+      <p:pic>
+        <p:nvPicPr>
+          <p:cNvPr id="1034" name="Picture 10" descr="https://i.gyazo.com/de25e2439afa5064dc47ecb39887c5c7.png"/>
+          <p:cNvPicPr>
+            <a:picLocks noChangeAspect="1" noChangeArrowheads="1"/>
+          </p:cNvPicPr>
+          <p:nvPr/>
+        </p:nvPicPr>
+        <p:blipFill>
+          <a:blip r:embed="rId5">
+            <a:extLst>
+              <a:ext uri="{28A0092B-C50C-407E-A947-70E740481C1C}">
+                <a14:useLocalDpi xmlns:a14="http://schemas.microsoft.com/office/drawing/2010/main" val="0"/>
+              </a:ext>
+            </a:extLst>
+          </a:blip>
+          <a:srcRect/>
+          <a:stretch>
+            <a:fillRect/>
+          </a:stretch>
+        </p:blipFill>
+        <p:spPr bwMode="auto">
+          <a:xfrm>
+            <a:off x="7564342" y="4442155"/>
+            <a:ext cx="3294158" cy="2272969"/>
           </a:xfrm>
           <a:prstGeom prst="rect">
             <a:avLst/>
@@ -3715,7 +4558,7 @@
           <a:p>
             <a:r>
               <a:rPr lang="en-US" dirty="0"/>
-              <a:t>Details</a:t>
+              <a:t>Details – Arduino Uno</a:t>
             </a:r>
           </a:p>
         </p:txBody>
@@ -3825,24 +4668,211 @@
             <p:ph type="title"/>
           </p:nvPr>
         </p:nvSpPr>
-        <p:spPr/>
+        <p:spPr>
+          <a:xfrm>
+            <a:off x="838200" y="365125"/>
+            <a:ext cx="10515600" cy="1325563"/>
+          </a:xfrm>
+        </p:spPr>
         <p:txBody>
           <a:bodyPr/>
           <a:lstStyle/>
           <a:p>
-            <a:endParaRPr lang="en-US"/>
+            <a:r>
+              <a:rPr lang="en-US" dirty="0"/>
+              <a:t>Arduino Power</a:t>
+            </a:r>
           </a:p>
         </p:txBody>
       </p:sp>
       <p:pic>
         <p:nvPicPr>
-          <p:cNvPr id="5" name="Content Placeholder 4"/>
+          <p:cNvPr id="4" name="Picture 2" descr="https://i.gyazo.com/5507c0e221933436b5d21c0ad48ac56d.png">
+            <a:extLst>
+              <a:ext uri="{FF2B5EF4-FFF2-40B4-BE49-F238E27FC236}">
+                <a16:creationId xmlns:a16="http://schemas.microsoft.com/office/drawing/2014/main" id="{0826642B-DE12-4370-9A9A-A3B1E68E1E3D}"/>
+              </a:ext>
+            </a:extLst>
+          </p:cNvPr>
           <p:cNvPicPr>
-            <a:picLocks noGrp="1" noChangeAspect="1"/>
+            <a:picLocks noChangeAspect="1" noChangeArrowheads="1"/>
           </p:cNvPicPr>
+          <p:nvPr/>
+        </p:nvPicPr>
+        <p:blipFill>
+          <a:blip r:embed="rId3">
+            <a:extLst>
+              <a:ext uri="{28A0092B-C50C-407E-A947-70E740481C1C}">
+                <a14:useLocalDpi xmlns:a14="http://schemas.microsoft.com/office/drawing/2010/main" val="0"/>
+              </a:ext>
+            </a:extLst>
+          </a:blip>
+          <a:srcRect/>
+          <a:stretch>
+            <a:fillRect/>
+          </a:stretch>
+        </p:blipFill>
+        <p:spPr bwMode="auto">
+          <a:xfrm>
+            <a:off x="2191838" y="1243238"/>
+            <a:ext cx="7732997" cy="5586763"/>
+          </a:xfrm>
+          <a:prstGeom prst="rect">
+            <a:avLst/>
+          </a:prstGeom>
+          <a:noFill/>
+          <a:extLst>
+            <a:ext uri="{909E8E84-426E-40DD-AFC4-6F175D3DCCD1}">
+              <a14:hiddenFill xmlns:a14="http://schemas.microsoft.com/office/drawing/2010/main">
+                <a:solidFill>
+                  <a:srgbClr val="FFFFFF"/>
+                </a:solidFill>
+              </a14:hiddenFill>
+            </a:ext>
+          </a:extLst>
+        </p:spPr>
+      </p:pic>
+    </p:spTree>
+    <p:extLst>
+      <p:ext uri="{BB962C8B-B14F-4D97-AF65-F5344CB8AC3E}">
+        <p14:creationId xmlns:p14="http://schemas.microsoft.com/office/powerpoint/2010/main" val="1559874298"/>
+      </p:ext>
+    </p:extLst>
+  </p:cSld>
+  <p:clrMapOvr>
+    <a:masterClrMapping/>
+  </p:clrMapOvr>
+</p:sld>
+</file>
+
+<file path=ppt/slides/slide17.xml><?xml version="1.0" encoding="utf-8"?>
+<p:sld xmlns:a="http://schemas.openxmlformats.org/drawingml/2006/main" xmlns:r="http://schemas.openxmlformats.org/officeDocument/2006/relationships" xmlns:p="http://schemas.openxmlformats.org/presentationml/2006/main">
+  <p:cSld>
+    <p:spTree>
+      <p:nvGrpSpPr>
+        <p:cNvPr id="1" name=""/>
+        <p:cNvGrpSpPr/>
+        <p:nvPr/>
+      </p:nvGrpSpPr>
+      <p:grpSpPr>
+        <a:xfrm>
+          <a:off x="0" y="0"/>
+          <a:ext cx="0" cy="0"/>
+          <a:chOff x="0" y="0"/>
+          <a:chExt cx="0" cy="0"/>
+        </a:xfrm>
+      </p:grpSpPr>
+      <p:sp>
+        <p:nvSpPr>
+          <p:cNvPr id="2" name="Title 1"/>
+          <p:cNvSpPr>
+            <a:spLocks noGrp="1"/>
+          </p:cNvSpPr>
+          <p:nvPr>
+            <p:ph type="title"/>
+          </p:nvPr>
+        </p:nvSpPr>
+        <p:spPr>
+          <a:xfrm>
+            <a:off x="838200" y="365125"/>
+            <a:ext cx="10515600" cy="1325563"/>
+          </a:xfrm>
+        </p:spPr>
+        <p:txBody>
+          <a:bodyPr/>
+          <a:lstStyle/>
+          <a:p>
+            <a:r>
+              <a:rPr lang="en-US" dirty="0"/>
+              <a:t>Arduino Communication</a:t>
+            </a:r>
+          </a:p>
+        </p:txBody>
+      </p:sp>
+      <p:sp>
+        <p:nvSpPr>
+          <p:cNvPr id="3" name="Content Placeholder 2"/>
+          <p:cNvSpPr>
+            <a:spLocks noGrp="1"/>
+          </p:cNvSpPr>
           <p:nvPr>
             <p:ph idx="1"/>
           </p:nvPr>
+        </p:nvSpPr>
+        <p:spPr/>
+        <p:txBody>
+          <a:bodyPr/>
+          <a:lstStyle/>
+          <a:p>
+            <a:r>
+              <a:rPr lang="en-US" dirty="0"/>
+              <a:t>Arduinos have analog and digital pins</a:t>
+            </a:r>
+          </a:p>
+          <a:p>
+            <a:r>
+              <a:rPr lang="en-US" dirty="0"/>
+              <a:t>Digital: </a:t>
+            </a:r>
+          </a:p>
+          <a:p>
+            <a:pPr lvl="1"/>
+            <a:r>
+              <a:rPr lang="en-US" dirty="0"/>
+              <a:t>Can send power 0 – 5V (or 3.3V on some other </a:t>
+            </a:r>
+            <a:r>
+              <a:rPr lang="en-US" dirty="0" err="1"/>
+              <a:t>Arudino</a:t>
+            </a:r>
+            <a:r>
+              <a:rPr lang="en-US" dirty="0"/>
+              <a:t> models)</a:t>
+            </a:r>
+          </a:p>
+          <a:p>
+            <a:pPr lvl="2"/>
+            <a:r>
+              <a:rPr lang="en-US" dirty="0"/>
+              <a:t>Special PWM pins (denoted by ~) can send between 0 and 5V</a:t>
+            </a:r>
+          </a:p>
+          <a:p>
+            <a:pPr lvl="1"/>
+            <a:r>
+              <a:rPr lang="en-US" dirty="0"/>
+              <a:t>Can read inputs, but not the intensity of it (just on or off)</a:t>
+            </a:r>
+          </a:p>
+          <a:p>
+            <a:r>
+              <a:rPr lang="en-US" dirty="0"/>
+              <a:t>Analog</a:t>
+            </a:r>
+          </a:p>
+          <a:p>
+            <a:pPr lvl="1"/>
+            <a:r>
+              <a:rPr lang="en-US" dirty="0"/>
+              <a:t>Can only read, but can read the intensity of an input</a:t>
+            </a:r>
+          </a:p>
+          <a:p>
+            <a:pPr lvl="1"/>
+            <a:r>
+              <a:rPr lang="en-US" dirty="0"/>
+              <a:t>Reported as a number between 0 – 1023 (scaled 0 – 5V)</a:t>
+            </a:r>
+          </a:p>
+        </p:txBody>
+      </p:sp>
+      <p:pic>
+        <p:nvPicPr>
+          <p:cNvPr id="1026" name="Picture 2" descr="http://static.arduino.org/media/k2/galleries/90/A000066-Arduino-Uno-TH-1front.jpg"/>
+          <p:cNvPicPr>
+            <a:picLocks noChangeAspect="1" noChangeArrowheads="1"/>
+          </p:cNvPicPr>
+          <p:nvPr/>
         </p:nvPicPr>
         <p:blipFill>
           <a:blip r:embed="rId2">
@@ -3852,15 +4882,580 @@
               </a:ext>
             </a:extLst>
           </a:blip>
+          <a:srcRect/>
           <a:stretch>
             <a:fillRect/>
           </a:stretch>
         </p:blipFill>
+        <p:spPr bwMode="auto">
+          <a:xfrm>
+            <a:off x="7956222" y="-128686"/>
+            <a:ext cx="4308049" cy="3231037"/>
+          </a:xfrm>
+          <a:prstGeom prst="rect">
+            <a:avLst/>
+          </a:prstGeom>
+          <a:noFill/>
+          <a:extLst>
+            <a:ext uri="{909E8E84-426E-40DD-AFC4-6F175D3DCCD1}">
+              <a14:hiddenFill xmlns:a14="http://schemas.microsoft.com/office/drawing/2010/main">
+                <a:solidFill>
+                  <a:srgbClr val="FFFFFF"/>
+                </a:solidFill>
+              </a14:hiddenFill>
+            </a:ext>
+          </a:extLst>
+        </p:spPr>
+      </p:pic>
+    </p:spTree>
+    <p:extLst>
+      <p:ext uri="{BB962C8B-B14F-4D97-AF65-F5344CB8AC3E}">
+        <p14:creationId xmlns:p14="http://schemas.microsoft.com/office/powerpoint/2010/main" val="4263229914"/>
+      </p:ext>
+    </p:extLst>
+  </p:cSld>
+  <p:clrMapOvr>
+    <a:masterClrMapping/>
+  </p:clrMapOvr>
+</p:sld>
+</file>
+
+<file path=ppt/slides/slide18.xml><?xml version="1.0" encoding="utf-8"?>
+<p:sld xmlns:a="http://schemas.openxmlformats.org/drawingml/2006/main" xmlns:r="http://schemas.openxmlformats.org/officeDocument/2006/relationships" xmlns:p="http://schemas.openxmlformats.org/presentationml/2006/main">
+  <p:cSld>
+    <p:spTree>
+      <p:nvGrpSpPr>
+        <p:cNvPr id="1" name=""/>
+        <p:cNvGrpSpPr/>
+        <p:nvPr/>
+      </p:nvGrpSpPr>
+      <p:grpSpPr>
+        <a:xfrm>
+          <a:off x="0" y="0"/>
+          <a:ext cx="0" cy="0"/>
+          <a:chOff x="0" y="0"/>
+          <a:chExt cx="0" cy="0"/>
+        </a:xfrm>
+      </p:grpSpPr>
+      <p:pic>
+        <p:nvPicPr>
+          <p:cNvPr id="2050" name="Picture 2" descr="https://www.arduino.cc/en/uploads/Tutorial/ExampleCircuit_bb.png">
+            <a:extLst>
+              <a:ext uri="{FF2B5EF4-FFF2-40B4-BE49-F238E27FC236}">
+                <a16:creationId xmlns:a16="http://schemas.microsoft.com/office/drawing/2014/main" id="{224D5882-2E7E-4D33-8479-711943AD09BD}"/>
+              </a:ext>
+            </a:extLst>
+          </p:cNvPr>
+          <p:cNvPicPr>
+            <a:picLocks noChangeAspect="1" noChangeArrowheads="1"/>
+          </p:cNvPicPr>
+          <p:nvPr/>
+        </p:nvPicPr>
+        <p:blipFill>
+          <a:blip r:embed="rId3">
+            <a:extLst>
+              <a:ext uri="{28A0092B-C50C-407E-A947-70E740481C1C}">
+                <a14:useLocalDpi xmlns:a14="http://schemas.microsoft.com/office/drawing/2010/main" val="0"/>
+              </a:ext>
+            </a:extLst>
+          </a:blip>
+          <a:srcRect/>
+          <a:stretch>
+            <a:fillRect/>
+          </a:stretch>
+        </p:blipFill>
+        <p:spPr bwMode="auto">
+          <a:xfrm>
+            <a:off x="0" y="0"/>
+            <a:ext cx="5691350" cy="5986021"/>
+          </a:xfrm>
+          <a:prstGeom prst="rect">
+            <a:avLst/>
+          </a:prstGeom>
+          <a:noFill/>
+          <a:extLst>
+            <a:ext uri="{909E8E84-426E-40DD-AFC4-6F175D3DCCD1}">
+              <a14:hiddenFill xmlns:a14="http://schemas.microsoft.com/office/drawing/2010/main">
+                <a:solidFill>
+                  <a:srgbClr val="FFFFFF"/>
+                </a:solidFill>
+              </a14:hiddenFill>
+            </a:ext>
+          </a:extLst>
+        </p:spPr>
+      </p:pic>
+      <p:sp>
+        <p:nvSpPr>
+          <p:cNvPr id="2" name="Title 1"/>
+          <p:cNvSpPr>
+            <a:spLocks noGrp="1"/>
+          </p:cNvSpPr>
+          <p:nvPr>
+            <p:ph type="title"/>
+          </p:nvPr>
+        </p:nvSpPr>
+        <p:spPr/>
+        <p:txBody>
+          <a:bodyPr/>
+          <a:lstStyle/>
+          <a:p>
+            <a:endParaRPr lang="en-US"/>
+          </a:p>
+        </p:txBody>
+      </p:sp>
+      <p:pic>
+        <p:nvPicPr>
+          <p:cNvPr id="2052" name="Picture 4" descr="https://i.gyazo.com/1ffd6f210b9942362c01c77d6007581c.png">
+            <a:extLst>
+              <a:ext uri="{FF2B5EF4-FFF2-40B4-BE49-F238E27FC236}">
+                <a16:creationId xmlns:a16="http://schemas.microsoft.com/office/drawing/2014/main" id="{1798390D-2118-44D0-A474-4C059D38E49C}"/>
+              </a:ext>
+            </a:extLst>
+          </p:cNvPr>
+          <p:cNvPicPr>
+            <a:picLocks noGrp="1" noChangeAspect="1" noChangeArrowheads="1"/>
+          </p:cNvPicPr>
+          <p:nvPr>
+            <p:ph idx="1"/>
+          </p:nvPr>
+        </p:nvPicPr>
+        <p:blipFill rotWithShape="1">
+          <a:blip r:embed="rId4">
+            <a:extLst>
+              <a:ext uri="{28A0092B-C50C-407E-A947-70E740481C1C}">
+                <a14:useLocalDpi xmlns:a14="http://schemas.microsoft.com/office/drawing/2010/main" val="0"/>
+              </a:ext>
+            </a:extLst>
+          </a:blip>
+          <a:srcRect r="33586"/>
+          <a:stretch/>
+        </p:blipFill>
+        <p:spPr bwMode="auto">
+          <a:xfrm>
+            <a:off x="5831812" y="1690688"/>
+            <a:ext cx="6253352" cy="3144350"/>
+          </a:xfrm>
+          <a:prstGeom prst="rect">
+            <a:avLst/>
+          </a:prstGeom>
+          <a:noFill/>
+          <a:extLst>
+            <a:ext uri="{909E8E84-426E-40DD-AFC4-6F175D3DCCD1}">
+              <a14:hiddenFill xmlns:a14="http://schemas.microsoft.com/office/drawing/2010/main">
+                <a:solidFill>
+                  <a:srgbClr val="FFFFFF"/>
+                </a:solidFill>
+              </a14:hiddenFill>
+            </a:ext>
+          </a:extLst>
+        </p:spPr>
+      </p:pic>
+      <p:cxnSp>
+        <p:nvCxnSpPr>
+          <p:cNvPr id="7" name="Straight Arrow Connector 6">
+            <a:extLst>
+              <a:ext uri="{FF2B5EF4-FFF2-40B4-BE49-F238E27FC236}">
+                <a16:creationId xmlns:a16="http://schemas.microsoft.com/office/drawing/2014/main" id="{95698E51-FA2C-463D-B58C-5D0165C608DB}"/>
+              </a:ext>
+            </a:extLst>
+          </p:cNvPr>
+          <p:cNvCxnSpPr>
+            <a:cxnSpLocks/>
+          </p:cNvCxnSpPr>
+          <p:nvPr/>
+        </p:nvCxnSpPr>
         <p:spPr>
-          <a:xfrm rot="5400000">
-            <a:off x="2508617" y="896847"/>
-            <a:ext cx="7174766" cy="5381073"/>
+          <a:xfrm flipH="1">
+            <a:off x="2777450" y="864704"/>
+            <a:ext cx="2322998" cy="1191109"/>
           </a:xfrm>
+          <a:prstGeom prst="straightConnector1">
+            <a:avLst/>
+          </a:prstGeom>
+          <a:ln w="38100">
+            <a:tailEnd type="triangle"/>
+          </a:ln>
+        </p:spPr>
+        <p:style>
+          <a:lnRef idx="1">
+            <a:schemeClr val="accent1"/>
+          </a:lnRef>
+          <a:fillRef idx="0">
+            <a:schemeClr val="accent1"/>
+          </a:fillRef>
+          <a:effectRef idx="0">
+            <a:schemeClr val="accent1"/>
+          </a:effectRef>
+          <a:fontRef idx="minor">
+            <a:schemeClr val="tx1"/>
+          </a:fontRef>
+        </p:style>
+      </p:cxnSp>
+      <p:sp>
+        <p:nvSpPr>
+          <p:cNvPr id="9" name="TextBox 8">
+            <a:extLst>
+              <a:ext uri="{FF2B5EF4-FFF2-40B4-BE49-F238E27FC236}">
+                <a16:creationId xmlns:a16="http://schemas.microsoft.com/office/drawing/2014/main" id="{20A53B16-BD41-48B1-9CA3-30EDD296A8AE}"/>
+              </a:ext>
+            </a:extLst>
+          </p:cNvPr>
+          <p:cNvSpPr txBox="1"/>
+          <p:nvPr/>
+        </p:nvSpPr>
+        <p:spPr>
+          <a:xfrm>
+            <a:off x="5100448" y="365125"/>
+            <a:ext cx="4282091" cy="477054"/>
+          </a:xfrm>
+          <a:prstGeom prst="rect">
+            <a:avLst/>
+          </a:prstGeom>
+          <a:noFill/>
+        </p:spPr>
+        <p:txBody>
+          <a:bodyPr wrap="square" rtlCol="0">
+            <a:spAutoFit/>
+          </a:bodyPr>
+          <a:lstStyle/>
+          <a:p>
+            <a:r>
+              <a:rPr lang="en-US" sz="2500" dirty="0"/>
+              <a:t>Power output</a:t>
+            </a:r>
+          </a:p>
+        </p:txBody>
+      </p:sp>
+      <p:cxnSp>
+        <p:nvCxnSpPr>
+          <p:cNvPr id="12" name="Straight Arrow Connector 11">
+            <a:extLst>
+              <a:ext uri="{FF2B5EF4-FFF2-40B4-BE49-F238E27FC236}">
+                <a16:creationId xmlns:a16="http://schemas.microsoft.com/office/drawing/2014/main" id="{D8697960-F5FC-42C8-BE42-0C5D029C1AC8}"/>
+              </a:ext>
+            </a:extLst>
+          </p:cNvPr>
+          <p:cNvCxnSpPr>
+            <a:cxnSpLocks/>
+          </p:cNvCxnSpPr>
+          <p:nvPr/>
+        </p:nvCxnSpPr>
+        <p:spPr>
+          <a:xfrm>
+            <a:off x="1222513" y="1027906"/>
+            <a:ext cx="1152939" cy="1027907"/>
+          </a:xfrm>
+          <a:prstGeom prst="straightConnector1">
+            <a:avLst/>
+          </a:prstGeom>
+          <a:ln w="38100">
+            <a:tailEnd type="triangle"/>
+          </a:ln>
+        </p:spPr>
+        <p:style>
+          <a:lnRef idx="1">
+            <a:schemeClr val="accent1"/>
+          </a:lnRef>
+          <a:fillRef idx="0">
+            <a:schemeClr val="accent1"/>
+          </a:fillRef>
+          <a:effectRef idx="0">
+            <a:schemeClr val="accent1"/>
+          </a:effectRef>
+          <a:fontRef idx="minor">
+            <a:schemeClr val="tx1"/>
+          </a:fontRef>
+        </p:style>
+      </p:cxnSp>
+      <p:sp>
+        <p:nvSpPr>
+          <p:cNvPr id="14" name="TextBox 13">
+            <a:extLst>
+              <a:ext uri="{FF2B5EF4-FFF2-40B4-BE49-F238E27FC236}">
+                <a16:creationId xmlns:a16="http://schemas.microsoft.com/office/drawing/2014/main" id="{064F43B3-644E-4F87-9CE7-F0131D1134AB}"/>
+              </a:ext>
+            </a:extLst>
+          </p:cNvPr>
+          <p:cNvSpPr txBox="1"/>
+          <p:nvPr/>
+        </p:nvSpPr>
+        <p:spPr>
+          <a:xfrm>
+            <a:off x="451473" y="550852"/>
+            <a:ext cx="2124978" cy="477054"/>
+          </a:xfrm>
+          <a:prstGeom prst="rect">
+            <a:avLst/>
+          </a:prstGeom>
+          <a:noFill/>
+        </p:spPr>
+        <p:txBody>
+          <a:bodyPr wrap="square" rtlCol="0">
+            <a:spAutoFit/>
+          </a:bodyPr>
+          <a:lstStyle/>
+          <a:p>
+            <a:r>
+              <a:rPr lang="en-US" sz="2500" dirty="0"/>
+              <a:t>Ground</a:t>
+            </a:r>
+          </a:p>
+        </p:txBody>
+      </p:sp>
+      <p:sp>
+        <p:nvSpPr>
+          <p:cNvPr id="15" name="TextBox 14">
+            <a:extLst>
+              <a:ext uri="{FF2B5EF4-FFF2-40B4-BE49-F238E27FC236}">
+                <a16:creationId xmlns:a16="http://schemas.microsoft.com/office/drawing/2014/main" id="{644EBC9F-EEC7-4E49-8533-FAE32BEAC4A3}"/>
+              </a:ext>
+            </a:extLst>
+          </p:cNvPr>
+          <p:cNvSpPr txBox="1"/>
+          <p:nvPr/>
+        </p:nvSpPr>
+        <p:spPr>
+          <a:xfrm>
+            <a:off x="6877878" y="2708865"/>
+            <a:ext cx="2613992" cy="369332"/>
+          </a:xfrm>
+          <a:prstGeom prst="rect">
+            <a:avLst/>
+          </a:prstGeom>
+          <a:noFill/>
+        </p:spPr>
+        <p:txBody>
+          <a:bodyPr wrap="square" rtlCol="0">
+            <a:spAutoFit/>
+          </a:bodyPr>
+          <a:lstStyle/>
+          <a:p>
+            <a:r>
+              <a:rPr lang="en-US" dirty="0">
+                <a:solidFill>
+                  <a:srgbClr val="FF0000"/>
+                </a:solidFill>
+              </a:rPr>
+              <a:t>(LED_BUILTIN = 13)</a:t>
+            </a:r>
+          </a:p>
+        </p:txBody>
+      </p:sp>
+      <p:cxnSp>
+        <p:nvCxnSpPr>
+          <p:cNvPr id="17" name="Straight Connector 16">
+            <a:extLst>
+              <a:ext uri="{FF2B5EF4-FFF2-40B4-BE49-F238E27FC236}">
+                <a16:creationId xmlns:a16="http://schemas.microsoft.com/office/drawing/2014/main" id="{D9A2DDEF-25DF-4886-935E-058E4B880836}"/>
+              </a:ext>
+            </a:extLst>
+          </p:cNvPr>
+          <p:cNvCxnSpPr>
+            <a:cxnSpLocks/>
+          </p:cNvCxnSpPr>
+          <p:nvPr/>
+        </p:nvCxnSpPr>
+        <p:spPr>
+          <a:xfrm>
+            <a:off x="7056783" y="2708865"/>
+            <a:ext cx="1222513" cy="0"/>
+          </a:xfrm>
+          <a:prstGeom prst="line">
+            <a:avLst/>
+          </a:prstGeom>
+          <a:ln w="34925">
+            <a:solidFill>
+              <a:srgbClr val="FF0000"/>
+            </a:solidFill>
+          </a:ln>
+        </p:spPr>
+        <p:style>
+          <a:lnRef idx="1">
+            <a:schemeClr val="accent1"/>
+          </a:lnRef>
+          <a:fillRef idx="0">
+            <a:schemeClr val="accent1"/>
+          </a:fillRef>
+          <a:effectRef idx="0">
+            <a:schemeClr val="accent1"/>
+          </a:effectRef>
+          <a:fontRef idx="minor">
+            <a:schemeClr val="tx1"/>
+          </a:fontRef>
+        </p:style>
+      </p:cxnSp>
+      <p:cxnSp>
+        <p:nvCxnSpPr>
+          <p:cNvPr id="21" name="Straight Connector 20">
+            <a:extLst>
+              <a:ext uri="{FF2B5EF4-FFF2-40B4-BE49-F238E27FC236}">
+                <a16:creationId xmlns:a16="http://schemas.microsoft.com/office/drawing/2014/main" id="{77722F5B-B002-4DEC-A6F4-452FF68CAAD4}"/>
+              </a:ext>
+            </a:extLst>
+          </p:cNvPr>
+          <p:cNvCxnSpPr>
+            <a:cxnSpLocks/>
+          </p:cNvCxnSpPr>
+          <p:nvPr/>
+        </p:nvCxnSpPr>
+        <p:spPr>
+          <a:xfrm>
+            <a:off x="8965096" y="3875056"/>
+            <a:ext cx="526774" cy="0"/>
+          </a:xfrm>
+          <a:prstGeom prst="line">
+            <a:avLst/>
+          </a:prstGeom>
+          <a:ln w="34925">
+            <a:solidFill>
+              <a:srgbClr val="FF0000"/>
+            </a:solidFill>
+          </a:ln>
+        </p:spPr>
+        <p:style>
+          <a:lnRef idx="1">
+            <a:schemeClr val="accent1"/>
+          </a:lnRef>
+          <a:fillRef idx="0">
+            <a:schemeClr val="accent1"/>
+          </a:fillRef>
+          <a:effectRef idx="0">
+            <a:schemeClr val="accent1"/>
+          </a:effectRef>
+          <a:fontRef idx="minor">
+            <a:schemeClr val="tx1"/>
+          </a:fontRef>
+        </p:style>
+      </p:cxnSp>
+      <p:cxnSp>
+        <p:nvCxnSpPr>
+          <p:cNvPr id="22" name="Straight Connector 21">
+            <a:extLst>
+              <a:ext uri="{FF2B5EF4-FFF2-40B4-BE49-F238E27FC236}">
+                <a16:creationId xmlns:a16="http://schemas.microsoft.com/office/drawing/2014/main" id="{89A12DF4-7AC2-4033-8262-B2619A891884}"/>
+              </a:ext>
+            </a:extLst>
+          </p:cNvPr>
+          <p:cNvCxnSpPr>
+            <a:cxnSpLocks/>
+          </p:cNvCxnSpPr>
+          <p:nvPr/>
+        </p:nvCxnSpPr>
+        <p:spPr>
+          <a:xfrm>
+            <a:off x="8965096" y="4345508"/>
+            <a:ext cx="417443" cy="0"/>
+          </a:xfrm>
+          <a:prstGeom prst="line">
+            <a:avLst/>
+          </a:prstGeom>
+          <a:ln w="34925">
+            <a:solidFill>
+              <a:srgbClr val="FF0000"/>
+            </a:solidFill>
+          </a:ln>
+        </p:spPr>
+        <p:style>
+          <a:lnRef idx="1">
+            <a:schemeClr val="accent1"/>
+          </a:lnRef>
+          <a:fillRef idx="0">
+            <a:schemeClr val="accent1"/>
+          </a:fillRef>
+          <a:effectRef idx="0">
+            <a:schemeClr val="accent1"/>
+          </a:effectRef>
+          <a:fontRef idx="minor">
+            <a:schemeClr val="tx1"/>
+          </a:fontRef>
+        </p:style>
+      </p:cxnSp>
+      <p:sp>
+        <p:nvSpPr>
+          <p:cNvPr id="29" name="TextBox 28">
+            <a:extLst>
+              <a:ext uri="{FF2B5EF4-FFF2-40B4-BE49-F238E27FC236}">
+                <a16:creationId xmlns:a16="http://schemas.microsoft.com/office/drawing/2014/main" id="{285A8114-7680-4492-86FF-D9BB9D6B3A94}"/>
+              </a:ext>
+            </a:extLst>
+          </p:cNvPr>
+          <p:cNvSpPr txBox="1"/>
+          <p:nvPr/>
+        </p:nvSpPr>
+        <p:spPr>
+          <a:xfrm>
+            <a:off x="6152322" y="5237922"/>
+            <a:ext cx="5029200" cy="369332"/>
+          </a:xfrm>
+          <a:prstGeom prst="rect">
+            <a:avLst/>
+          </a:prstGeom>
+          <a:noFill/>
+        </p:spPr>
+        <p:txBody>
+          <a:bodyPr wrap="square" rtlCol="0">
+            <a:spAutoFit/>
+          </a:bodyPr>
+          <a:lstStyle/>
+          <a:p>
+            <a:r>
+              <a:rPr lang="en-US" dirty="0">
+                <a:solidFill>
+                  <a:schemeClr val="accent1">
+                    <a:lumMod val="75000"/>
+                  </a:schemeClr>
+                </a:solidFill>
+              </a:rPr>
+              <a:t>Note: Times are always given in Milliseconds</a:t>
+            </a:r>
+          </a:p>
+        </p:txBody>
+      </p:sp>
+      <p:pic>
+        <p:nvPicPr>
+          <p:cNvPr id="32" name="Picture 2" descr="https://www.arduino.cc/en/uploads/Tutorial/ExampleCircuit_bb.png">
+            <a:extLst>
+              <a:ext uri="{FF2B5EF4-FFF2-40B4-BE49-F238E27FC236}">
+                <a16:creationId xmlns:a16="http://schemas.microsoft.com/office/drawing/2014/main" id="{65622CEA-0D57-4256-AE1B-87AC5089004B}"/>
+              </a:ext>
+            </a:extLst>
+          </p:cNvPr>
+          <p:cNvPicPr>
+            <a:picLocks noChangeAspect="1" noChangeArrowheads="1"/>
+          </p:cNvPicPr>
+          <p:nvPr/>
+        </p:nvPicPr>
+        <p:blipFill>
+          <a:blip r:embed="rId3">
+            <a:extLst>
+              <a:ext uri="{28A0092B-C50C-407E-A947-70E740481C1C}">
+                <a14:useLocalDpi xmlns:a14="http://schemas.microsoft.com/office/drawing/2010/main" val="0"/>
+              </a:ext>
+            </a:extLst>
+          </a:blip>
+          <a:srcRect/>
+          <a:stretch>
+            <a:fillRect/>
+          </a:stretch>
+        </p:blipFill>
+        <p:spPr bwMode="auto">
+          <a:xfrm>
+            <a:off x="3295529" y="509088"/>
+            <a:ext cx="5691350" cy="5986021"/>
+          </a:xfrm>
+          <a:prstGeom prst="rect">
+            <a:avLst/>
+          </a:prstGeom>
+          <a:noFill/>
+          <a:extLst>
+            <a:ext uri="{909E8E84-426E-40DD-AFC4-6F175D3DCCD1}">
+              <a14:hiddenFill xmlns:a14="http://schemas.microsoft.com/office/drawing/2010/main">
+                <a:solidFill>
+                  <a:srgbClr val="FFFFFF"/>
+                </a:solidFill>
+              </a14:hiddenFill>
+            </a:ext>
+          </a:extLst>
         </p:spPr>
       </p:pic>
     </p:spTree>
@@ -3873,6 +5468,614 @@
   <p:clrMapOvr>
     <a:masterClrMapping/>
   </p:clrMapOvr>
+  <p:timing>
+    <p:tnLst>
+      <p:par>
+        <p:cTn id="1" dur="indefinite" restart="never" nodeType="tmRoot">
+          <p:childTnLst>
+            <p:seq concurrent="1" nextAc="seek">
+              <p:cTn id="2" dur="indefinite" nodeType="mainSeq">
+                <p:childTnLst>
+                  <p:par>
+                    <p:cTn id="3" fill="hold">
+                      <p:stCondLst>
+                        <p:cond delay="indefinite"/>
+                      </p:stCondLst>
+                      <p:childTnLst>
+                        <p:par>
+                          <p:cTn id="4" fill="hold">
+                            <p:stCondLst>
+                              <p:cond delay="0"/>
+                            </p:stCondLst>
+                            <p:childTnLst>
+                              <p:par>
+                                <p:cTn id="5" presetID="42" presetClass="path" presetSubtype="0" accel="50000" decel="50000" fill="hold" nodeType="clickEffect">
+                                  <p:stCondLst>
+                                    <p:cond delay="0"/>
+                                  </p:stCondLst>
+                                  <p:childTnLst>
+                                    <p:animMotion origin="layout" path="M 4.16667E-6 1.85185E-6 L -0.26771 -0.07084 " pathEditMode="relative" rAng="0" ptsTypes="AA">
+                                      <p:cBhvr>
+                                        <p:cTn id="6" dur="2000" fill="hold"/>
+                                        <p:tgtEl>
+                                          <p:spTgt spid="32"/>
+                                        </p:tgtEl>
+                                        <p:attrNameLst>
+                                          <p:attrName>ppt_x</p:attrName>
+                                          <p:attrName>ppt_y</p:attrName>
+                                        </p:attrNameLst>
+                                      </p:cBhvr>
+                                      <p:rCtr x="-13385" y="-3542"/>
+                                    </p:animMotion>
+                                  </p:childTnLst>
+                                </p:cTn>
+                              </p:par>
+                            </p:childTnLst>
+                          </p:cTn>
+                        </p:par>
+                        <p:par>
+                          <p:cTn id="7" fill="hold">
+                            <p:stCondLst>
+                              <p:cond delay="2000"/>
+                            </p:stCondLst>
+                            <p:childTnLst>
+                              <p:par>
+                                <p:cTn id="8" presetID="1" presetClass="exit" presetSubtype="0" fill="hold" nodeType="afterEffect">
+                                  <p:stCondLst>
+                                    <p:cond delay="0"/>
+                                  </p:stCondLst>
+                                  <p:childTnLst>
+                                    <p:set>
+                                      <p:cBhvr>
+                                        <p:cTn id="9" dur="1" fill="hold">
+                                          <p:stCondLst>
+                                            <p:cond delay="0"/>
+                                          </p:stCondLst>
+                                        </p:cTn>
+                                        <p:tgtEl>
+                                          <p:spTgt spid="32"/>
+                                        </p:tgtEl>
+                                        <p:attrNameLst>
+                                          <p:attrName>style.visibility</p:attrName>
+                                        </p:attrNameLst>
+                                      </p:cBhvr>
+                                      <p:to>
+                                        <p:strVal val="hidden"/>
+                                      </p:to>
+                                    </p:set>
+                                  </p:childTnLst>
+                                </p:cTn>
+                              </p:par>
+                            </p:childTnLst>
+                          </p:cTn>
+                        </p:par>
+                        <p:par>
+                          <p:cTn id="10" fill="hold">
+                            <p:stCondLst>
+                              <p:cond delay="2000"/>
+                            </p:stCondLst>
+                            <p:childTnLst>
+                              <p:par>
+                                <p:cTn id="11" presetID="1" presetClass="entr" presetSubtype="0" fill="hold" nodeType="afterEffect">
+                                  <p:stCondLst>
+                                    <p:cond delay="0"/>
+                                  </p:stCondLst>
+                                  <p:childTnLst>
+                                    <p:set>
+                                      <p:cBhvr>
+                                        <p:cTn id="12" dur="1" fill="hold">
+                                          <p:stCondLst>
+                                            <p:cond delay="0"/>
+                                          </p:stCondLst>
+                                        </p:cTn>
+                                        <p:tgtEl>
+                                          <p:spTgt spid="2050"/>
+                                        </p:tgtEl>
+                                        <p:attrNameLst>
+                                          <p:attrName>style.visibility</p:attrName>
+                                        </p:attrNameLst>
+                                      </p:cBhvr>
+                                      <p:to>
+                                        <p:strVal val="visible"/>
+                                      </p:to>
+                                    </p:set>
+                                  </p:childTnLst>
+                                </p:cTn>
+                              </p:par>
+                            </p:childTnLst>
+                          </p:cTn>
+                        </p:par>
+                        <p:par>
+                          <p:cTn id="13" fill="hold">
+                            <p:stCondLst>
+                              <p:cond delay="2000"/>
+                            </p:stCondLst>
+                            <p:childTnLst>
+                              <p:par>
+                                <p:cTn id="14" presetID="10" presetClass="entr" presetSubtype="0" fill="hold" grpId="0" nodeType="afterEffect">
+                                  <p:stCondLst>
+                                    <p:cond delay="0"/>
+                                  </p:stCondLst>
+                                  <p:childTnLst>
+                                    <p:set>
+                                      <p:cBhvr>
+                                        <p:cTn id="15" dur="1" fill="hold">
+                                          <p:stCondLst>
+                                            <p:cond delay="0"/>
+                                          </p:stCondLst>
+                                        </p:cTn>
+                                        <p:tgtEl>
+                                          <p:spTgt spid="9"/>
+                                        </p:tgtEl>
+                                        <p:attrNameLst>
+                                          <p:attrName>style.visibility</p:attrName>
+                                        </p:attrNameLst>
+                                      </p:cBhvr>
+                                      <p:to>
+                                        <p:strVal val="visible"/>
+                                      </p:to>
+                                    </p:set>
+                                    <p:animEffect transition="in" filter="fade">
+                                      <p:cBhvr>
+                                        <p:cTn id="16" dur="500"/>
+                                        <p:tgtEl>
+                                          <p:spTgt spid="9"/>
+                                        </p:tgtEl>
+                                      </p:cBhvr>
+                                    </p:animEffect>
+                                  </p:childTnLst>
+                                </p:cTn>
+                              </p:par>
+                            </p:childTnLst>
+                          </p:cTn>
+                        </p:par>
+                        <p:par>
+                          <p:cTn id="17" fill="hold">
+                            <p:stCondLst>
+                              <p:cond delay="2500"/>
+                            </p:stCondLst>
+                            <p:childTnLst>
+                              <p:par>
+                                <p:cTn id="18" presetID="10" presetClass="entr" presetSubtype="0" fill="hold" nodeType="afterEffect">
+                                  <p:stCondLst>
+                                    <p:cond delay="0"/>
+                                  </p:stCondLst>
+                                  <p:childTnLst>
+                                    <p:set>
+                                      <p:cBhvr>
+                                        <p:cTn id="19" dur="1" fill="hold">
+                                          <p:stCondLst>
+                                            <p:cond delay="0"/>
+                                          </p:stCondLst>
+                                        </p:cTn>
+                                        <p:tgtEl>
+                                          <p:spTgt spid="7"/>
+                                        </p:tgtEl>
+                                        <p:attrNameLst>
+                                          <p:attrName>style.visibility</p:attrName>
+                                        </p:attrNameLst>
+                                      </p:cBhvr>
+                                      <p:to>
+                                        <p:strVal val="visible"/>
+                                      </p:to>
+                                    </p:set>
+                                    <p:animEffect transition="in" filter="fade">
+                                      <p:cBhvr>
+                                        <p:cTn id="20" dur="500"/>
+                                        <p:tgtEl>
+                                          <p:spTgt spid="7"/>
+                                        </p:tgtEl>
+                                      </p:cBhvr>
+                                    </p:animEffect>
+                                  </p:childTnLst>
+                                </p:cTn>
+                              </p:par>
+                            </p:childTnLst>
+                          </p:cTn>
+                        </p:par>
+                        <p:par>
+                          <p:cTn id="21" fill="hold">
+                            <p:stCondLst>
+                              <p:cond delay="3000"/>
+                            </p:stCondLst>
+                            <p:childTnLst>
+                              <p:par>
+                                <p:cTn id="22" presetID="10" presetClass="entr" presetSubtype="0" fill="hold" nodeType="afterEffect">
+                                  <p:stCondLst>
+                                    <p:cond delay="0"/>
+                                  </p:stCondLst>
+                                  <p:childTnLst>
+                                    <p:set>
+                                      <p:cBhvr>
+                                        <p:cTn id="23" dur="1" fill="hold">
+                                          <p:stCondLst>
+                                            <p:cond delay="0"/>
+                                          </p:stCondLst>
+                                        </p:cTn>
+                                        <p:tgtEl>
+                                          <p:spTgt spid="12"/>
+                                        </p:tgtEl>
+                                        <p:attrNameLst>
+                                          <p:attrName>style.visibility</p:attrName>
+                                        </p:attrNameLst>
+                                      </p:cBhvr>
+                                      <p:to>
+                                        <p:strVal val="visible"/>
+                                      </p:to>
+                                    </p:set>
+                                    <p:animEffect transition="in" filter="fade">
+                                      <p:cBhvr>
+                                        <p:cTn id="24" dur="500"/>
+                                        <p:tgtEl>
+                                          <p:spTgt spid="12"/>
+                                        </p:tgtEl>
+                                      </p:cBhvr>
+                                    </p:animEffect>
+                                  </p:childTnLst>
+                                </p:cTn>
+                              </p:par>
+                            </p:childTnLst>
+                          </p:cTn>
+                        </p:par>
+                        <p:par>
+                          <p:cTn id="25" fill="hold">
+                            <p:stCondLst>
+                              <p:cond delay="3500"/>
+                            </p:stCondLst>
+                            <p:childTnLst>
+                              <p:par>
+                                <p:cTn id="26" presetID="10" presetClass="entr" presetSubtype="0" fill="hold" grpId="0" nodeType="afterEffect">
+                                  <p:stCondLst>
+                                    <p:cond delay="0"/>
+                                  </p:stCondLst>
+                                  <p:childTnLst>
+                                    <p:set>
+                                      <p:cBhvr>
+                                        <p:cTn id="27" dur="1" fill="hold">
+                                          <p:stCondLst>
+                                            <p:cond delay="0"/>
+                                          </p:stCondLst>
+                                        </p:cTn>
+                                        <p:tgtEl>
+                                          <p:spTgt spid="14"/>
+                                        </p:tgtEl>
+                                        <p:attrNameLst>
+                                          <p:attrName>style.visibility</p:attrName>
+                                        </p:attrNameLst>
+                                      </p:cBhvr>
+                                      <p:to>
+                                        <p:strVal val="visible"/>
+                                      </p:to>
+                                    </p:set>
+                                    <p:animEffect transition="in" filter="fade">
+                                      <p:cBhvr>
+                                        <p:cTn id="28" dur="500"/>
+                                        <p:tgtEl>
+                                          <p:spTgt spid="14"/>
+                                        </p:tgtEl>
+                                      </p:cBhvr>
+                                    </p:animEffect>
+                                  </p:childTnLst>
+                                </p:cTn>
+                              </p:par>
+                            </p:childTnLst>
+                          </p:cTn>
+                        </p:par>
+                      </p:childTnLst>
+                    </p:cTn>
+                  </p:par>
+                  <p:par>
+                    <p:cTn id="29" fill="hold">
+                      <p:stCondLst>
+                        <p:cond delay="indefinite"/>
+                      </p:stCondLst>
+                      <p:childTnLst>
+                        <p:par>
+                          <p:cTn id="30" fill="hold">
+                            <p:stCondLst>
+                              <p:cond delay="0"/>
+                            </p:stCondLst>
+                            <p:childTnLst>
+                              <p:par>
+                                <p:cTn id="31" presetID="2" presetClass="entr" presetSubtype="4" fill="hold" nodeType="clickEffect">
+                                  <p:stCondLst>
+                                    <p:cond delay="0"/>
+                                  </p:stCondLst>
+                                  <p:childTnLst>
+                                    <p:set>
+                                      <p:cBhvr>
+                                        <p:cTn id="32" dur="1" fill="hold">
+                                          <p:stCondLst>
+                                            <p:cond delay="0"/>
+                                          </p:stCondLst>
+                                        </p:cTn>
+                                        <p:tgtEl>
+                                          <p:spTgt spid="2052"/>
+                                        </p:tgtEl>
+                                        <p:attrNameLst>
+                                          <p:attrName>style.visibility</p:attrName>
+                                        </p:attrNameLst>
+                                      </p:cBhvr>
+                                      <p:to>
+                                        <p:strVal val="visible"/>
+                                      </p:to>
+                                    </p:set>
+                                    <p:anim calcmode="lin" valueType="num">
+                                      <p:cBhvr additive="base">
+                                        <p:cTn id="33" dur="500" fill="hold"/>
+                                        <p:tgtEl>
+                                          <p:spTgt spid="2052"/>
+                                        </p:tgtEl>
+                                        <p:attrNameLst>
+                                          <p:attrName>ppt_x</p:attrName>
+                                        </p:attrNameLst>
+                                      </p:cBhvr>
+                                      <p:tavLst>
+                                        <p:tav tm="0">
+                                          <p:val>
+                                            <p:strVal val="#ppt_x"/>
+                                          </p:val>
+                                        </p:tav>
+                                        <p:tav tm="100000">
+                                          <p:val>
+                                            <p:strVal val="#ppt_x"/>
+                                          </p:val>
+                                        </p:tav>
+                                      </p:tavLst>
+                                    </p:anim>
+                                    <p:anim calcmode="lin" valueType="num">
+                                      <p:cBhvr additive="base">
+                                        <p:cTn id="34" dur="500" fill="hold"/>
+                                        <p:tgtEl>
+                                          <p:spTgt spid="2052"/>
+                                        </p:tgtEl>
+                                        <p:attrNameLst>
+                                          <p:attrName>ppt_y</p:attrName>
+                                        </p:attrNameLst>
+                                      </p:cBhvr>
+                                      <p:tavLst>
+                                        <p:tav tm="0">
+                                          <p:val>
+                                            <p:strVal val="1+#ppt_h/2"/>
+                                          </p:val>
+                                        </p:tav>
+                                        <p:tav tm="100000">
+                                          <p:val>
+                                            <p:strVal val="#ppt_y"/>
+                                          </p:val>
+                                        </p:tav>
+                                      </p:tavLst>
+                                    </p:anim>
+                                  </p:childTnLst>
+                                </p:cTn>
+                              </p:par>
+                            </p:childTnLst>
+                          </p:cTn>
+                        </p:par>
+                      </p:childTnLst>
+                    </p:cTn>
+                  </p:par>
+                  <p:par>
+                    <p:cTn id="35" fill="hold">
+                      <p:stCondLst>
+                        <p:cond delay="indefinite"/>
+                      </p:stCondLst>
+                      <p:childTnLst>
+                        <p:par>
+                          <p:cTn id="36" fill="hold">
+                            <p:stCondLst>
+                              <p:cond delay="0"/>
+                            </p:stCondLst>
+                            <p:childTnLst>
+                              <p:par>
+                                <p:cTn id="37" presetID="16" presetClass="entr" presetSubtype="21" fill="hold" nodeType="clickEffect">
+                                  <p:stCondLst>
+                                    <p:cond delay="0"/>
+                                  </p:stCondLst>
+                                  <p:childTnLst>
+                                    <p:set>
+                                      <p:cBhvr>
+                                        <p:cTn id="38" dur="1" fill="hold">
+                                          <p:stCondLst>
+                                            <p:cond delay="0"/>
+                                          </p:stCondLst>
+                                        </p:cTn>
+                                        <p:tgtEl>
+                                          <p:spTgt spid="17"/>
+                                        </p:tgtEl>
+                                        <p:attrNameLst>
+                                          <p:attrName>style.visibility</p:attrName>
+                                        </p:attrNameLst>
+                                      </p:cBhvr>
+                                      <p:to>
+                                        <p:strVal val="visible"/>
+                                      </p:to>
+                                    </p:set>
+                                    <p:animEffect transition="in" filter="barn(inVertical)">
+                                      <p:cBhvr>
+                                        <p:cTn id="39" dur="500"/>
+                                        <p:tgtEl>
+                                          <p:spTgt spid="17"/>
+                                        </p:tgtEl>
+                                      </p:cBhvr>
+                                    </p:animEffect>
+                                  </p:childTnLst>
+                                </p:cTn>
+                              </p:par>
+                              <p:par>
+                                <p:cTn id="40" presetID="16" presetClass="entr" presetSubtype="21" fill="hold" grpId="0" nodeType="withEffect">
+                                  <p:stCondLst>
+                                    <p:cond delay="0"/>
+                                  </p:stCondLst>
+                                  <p:childTnLst>
+                                    <p:set>
+                                      <p:cBhvr>
+                                        <p:cTn id="41" dur="1" fill="hold">
+                                          <p:stCondLst>
+                                            <p:cond delay="0"/>
+                                          </p:stCondLst>
+                                        </p:cTn>
+                                        <p:tgtEl>
+                                          <p:spTgt spid="15"/>
+                                        </p:tgtEl>
+                                        <p:attrNameLst>
+                                          <p:attrName>style.visibility</p:attrName>
+                                        </p:attrNameLst>
+                                      </p:cBhvr>
+                                      <p:to>
+                                        <p:strVal val="visible"/>
+                                      </p:to>
+                                    </p:set>
+                                    <p:animEffect transition="in" filter="barn(inVertical)">
+                                      <p:cBhvr>
+                                        <p:cTn id="42" dur="500"/>
+                                        <p:tgtEl>
+                                          <p:spTgt spid="15"/>
+                                        </p:tgtEl>
+                                      </p:cBhvr>
+                                    </p:animEffect>
+                                  </p:childTnLst>
+                                </p:cTn>
+                              </p:par>
+                              <p:par>
+                                <p:cTn id="43" presetID="16" presetClass="entr" presetSubtype="21" fill="hold" nodeType="withEffect">
+                                  <p:stCondLst>
+                                    <p:cond delay="0"/>
+                                  </p:stCondLst>
+                                  <p:childTnLst>
+                                    <p:set>
+                                      <p:cBhvr>
+                                        <p:cTn id="44" dur="1" fill="hold">
+                                          <p:stCondLst>
+                                            <p:cond delay="0"/>
+                                          </p:stCondLst>
+                                        </p:cTn>
+                                        <p:tgtEl>
+                                          <p:spTgt spid="21"/>
+                                        </p:tgtEl>
+                                        <p:attrNameLst>
+                                          <p:attrName>style.visibility</p:attrName>
+                                        </p:attrNameLst>
+                                      </p:cBhvr>
+                                      <p:to>
+                                        <p:strVal val="visible"/>
+                                      </p:to>
+                                    </p:set>
+                                    <p:animEffect transition="in" filter="barn(inVertical)">
+                                      <p:cBhvr>
+                                        <p:cTn id="45" dur="500"/>
+                                        <p:tgtEl>
+                                          <p:spTgt spid="21"/>
+                                        </p:tgtEl>
+                                      </p:cBhvr>
+                                    </p:animEffect>
+                                  </p:childTnLst>
+                                </p:cTn>
+                              </p:par>
+                              <p:par>
+                                <p:cTn id="46" presetID="16" presetClass="entr" presetSubtype="21" fill="hold" nodeType="withEffect">
+                                  <p:stCondLst>
+                                    <p:cond delay="0"/>
+                                  </p:stCondLst>
+                                  <p:childTnLst>
+                                    <p:set>
+                                      <p:cBhvr>
+                                        <p:cTn id="47" dur="1" fill="hold">
+                                          <p:stCondLst>
+                                            <p:cond delay="0"/>
+                                          </p:stCondLst>
+                                        </p:cTn>
+                                        <p:tgtEl>
+                                          <p:spTgt spid="22"/>
+                                        </p:tgtEl>
+                                        <p:attrNameLst>
+                                          <p:attrName>style.visibility</p:attrName>
+                                        </p:attrNameLst>
+                                      </p:cBhvr>
+                                      <p:to>
+                                        <p:strVal val="visible"/>
+                                      </p:to>
+                                    </p:set>
+                                    <p:animEffect transition="in" filter="barn(inVertical)">
+                                      <p:cBhvr>
+                                        <p:cTn id="48" dur="500"/>
+                                        <p:tgtEl>
+                                          <p:spTgt spid="22"/>
+                                        </p:tgtEl>
+                                      </p:cBhvr>
+                                    </p:animEffect>
+                                  </p:childTnLst>
+                                </p:cTn>
+                              </p:par>
+                              <p:par>
+                                <p:cTn id="49" presetID="16" presetClass="entr" presetSubtype="21" fill="hold" grpId="0" nodeType="withEffect">
+                                  <p:stCondLst>
+                                    <p:cond delay="0"/>
+                                  </p:stCondLst>
+                                  <p:childTnLst>
+                                    <p:set>
+                                      <p:cBhvr>
+                                        <p:cTn id="50" dur="1" fill="hold">
+                                          <p:stCondLst>
+                                            <p:cond delay="0"/>
+                                          </p:stCondLst>
+                                        </p:cTn>
+                                        <p:tgtEl>
+                                          <p:spTgt spid="29"/>
+                                        </p:tgtEl>
+                                        <p:attrNameLst>
+                                          <p:attrName>style.visibility</p:attrName>
+                                        </p:attrNameLst>
+                                      </p:cBhvr>
+                                      <p:to>
+                                        <p:strVal val="visible"/>
+                                      </p:to>
+                                    </p:set>
+                                    <p:animEffect transition="in" filter="barn(inVertical)">
+                                      <p:cBhvr>
+                                        <p:cTn id="51" dur="500"/>
+                                        <p:tgtEl>
+                                          <p:spTgt spid="29"/>
+                                        </p:tgtEl>
+                                      </p:cBhvr>
+                                    </p:animEffect>
+                                  </p:childTnLst>
+                                </p:cTn>
+                              </p:par>
+                            </p:childTnLst>
+                          </p:cTn>
+                        </p:par>
+                      </p:childTnLst>
+                    </p:cTn>
+                  </p:par>
+                </p:childTnLst>
+              </p:cTn>
+              <p:prevCondLst>
+                <p:cond evt="onPrev" delay="0">
+                  <p:tgtEl>
+                    <p:sldTgt/>
+                  </p:tgtEl>
+                </p:cond>
+              </p:prevCondLst>
+              <p:nextCondLst>
+                <p:cond evt="onNext" delay="0">
+                  <p:tgtEl>
+                    <p:sldTgt/>
+                  </p:tgtEl>
+                </p:cond>
+              </p:nextCondLst>
+            </p:seq>
+          </p:childTnLst>
+        </p:cTn>
+      </p:par>
+    </p:tnLst>
+    <p:bldLst>
+      <p:bldP spid="9" grpId="0"/>
+      <p:bldP spid="14" grpId="0"/>
+      <p:bldP spid="15" grpId="0"/>
+      <p:bldP spid="29" grpId="0"/>
+    </p:bldLst>
+  </p:timing>
 </p:sld>
 </file>
 
@@ -5370,4 +7573,299 @@
     </a:ext>
   </a:extLst>
 </a:theme>
+</file>
+
+<file path=ppt/theme/theme2.xml><?xml version="1.0" encoding="utf-8"?>
+<a:theme xmlns:a="http://schemas.openxmlformats.org/drawingml/2006/main" name="Office Theme">
+  <a:themeElements>
+    <a:clrScheme name="Office">
+      <a:dk1>
+        <a:sysClr val="windowText" lastClr="000000"/>
+      </a:dk1>
+      <a:lt1>
+        <a:sysClr val="window" lastClr="FFFFFF"/>
+      </a:lt1>
+      <a:dk2>
+        <a:srgbClr val="44546A"/>
+      </a:dk2>
+      <a:lt2>
+        <a:srgbClr val="E7E6E6"/>
+      </a:lt2>
+      <a:accent1>
+        <a:srgbClr val="4472C4"/>
+      </a:accent1>
+      <a:accent2>
+        <a:srgbClr val="ED7D31"/>
+      </a:accent2>
+      <a:accent3>
+        <a:srgbClr val="A5A5A5"/>
+      </a:accent3>
+      <a:accent4>
+        <a:srgbClr val="FFC000"/>
+      </a:accent4>
+      <a:accent5>
+        <a:srgbClr val="5B9BD5"/>
+      </a:accent5>
+      <a:accent6>
+        <a:srgbClr val="70AD47"/>
+      </a:accent6>
+      <a:hlink>
+        <a:srgbClr val="0563C1"/>
+      </a:hlink>
+      <a:folHlink>
+        <a:srgbClr val="954F72"/>
+      </a:folHlink>
+    </a:clrScheme>
+    <a:fontScheme name="Office">
+      <a:majorFont>
+        <a:latin typeface="Calibri Light" panose="020F0302020204030204"/>
+        <a:ea typeface=""/>
+        <a:cs typeface=""/>
+        <a:font script="Jpan" typeface="游ゴシック Light"/>
+        <a:font script="Hang" typeface="맑은 고딕"/>
+        <a:font script="Hans" typeface="等线 Light"/>
+        <a:font script="Hant" typeface="新細明體"/>
+        <a:font script="Arab" typeface="Times New Roman"/>
+        <a:font script="Hebr" typeface="Times New Roman"/>
+        <a:font script="Thai" typeface="Angsana New"/>
+        <a:font script="Ethi" typeface="Nyala"/>
+        <a:font script="Beng" typeface="Vrinda"/>
+        <a:font script="Gujr" typeface="Shruti"/>
+        <a:font script="Khmr" typeface="MoolBoran"/>
+        <a:font script="Knda" typeface="Tunga"/>
+        <a:font script="Guru" typeface="Raavi"/>
+        <a:font script="Cans" typeface="Euphemia"/>
+        <a:font script="Cher" typeface="Plantagenet Cherokee"/>
+        <a:font script="Yiii" typeface="Microsoft Yi Baiti"/>
+        <a:font script="Tibt" typeface="Microsoft Himalaya"/>
+        <a:font script="Thaa" typeface="MV Boli"/>
+        <a:font script="Deva" typeface="Mangal"/>
+        <a:font script="Telu" typeface="Gautami"/>
+        <a:font script="Taml" typeface="Latha"/>
+        <a:font script="Syrc" typeface="Estrangelo Edessa"/>
+        <a:font script="Orya" typeface="Kalinga"/>
+        <a:font script="Mlym" typeface="Kartika"/>
+        <a:font script="Laoo" typeface="DokChampa"/>
+        <a:font script="Sinh" typeface="Iskoola Pota"/>
+        <a:font script="Mong" typeface="Mongolian Baiti"/>
+        <a:font script="Viet" typeface="Times New Roman"/>
+        <a:font script="Uigh" typeface="Microsoft Uighur"/>
+        <a:font script="Geor" typeface="Sylfaen"/>
+        <a:font script="Armn" typeface="Arial"/>
+        <a:font script="Bugi" typeface="Leelawadee UI"/>
+        <a:font script="Bopo" typeface="Microsoft JhengHei"/>
+        <a:font script="Java" typeface="Javanese Text"/>
+        <a:font script="Lisu" typeface="Segoe UI"/>
+        <a:font script="Mymr" typeface="Myanmar Text"/>
+        <a:font script="Nkoo" typeface="Ebrima"/>
+        <a:font script="Olck" typeface="Nirmala UI"/>
+        <a:font script="Osma" typeface="Ebrima"/>
+        <a:font script="Phag" typeface="Phagspa"/>
+        <a:font script="Syrn" typeface="Estrangelo Edessa"/>
+        <a:font script="Syrj" typeface="Estrangelo Edessa"/>
+        <a:font script="Syre" typeface="Estrangelo Edessa"/>
+        <a:font script="Sora" typeface="Nirmala UI"/>
+        <a:font script="Tale" typeface="Microsoft Tai Le"/>
+        <a:font script="Talu" typeface="Microsoft New Tai Lue"/>
+        <a:font script="Tfng" typeface="Ebrima"/>
+      </a:majorFont>
+      <a:minorFont>
+        <a:latin typeface="Calibri" panose="020F0502020204030204"/>
+        <a:ea typeface=""/>
+        <a:cs typeface=""/>
+        <a:font script="Jpan" typeface="游ゴシック"/>
+        <a:font script="Hang" typeface="맑은 고딕"/>
+        <a:font script="Hans" typeface="等线"/>
+        <a:font script="Hant" typeface="新細明體"/>
+        <a:font script="Arab" typeface="Arial"/>
+        <a:font script="Hebr" typeface="Arial"/>
+        <a:font script="Thai" typeface="Cordia New"/>
+        <a:font script="Ethi" typeface="Nyala"/>
+        <a:font script="Beng" typeface="Vrinda"/>
+        <a:font script="Gujr" typeface="Shruti"/>
+        <a:font script="Khmr" typeface="DaunPenh"/>
+        <a:font script="Knda" typeface="Tunga"/>
+        <a:font script="Guru" typeface="Raavi"/>
+        <a:font script="Cans" typeface="Euphemia"/>
+        <a:font script="Cher" typeface="Plantagenet Cherokee"/>
+        <a:font script="Yiii" typeface="Microsoft Yi Baiti"/>
+        <a:font script="Tibt" typeface="Microsoft Himalaya"/>
+        <a:font script="Thaa" typeface="MV Boli"/>
+        <a:font script="Deva" typeface="Mangal"/>
+        <a:font script="Telu" typeface="Gautami"/>
+        <a:font script="Taml" typeface="Latha"/>
+        <a:font script="Syrc" typeface="Estrangelo Edessa"/>
+        <a:font script="Orya" typeface="Kalinga"/>
+        <a:font script="Mlym" typeface="Kartika"/>
+        <a:font script="Laoo" typeface="DokChampa"/>
+        <a:font script="Sinh" typeface="Iskoola Pota"/>
+        <a:font script="Mong" typeface="Mongolian Baiti"/>
+        <a:font script="Viet" typeface="Arial"/>
+        <a:font script="Uigh" typeface="Microsoft Uighur"/>
+        <a:font script="Geor" typeface="Sylfaen"/>
+        <a:font script="Armn" typeface="Arial"/>
+        <a:font script="Bugi" typeface="Leelawadee UI"/>
+        <a:font script="Bopo" typeface="Microsoft JhengHei"/>
+        <a:font script="Java" typeface="Javanese Text"/>
+        <a:font script="Lisu" typeface="Segoe UI"/>
+        <a:font script="Mymr" typeface="Myanmar Text"/>
+        <a:font script="Nkoo" typeface="Ebrima"/>
+        <a:font script="Olck" typeface="Nirmala UI"/>
+        <a:font script="Osma" typeface="Ebrima"/>
+        <a:font script="Phag" typeface="Phagspa"/>
+        <a:font script="Syrn" typeface="Estrangelo Edessa"/>
+        <a:font script="Syrj" typeface="Estrangelo Edessa"/>
+        <a:font script="Syre" typeface="Estrangelo Edessa"/>
+        <a:font script="Sora" typeface="Nirmala UI"/>
+        <a:font script="Tale" typeface="Microsoft Tai Le"/>
+        <a:font script="Talu" typeface="Microsoft New Tai Lue"/>
+        <a:font script="Tfng" typeface="Ebrima"/>
+      </a:minorFont>
+    </a:fontScheme>
+    <a:fmtScheme name="Office">
+      <a:fillStyleLst>
+        <a:solidFill>
+          <a:schemeClr val="phClr"/>
+        </a:solidFill>
+        <a:gradFill rotWithShape="1">
+          <a:gsLst>
+            <a:gs pos="0">
+              <a:schemeClr val="phClr">
+                <a:lumMod val="110000"/>
+                <a:satMod val="105000"/>
+                <a:tint val="67000"/>
+              </a:schemeClr>
+            </a:gs>
+            <a:gs pos="50000">
+              <a:schemeClr val="phClr">
+                <a:lumMod val="105000"/>
+                <a:satMod val="103000"/>
+                <a:tint val="73000"/>
+              </a:schemeClr>
+            </a:gs>
+            <a:gs pos="100000">
+              <a:schemeClr val="phClr">
+                <a:lumMod val="105000"/>
+                <a:satMod val="109000"/>
+                <a:tint val="81000"/>
+              </a:schemeClr>
+            </a:gs>
+          </a:gsLst>
+          <a:lin ang="5400000" scaled="0"/>
+        </a:gradFill>
+        <a:gradFill rotWithShape="1">
+          <a:gsLst>
+            <a:gs pos="0">
+              <a:schemeClr val="phClr">
+                <a:satMod val="103000"/>
+                <a:lumMod val="102000"/>
+                <a:tint val="94000"/>
+              </a:schemeClr>
+            </a:gs>
+            <a:gs pos="50000">
+              <a:schemeClr val="phClr">
+                <a:satMod val="110000"/>
+                <a:lumMod val="100000"/>
+                <a:shade val="100000"/>
+              </a:schemeClr>
+            </a:gs>
+            <a:gs pos="100000">
+              <a:schemeClr val="phClr">
+                <a:lumMod val="99000"/>
+                <a:satMod val="120000"/>
+                <a:shade val="78000"/>
+              </a:schemeClr>
+            </a:gs>
+          </a:gsLst>
+          <a:lin ang="5400000" scaled="0"/>
+        </a:gradFill>
+      </a:fillStyleLst>
+      <a:lnStyleLst>
+        <a:ln w="6350" cap="flat" cmpd="sng" algn="ctr">
+          <a:solidFill>
+            <a:schemeClr val="phClr"/>
+          </a:solidFill>
+          <a:prstDash val="solid"/>
+          <a:miter lim="800000"/>
+        </a:ln>
+        <a:ln w="12700" cap="flat" cmpd="sng" algn="ctr">
+          <a:solidFill>
+            <a:schemeClr val="phClr"/>
+          </a:solidFill>
+          <a:prstDash val="solid"/>
+          <a:miter lim="800000"/>
+        </a:ln>
+        <a:ln w="19050" cap="flat" cmpd="sng" algn="ctr">
+          <a:solidFill>
+            <a:schemeClr val="phClr"/>
+          </a:solidFill>
+          <a:prstDash val="solid"/>
+          <a:miter lim="800000"/>
+        </a:ln>
+      </a:lnStyleLst>
+      <a:effectStyleLst>
+        <a:effectStyle>
+          <a:effectLst/>
+        </a:effectStyle>
+        <a:effectStyle>
+          <a:effectLst/>
+        </a:effectStyle>
+        <a:effectStyle>
+          <a:effectLst>
+            <a:outerShdw blurRad="57150" dist="19050" dir="5400000" algn="ctr" rotWithShape="0">
+              <a:srgbClr val="000000">
+                <a:alpha val="63000"/>
+              </a:srgbClr>
+            </a:outerShdw>
+          </a:effectLst>
+        </a:effectStyle>
+      </a:effectStyleLst>
+      <a:bgFillStyleLst>
+        <a:solidFill>
+          <a:schemeClr val="phClr"/>
+        </a:solidFill>
+        <a:solidFill>
+          <a:schemeClr val="phClr">
+            <a:tint val="95000"/>
+            <a:satMod val="170000"/>
+          </a:schemeClr>
+        </a:solidFill>
+        <a:gradFill rotWithShape="1">
+          <a:gsLst>
+            <a:gs pos="0">
+              <a:schemeClr val="phClr">
+                <a:tint val="93000"/>
+                <a:satMod val="150000"/>
+                <a:shade val="98000"/>
+                <a:lumMod val="102000"/>
+              </a:schemeClr>
+            </a:gs>
+            <a:gs pos="50000">
+              <a:schemeClr val="phClr">
+                <a:tint val="98000"/>
+                <a:satMod val="130000"/>
+                <a:shade val="90000"/>
+                <a:lumMod val="103000"/>
+              </a:schemeClr>
+            </a:gs>
+            <a:gs pos="100000">
+              <a:schemeClr val="phClr">
+                <a:shade val="63000"/>
+                <a:satMod val="120000"/>
+              </a:schemeClr>
+            </a:gs>
+          </a:gsLst>
+          <a:lin ang="5400000" scaled="0"/>
+        </a:gradFill>
+      </a:bgFillStyleLst>
+    </a:fmtScheme>
+  </a:themeElements>
+  <a:objectDefaults/>
+  <a:extraClrSchemeLst/>
+  <a:extLst>
+    <a:ext uri="{05A4C25C-085E-4340-85A3-A5531E510DB2}">
+      <thm15:themeFamily xmlns:thm15="http://schemas.microsoft.com/office/thememl/2012/main" name="Office Theme" id="{62F939B6-93AF-4DB8-9C6B-D6C7DFDC589F}" vid="{4A3C46E8-61CC-4603-A589-7422A47A8E4A}"/>
+    </a:ext>
+  </a:extLst>
+</a:theme>
 </file>
</xml_diff>

<commit_message>
Cleaned up stuff, but haven't added animations yet. Plan on doing the PR once that is done.
</commit_message>
<xml_diff>
--- a/vishal-sensors-lecture/Sensor Lecture.pptx
+++ b/vishal-sensors-lecture/Sensor Lecture.pptx
@@ -5,27 +5,26 @@
     <p:sldMasterId id="2147483648" r:id="rId1"/>
   </p:sldMasterIdLst>
   <p:notesMasterIdLst>
-    <p:notesMasterId r:id="rId20"/>
+    <p:notesMasterId r:id="rId19"/>
   </p:notesMasterIdLst>
   <p:sldIdLst>
     <p:sldId id="256" r:id="rId2"/>
     <p:sldId id="257" r:id="rId3"/>
-    <p:sldId id="258" r:id="rId4"/>
-    <p:sldId id="259" r:id="rId5"/>
-    <p:sldId id="260" r:id="rId6"/>
-    <p:sldId id="261" r:id="rId7"/>
-    <p:sldId id="262" r:id="rId8"/>
-    <p:sldId id="263" r:id="rId9"/>
-    <p:sldId id="264" r:id="rId10"/>
-    <p:sldId id="265" r:id="rId11"/>
-    <p:sldId id="266" r:id="rId12"/>
-    <p:sldId id="267" r:id="rId13"/>
-    <p:sldId id="268" r:id="rId14"/>
-    <p:sldId id="269" r:id="rId15"/>
-    <p:sldId id="270" r:id="rId16"/>
-    <p:sldId id="272" r:id="rId17"/>
-    <p:sldId id="273" r:id="rId18"/>
-    <p:sldId id="271" r:id="rId19"/>
+    <p:sldId id="259" r:id="rId4"/>
+    <p:sldId id="260" r:id="rId5"/>
+    <p:sldId id="261" r:id="rId6"/>
+    <p:sldId id="262" r:id="rId7"/>
+    <p:sldId id="263" r:id="rId8"/>
+    <p:sldId id="264" r:id="rId9"/>
+    <p:sldId id="265" r:id="rId10"/>
+    <p:sldId id="266" r:id="rId11"/>
+    <p:sldId id="267" r:id="rId12"/>
+    <p:sldId id="268" r:id="rId13"/>
+    <p:sldId id="269" r:id="rId14"/>
+    <p:sldId id="270" r:id="rId15"/>
+    <p:sldId id="272" r:id="rId16"/>
+    <p:sldId id="273" r:id="rId17"/>
+    <p:sldId id="271" r:id="rId18"/>
   </p:sldIdLst>
   <p:sldSz cx="12192000" cy="6858000"/>
   <p:notesSz cx="6858000" cy="9144000"/>
@@ -553,7 +552,7 @@
           <a:p>
             <a:fld id="{1B057D52-65A4-4642-8DCB-0D0611C8D40C}" type="slidenum">
               <a:rPr lang="en-US" smtClean="0"/>
-              <a:t>16</a:t>
+              <a:t>15</a:t>
             </a:fld>
             <a:endParaRPr lang="en-US"/>
           </a:p>
@@ -640,7 +639,7 @@
           <a:p>
             <a:fld id="{1B057D52-65A4-4642-8DCB-0D0611C8D40C}" type="slidenum">
               <a:rPr lang="en-US" smtClean="0"/>
-              <a:t>18</a:t>
+              <a:t>17</a:t>
             </a:fld>
             <a:endParaRPr lang="en-US"/>
           </a:p>
@@ -3512,7 +3511,7 @@
           <a:p>
             <a:r>
               <a:rPr lang="en-US" dirty="0" err="1"/>
-              <a:t>Senorssss</a:t>
+              <a:t>Sensorssss</a:t>
             </a:r>
             <a:endParaRPr lang="en-US" dirty="0"/>
           </a:p>
@@ -3554,118 +3553,6 @@
 </file>
 
 <file path=ppt/slides/slide10.xml><?xml version="1.0" encoding="utf-8"?>
-<p:sld xmlns:a="http://schemas.openxmlformats.org/drawingml/2006/main" xmlns:r="http://schemas.openxmlformats.org/officeDocument/2006/relationships" xmlns:p="http://schemas.openxmlformats.org/presentationml/2006/main">
-  <p:cSld>
-    <p:spTree>
-      <p:nvGrpSpPr>
-        <p:cNvPr id="1" name=""/>
-        <p:cNvGrpSpPr/>
-        <p:nvPr/>
-      </p:nvGrpSpPr>
-      <p:grpSpPr>
-        <a:xfrm>
-          <a:off x="0" y="0"/>
-          <a:ext cx="0" cy="0"/>
-          <a:chOff x="0" y="0"/>
-          <a:chExt cx="0" cy="0"/>
-        </a:xfrm>
-      </p:grpSpPr>
-      <p:sp>
-        <p:nvSpPr>
-          <p:cNvPr id="2" name="Title 1"/>
-          <p:cNvSpPr>
-            <a:spLocks noGrp="1"/>
-          </p:cNvSpPr>
-          <p:nvPr>
-            <p:ph type="title"/>
-          </p:nvPr>
-        </p:nvSpPr>
-        <p:spPr/>
-        <p:txBody>
-          <a:bodyPr/>
-          <a:lstStyle/>
-          <a:p>
-            <a:r>
-              <a:rPr lang="en-US" dirty="0"/>
-              <a:t>Cool thing that looks like an equalizer</a:t>
-            </a:r>
-          </a:p>
-        </p:txBody>
-      </p:sp>
-      <p:sp>
-        <p:nvSpPr>
-          <p:cNvPr id="3" name="Content Placeholder 2"/>
-          <p:cNvSpPr>
-            <a:spLocks noGrp="1"/>
-          </p:cNvSpPr>
-          <p:nvPr>
-            <p:ph idx="1"/>
-          </p:nvPr>
-        </p:nvSpPr>
-        <p:spPr/>
-        <p:txBody>
-          <a:bodyPr/>
-          <a:lstStyle/>
-          <a:p>
-            <a:endParaRPr lang="en-US"/>
-          </a:p>
-        </p:txBody>
-      </p:sp>
-      <p:pic>
-        <p:nvPicPr>
-          <p:cNvPr id="8194" name="Picture 2" descr="https://cdn-learn.adafruit.com/guides/images/000/000/179/medium800/2013_01_12_IMG_1168-1024.jpg?1448301118"/>
-          <p:cNvPicPr>
-            <a:picLocks noChangeAspect="1" noChangeArrowheads="1"/>
-          </p:cNvPicPr>
-          <p:nvPr/>
-        </p:nvPicPr>
-        <p:blipFill>
-          <a:blip r:embed="rId2">
-            <a:extLst>
-              <a:ext uri="{28A0092B-C50C-407E-A947-70E740481C1C}">
-                <a14:useLocalDpi xmlns:a14="http://schemas.microsoft.com/office/drawing/2010/main" val="0"/>
-              </a:ext>
-            </a:extLst>
-          </a:blip>
-          <a:srcRect/>
-          <a:stretch>
-            <a:fillRect/>
-          </a:stretch>
-        </p:blipFill>
-        <p:spPr bwMode="auto">
-          <a:xfrm>
-            <a:off x="2738486" y="1550465"/>
-            <a:ext cx="7620000" cy="5076825"/>
-          </a:xfrm>
-          <a:prstGeom prst="rect">
-            <a:avLst/>
-          </a:prstGeom>
-          <a:noFill/>
-          <a:extLst>
-            <a:ext uri="{909E8E84-426E-40DD-AFC4-6F175D3DCCD1}">
-              <a14:hiddenFill xmlns:a14="http://schemas.microsoft.com/office/drawing/2010/main">
-                <a:solidFill>
-                  <a:srgbClr val="FFFFFF"/>
-                </a:solidFill>
-              </a14:hiddenFill>
-            </a:ext>
-          </a:extLst>
-        </p:spPr>
-      </p:pic>
-    </p:spTree>
-    <p:extLst>
-      <p:ext uri="{BB962C8B-B14F-4D97-AF65-F5344CB8AC3E}">
-        <p14:creationId xmlns:p14="http://schemas.microsoft.com/office/powerpoint/2010/main" val="2204098774"/>
-      </p:ext>
-    </p:extLst>
-  </p:cSld>
-  <p:clrMapOvr>
-    <a:masterClrMapping/>
-  </p:clrMapOvr>
-</p:sld>
-</file>
-
-<file path=ppt/slides/slide11.xml><?xml version="1.0" encoding="utf-8"?>
 <p:sld xmlns:a="http://schemas.openxmlformats.org/drawingml/2006/main" xmlns:r="http://schemas.openxmlformats.org/officeDocument/2006/relationships" xmlns:p="http://schemas.openxmlformats.org/presentationml/2006/main">
   <p:cSld>
     <p:spTree>
@@ -3822,7 +3709,7 @@
 </p:sld>
 </file>
 
-<file path=ppt/slides/slide12.xml><?xml version="1.0" encoding="utf-8"?>
+<file path=ppt/slides/slide11.xml><?xml version="1.0" encoding="utf-8"?>
 <p:sld xmlns:a="http://schemas.openxmlformats.org/drawingml/2006/main" xmlns:r="http://schemas.openxmlformats.org/officeDocument/2006/relationships" xmlns:p="http://schemas.openxmlformats.org/presentationml/2006/main">
   <p:cSld>
     <p:spTree>
@@ -3939,7 +3826,7 @@
 </p:sld>
 </file>
 
-<file path=ppt/slides/slide13.xml><?xml version="1.0" encoding="utf-8"?>
+<file path=ppt/slides/slide12.xml><?xml version="1.0" encoding="utf-8"?>
 <p:sld xmlns:a="http://schemas.openxmlformats.org/drawingml/2006/main" xmlns:r="http://schemas.openxmlformats.org/officeDocument/2006/relationships" xmlns:p="http://schemas.openxmlformats.org/presentationml/2006/main">
   <p:cSld>
     <p:spTree>
@@ -4008,7 +3895,7 @@
           <a:p>
             <a:r>
               <a:rPr lang="en-US" sz="3500" dirty="0"/>
-              <a:t>Note that this is 3.3V</a:t>
+              <a:t>Note that this input is 3.3V</a:t>
             </a:r>
           </a:p>
           <a:p>
@@ -4262,7 +4149,7 @@
 </p:sld>
 </file>
 
-<file path=ppt/slides/slide14.xml><?xml version="1.0" encoding="utf-8"?>
+<file path=ppt/slides/slide13.xml><?xml version="1.0" encoding="utf-8"?>
 <p:sld xmlns:a="http://schemas.openxmlformats.org/drawingml/2006/main" xmlns:r="http://schemas.openxmlformats.org/officeDocument/2006/relationships" xmlns:p="http://schemas.openxmlformats.org/presentationml/2006/main">
   <p:cSld>
     <p:spTree>
@@ -4524,7 +4411,7 @@
 </p:sld>
 </file>
 
-<file path=ppt/slides/slide15.xml><?xml version="1.0" encoding="utf-8"?>
+<file path=ppt/slides/slide14.xml><?xml version="1.0" encoding="utf-8"?>
 <p:sld xmlns:a="http://schemas.openxmlformats.org/drawingml/2006/main" xmlns:r="http://schemas.openxmlformats.org/officeDocument/2006/relationships" xmlns:p="http://schemas.openxmlformats.org/presentationml/2006/main">
   <p:cSld>
     <p:spTree>
@@ -4641,7 +4528,7 @@
 </p:sld>
 </file>
 
-<file path=ppt/slides/slide16.xml><?xml version="1.0" encoding="utf-8"?>
+<file path=ppt/slides/slide15.xml><?xml version="1.0" encoding="utf-8"?>
 <p:sld xmlns:a="http://schemas.openxmlformats.org/drawingml/2006/main" xmlns:r="http://schemas.openxmlformats.org/officeDocument/2006/relationships" xmlns:p="http://schemas.openxmlformats.org/presentationml/2006/main">
   <p:cSld>
     <p:spTree>
@@ -4745,7 +4632,7 @@
 </p:sld>
 </file>
 
-<file path=ppt/slides/slide17.xml><?xml version="1.0" encoding="utf-8"?>
+<file path=ppt/slides/slide16.xml><?xml version="1.0" encoding="utf-8"?>
 <p:sld xmlns:a="http://schemas.openxmlformats.org/drawingml/2006/main" xmlns:r="http://schemas.openxmlformats.org/officeDocument/2006/relationships" xmlns:p="http://schemas.openxmlformats.org/presentationml/2006/main">
   <p:cSld>
     <p:spTree>
@@ -4762,110 +4649,6 @@
           <a:chExt cx="0" cy="0"/>
         </a:xfrm>
       </p:grpSpPr>
-      <p:sp>
-        <p:nvSpPr>
-          <p:cNvPr id="2" name="Title 1"/>
-          <p:cNvSpPr>
-            <a:spLocks noGrp="1"/>
-          </p:cNvSpPr>
-          <p:nvPr>
-            <p:ph type="title"/>
-          </p:nvPr>
-        </p:nvSpPr>
-        <p:spPr>
-          <a:xfrm>
-            <a:off x="838200" y="365125"/>
-            <a:ext cx="10515600" cy="1325563"/>
-          </a:xfrm>
-        </p:spPr>
-        <p:txBody>
-          <a:bodyPr/>
-          <a:lstStyle/>
-          <a:p>
-            <a:r>
-              <a:rPr lang="en-US" dirty="0"/>
-              <a:t>Arduino Communication</a:t>
-            </a:r>
-          </a:p>
-        </p:txBody>
-      </p:sp>
-      <p:sp>
-        <p:nvSpPr>
-          <p:cNvPr id="3" name="Content Placeholder 2"/>
-          <p:cNvSpPr>
-            <a:spLocks noGrp="1"/>
-          </p:cNvSpPr>
-          <p:nvPr>
-            <p:ph idx="1"/>
-          </p:nvPr>
-        </p:nvSpPr>
-        <p:spPr/>
-        <p:txBody>
-          <a:bodyPr/>
-          <a:lstStyle/>
-          <a:p>
-            <a:r>
-              <a:rPr lang="en-US" dirty="0"/>
-              <a:t>Arduinos have analog and digital pins</a:t>
-            </a:r>
-          </a:p>
-          <a:p>
-            <a:r>
-              <a:rPr lang="en-US" dirty="0"/>
-              <a:t>Digital: </a:t>
-            </a:r>
-          </a:p>
-          <a:p>
-            <a:pPr lvl="1"/>
-            <a:r>
-              <a:rPr lang="en-US" dirty="0"/>
-              <a:t>Can send power 0 – 5V (or 3.3V on some other </a:t>
-            </a:r>
-            <a:r>
-              <a:rPr lang="en-US" dirty="0" err="1"/>
-              <a:t>Arudino</a:t>
-            </a:r>
-            <a:r>
-              <a:rPr lang="en-US" dirty="0"/>
-              <a:t> models)</a:t>
-            </a:r>
-          </a:p>
-          <a:p>
-            <a:pPr lvl="2"/>
-            <a:r>
-              <a:rPr lang="en-US" dirty="0"/>
-              <a:t>Special PWM pins (denoted by ~) can send between 0 and 5V</a:t>
-            </a:r>
-          </a:p>
-          <a:p>
-            <a:pPr lvl="1"/>
-            <a:r>
-              <a:rPr lang="en-US" dirty="0"/>
-              <a:t>Can read inputs, but not the intensity of it (just on or off)</a:t>
-            </a:r>
-          </a:p>
-          <a:p>
-            <a:r>
-              <a:rPr lang="en-US" dirty="0"/>
-              <a:t>Analog</a:t>
-            </a:r>
-          </a:p>
-          <a:p>
-            <a:pPr lvl="1"/>
-            <a:r>
-              <a:rPr lang="en-US" dirty="0"/>
-              <a:t>Can only read, but can read the intensity of an input</a:t>
-            </a:r>
-          </a:p>
-          <a:p>
-            <a:pPr lvl="1"/>
-            <a:r>
-              <a:rPr lang="en-US" dirty="0"/>
-              <a:t>Reported as a number between 0 – 1023 (scaled 0 – 5V)</a:t>
-            </a:r>
-          </a:p>
-        </p:txBody>
-      </p:sp>
       <p:pic>
         <p:nvPicPr>
           <p:cNvPr id="1026" name="Picture 2" descr="http://static.arduino.org/media/k2/galleries/90/A000066-Arduino-Uno-TH-1front.jpg"/>
@@ -4889,7 +4672,7 @@
         </p:blipFill>
         <p:spPr bwMode="auto">
           <a:xfrm>
-            <a:off x="7956222" y="-128686"/>
+            <a:off x="7883951" y="3320192"/>
             <a:ext cx="4308049" cy="3231037"/>
           </a:xfrm>
           <a:prstGeom prst="rect">
@@ -4907,6 +4690,115 @@
           </a:extLst>
         </p:spPr>
       </p:pic>
+      <p:sp>
+        <p:nvSpPr>
+          <p:cNvPr id="2" name="Title 1"/>
+          <p:cNvSpPr>
+            <a:spLocks noGrp="1"/>
+          </p:cNvSpPr>
+          <p:nvPr>
+            <p:ph type="title"/>
+          </p:nvPr>
+        </p:nvSpPr>
+        <p:spPr>
+          <a:xfrm>
+            <a:off x="838200" y="365125"/>
+            <a:ext cx="10515600" cy="1325563"/>
+          </a:xfrm>
+        </p:spPr>
+        <p:txBody>
+          <a:bodyPr/>
+          <a:lstStyle/>
+          <a:p>
+            <a:r>
+              <a:rPr lang="en-US" dirty="0"/>
+              <a:t>Arduino Communication</a:t>
+            </a:r>
+          </a:p>
+        </p:txBody>
+      </p:sp>
+      <p:sp>
+        <p:nvSpPr>
+          <p:cNvPr id="3" name="Content Placeholder 2"/>
+          <p:cNvSpPr>
+            <a:spLocks noGrp="1"/>
+          </p:cNvSpPr>
+          <p:nvPr>
+            <p:ph idx="1"/>
+          </p:nvPr>
+        </p:nvSpPr>
+        <p:spPr>
+          <a:xfrm>
+            <a:off x="510209" y="1690687"/>
+            <a:ext cx="10515600" cy="5773599"/>
+          </a:xfrm>
+        </p:spPr>
+        <p:txBody>
+          <a:bodyPr/>
+          <a:lstStyle/>
+          <a:p>
+            <a:r>
+              <a:rPr lang="en-US" dirty="0"/>
+              <a:t>Arduinos have analog and digital pins</a:t>
+            </a:r>
+          </a:p>
+          <a:p>
+            <a:r>
+              <a:rPr lang="en-US" dirty="0"/>
+              <a:t>Digital: </a:t>
+            </a:r>
+          </a:p>
+          <a:p>
+            <a:pPr lvl="1"/>
+            <a:r>
+              <a:rPr lang="en-US" dirty="0"/>
+              <a:t>Can send power 0 – 5V (or 3.3V on some other </a:t>
+            </a:r>
+            <a:r>
+              <a:rPr lang="en-US" dirty="0" err="1"/>
+              <a:t>Arudino</a:t>
+            </a:r>
+            <a:r>
+              <a:rPr lang="en-US" dirty="0"/>
+              <a:t> models)</a:t>
+            </a:r>
+          </a:p>
+          <a:p>
+            <a:pPr lvl="2"/>
+            <a:r>
+              <a:rPr lang="en-US" dirty="0"/>
+              <a:t>Special PWM pins (denoted by ~) can send between 0 and 5V</a:t>
+            </a:r>
+          </a:p>
+          <a:p>
+            <a:pPr lvl="1"/>
+            <a:r>
+              <a:rPr lang="en-US" dirty="0"/>
+              <a:t>Can read inputs, but not the intensity of it (just on or off)</a:t>
+            </a:r>
+          </a:p>
+          <a:p>
+            <a:r>
+              <a:rPr lang="en-US" dirty="0"/>
+              <a:t>Analog</a:t>
+            </a:r>
+          </a:p>
+          <a:p>
+            <a:pPr lvl="1"/>
+            <a:r>
+              <a:rPr lang="en-US" dirty="0"/>
+              <a:t>Can only read, but can read the intensity of an input</a:t>
+            </a:r>
+          </a:p>
+          <a:p>
+            <a:pPr lvl="1"/>
+            <a:r>
+              <a:rPr lang="en-US" dirty="0"/>
+              <a:t>Reported as a number between 0 – 1023 (scaled 0 – 5V)</a:t>
+            </a:r>
+          </a:p>
+        </p:txBody>
+      </p:sp>
     </p:spTree>
     <p:extLst>
       <p:ext uri="{BB962C8B-B14F-4D97-AF65-F5344CB8AC3E}">
@@ -4920,7 +4812,7 @@
 </p:sld>
 </file>
 
-<file path=ppt/slides/slide18.xml><?xml version="1.0" encoding="utf-8"?>
+<file path=ppt/slides/slide17.xml><?xml version="1.0" encoding="utf-8"?>
 <p:sld xmlns:a="http://schemas.openxmlformats.org/drawingml/2006/main" xmlns:r="http://schemas.openxmlformats.org/officeDocument/2006/relationships" xmlns:p="http://schemas.openxmlformats.org/presentationml/2006/main">
   <p:cSld>
     <p:spTree>
@@ -6137,7 +6029,19 @@
           <a:p>
             <a:r>
               <a:rPr lang="en-US" sz="3500" dirty="0"/>
-              <a:t>Works by providing a value from</a:t>
+              <a:t>The output voltage changes based on the temperature</a:t>
+            </a:r>
+          </a:p>
+          <a:p>
+            <a:r>
+              <a:rPr lang="en-US" sz="3500" dirty="0"/>
+              <a:t>Note the conversion factor is based off the microcontroller’s (Arduino’s) analog reading</a:t>
+            </a:r>
+          </a:p>
+          <a:p>
+            <a:r>
+              <a:rPr lang="en-US" sz="3500" dirty="0"/>
+              <a:t>5V is the max pin voltage for this</a:t>
             </a:r>
           </a:p>
           <a:p>
@@ -6146,22 +6050,7 @@
             </a:pPr>
             <a:r>
               <a:rPr lang="en-US" sz="3500" dirty="0"/>
-              <a:t>0-1023, which is delivered to an analog</a:t>
-            </a:r>
-          </a:p>
-          <a:p>
-            <a:pPr marL="0" indent="0">
-              <a:buNone/>
-            </a:pPr>
-            <a:r>
-              <a:rPr lang="en-US" sz="3500" dirty="0"/>
-              <a:t>Pin onto an Arduino</a:t>
-            </a:r>
-          </a:p>
-          <a:p>
-            <a:r>
-              <a:rPr lang="en-US" sz="3500" dirty="0"/>
-              <a:t>Mention the formula</a:t>
+              <a:t>specific microcontroller</a:t>
             </a:r>
           </a:p>
           <a:p>
@@ -6245,8 +6134,55 @@
         </p:blipFill>
         <p:spPr bwMode="auto">
           <a:xfrm>
-            <a:off x="7799453" y="1497013"/>
+            <a:off x="7799453" y="3437587"/>
             <a:ext cx="4392547" cy="3688769"/>
+          </a:xfrm>
+          <a:prstGeom prst="rect">
+            <a:avLst/>
+          </a:prstGeom>
+          <a:noFill/>
+          <a:extLst>
+            <a:ext uri="{909E8E84-426E-40DD-AFC4-6F175D3DCCD1}">
+              <a14:hiddenFill xmlns:a14="http://schemas.microsoft.com/office/drawing/2010/main">
+                <a:solidFill>
+                  <a:srgbClr val="FFFFFF"/>
+                </a:solidFill>
+              </a14:hiddenFill>
+            </a:ext>
+          </a:extLst>
+        </p:spPr>
+      </p:pic>
+      <p:pic>
+        <p:nvPicPr>
+          <p:cNvPr id="6" name="Picture 6" descr="https://i.gyazo.com/54c680e655ecf07a417ea7afef986cb3.png">
+            <a:extLst>
+              <a:ext uri="{FF2B5EF4-FFF2-40B4-BE49-F238E27FC236}">
+                <a16:creationId xmlns:a16="http://schemas.microsoft.com/office/drawing/2014/main" id="{42F92AC0-E88F-473A-8365-926FC1D7C7A9}"/>
+              </a:ext>
+            </a:extLst>
+          </p:cNvPr>
+          <p:cNvPicPr>
+            <a:picLocks noChangeAspect="1" noChangeArrowheads="1"/>
+          </p:cNvPicPr>
+          <p:nvPr/>
+        </p:nvPicPr>
+        <p:blipFill>
+          <a:blip r:embed="rId4">
+            <a:extLst>
+              <a:ext uri="{28A0092B-C50C-407E-A947-70E740481C1C}">
+                <a14:useLocalDpi xmlns:a14="http://schemas.microsoft.com/office/drawing/2010/main" val="0"/>
+              </a:ext>
+            </a:extLst>
+          </a:blip>
+          <a:srcRect/>
+          <a:stretch>
+            <a:fillRect/>
+          </a:stretch>
+        </p:blipFill>
+        <p:spPr bwMode="auto">
+          <a:xfrm>
+            <a:off x="5223850" y="4063362"/>
+            <a:ext cx="2836785" cy="3062994"/>
           </a:xfrm>
           <a:prstGeom prst="rect">
             <a:avLst/>
@@ -6277,118 +6213,6 @@
 </file>
 
 <file path=ppt/slides/slide3.xml><?xml version="1.0" encoding="utf-8"?>
-<p:sld xmlns:a="http://schemas.openxmlformats.org/drawingml/2006/main" xmlns:r="http://schemas.openxmlformats.org/officeDocument/2006/relationships" xmlns:p="http://schemas.openxmlformats.org/presentationml/2006/main">
-  <p:cSld>
-    <p:spTree>
-      <p:nvGrpSpPr>
-        <p:cNvPr id="1" name=""/>
-        <p:cNvGrpSpPr/>
-        <p:nvPr/>
-      </p:nvGrpSpPr>
-      <p:grpSpPr>
-        <a:xfrm>
-          <a:off x="0" y="0"/>
-          <a:ext cx="0" cy="0"/>
-          <a:chOff x="0" y="0"/>
-          <a:chExt cx="0" cy="0"/>
-        </a:xfrm>
-      </p:grpSpPr>
-      <p:sp>
-        <p:nvSpPr>
-          <p:cNvPr id="2" name="Title 1"/>
-          <p:cNvSpPr>
-            <a:spLocks noGrp="1"/>
-          </p:cNvSpPr>
-          <p:nvPr>
-            <p:ph type="title"/>
-          </p:nvPr>
-        </p:nvSpPr>
-        <p:spPr/>
-        <p:txBody>
-          <a:bodyPr/>
-          <a:lstStyle/>
-          <a:p>
-            <a:endParaRPr lang="en-US"/>
-          </a:p>
-        </p:txBody>
-      </p:sp>
-      <p:sp>
-        <p:nvSpPr>
-          <p:cNvPr id="3" name="Content Placeholder 2"/>
-          <p:cNvSpPr>
-            <a:spLocks noGrp="1"/>
-          </p:cNvSpPr>
-          <p:nvPr>
-            <p:ph idx="1"/>
-          </p:nvPr>
-        </p:nvSpPr>
-        <p:spPr/>
-        <p:txBody>
-          <a:bodyPr/>
-          <a:lstStyle/>
-          <a:p>
-            <a:r>
-              <a:rPr lang="en-US" dirty="0"/>
-              <a:t>Throw wiring pic here too</a:t>
-            </a:r>
-          </a:p>
-        </p:txBody>
-      </p:sp>
-      <p:pic>
-        <p:nvPicPr>
-          <p:cNvPr id="4" name="Picture 6" descr="https://i.gyazo.com/54c680e655ecf07a417ea7afef986cb3.png"/>
-          <p:cNvPicPr>
-            <a:picLocks noChangeAspect="1" noChangeArrowheads="1"/>
-          </p:cNvPicPr>
-          <p:nvPr/>
-        </p:nvPicPr>
-        <p:blipFill>
-          <a:blip r:embed="rId2">
-            <a:extLst>
-              <a:ext uri="{28A0092B-C50C-407E-A947-70E740481C1C}">
-                <a14:useLocalDpi xmlns:a14="http://schemas.microsoft.com/office/drawing/2010/main" val="0"/>
-              </a:ext>
-            </a:extLst>
-          </a:blip>
-          <a:srcRect/>
-          <a:stretch>
-            <a:fillRect/>
-          </a:stretch>
-        </p:blipFill>
-        <p:spPr bwMode="auto">
-          <a:xfrm>
-            <a:off x="6446363" y="1515195"/>
-            <a:ext cx="4419600" cy="4772025"/>
-          </a:xfrm>
-          <a:prstGeom prst="rect">
-            <a:avLst/>
-          </a:prstGeom>
-          <a:noFill/>
-          <a:extLst>
-            <a:ext uri="{909E8E84-426E-40DD-AFC4-6F175D3DCCD1}">
-              <a14:hiddenFill xmlns:a14="http://schemas.microsoft.com/office/drawing/2010/main">
-                <a:solidFill>
-                  <a:srgbClr val="FFFFFF"/>
-                </a:solidFill>
-              </a14:hiddenFill>
-            </a:ext>
-          </a:extLst>
-        </p:spPr>
-      </p:pic>
-    </p:spTree>
-    <p:extLst>
-      <p:ext uri="{BB962C8B-B14F-4D97-AF65-F5344CB8AC3E}">
-        <p14:creationId xmlns:p14="http://schemas.microsoft.com/office/powerpoint/2010/main" val="664401578"/>
-      </p:ext>
-    </p:extLst>
-  </p:cSld>
-  <p:clrMapOvr>
-    <a:masterClrMapping/>
-  </p:clrMapOvr>
-</p:sld>
-</file>
-
-<file path=ppt/slides/slide4.xml><?xml version="1.0" encoding="utf-8"?>
 <p:sld xmlns:a="http://schemas.openxmlformats.org/drawingml/2006/main" xmlns:r="http://schemas.openxmlformats.org/officeDocument/2006/relationships" xmlns:p="http://schemas.openxmlformats.org/presentationml/2006/main">
   <p:cSld>
     <p:spTree>
@@ -6546,7 +6370,7 @@
 </p:sld>
 </file>
 
-<file path=ppt/slides/slide5.xml><?xml version="1.0" encoding="utf-8"?>
+<file path=ppt/slides/slide4.xml><?xml version="1.0" encoding="utf-8"?>
 <p:sld xmlns:a="http://schemas.openxmlformats.org/drawingml/2006/main" xmlns:r="http://schemas.openxmlformats.org/officeDocument/2006/relationships" xmlns:p="http://schemas.openxmlformats.org/presentationml/2006/main">
   <p:cSld>
     <p:spTree>
@@ -6595,7 +6419,12 @@
             <p:ph idx="1"/>
           </p:nvPr>
         </p:nvSpPr>
-        <p:spPr/>
+        <p:spPr>
+          <a:xfrm>
+            <a:off x="470452" y="1845503"/>
+            <a:ext cx="10515600" cy="4351338"/>
+          </a:xfrm>
+        </p:spPr>
         <p:txBody>
           <a:bodyPr>
             <a:normAutofit/>
@@ -6718,7 +6547,7 @@
 </p:sld>
 </file>
 
-<file path=ppt/slides/slide6.xml><?xml version="1.0" encoding="utf-8"?>
+<file path=ppt/slides/slide5.xml><?xml version="1.0" encoding="utf-8"?>
 <p:sld xmlns:a="http://schemas.openxmlformats.org/drawingml/2006/main" xmlns:r="http://schemas.openxmlformats.org/officeDocument/2006/relationships" xmlns:p="http://schemas.openxmlformats.org/presentationml/2006/main">
   <p:cSld>
     <p:spTree>
@@ -6767,7 +6596,12 @@
             <p:ph idx="1"/>
           </p:nvPr>
         </p:nvSpPr>
-        <p:spPr/>
+        <p:spPr>
+          <a:xfrm>
+            <a:off x="490330" y="1765990"/>
+            <a:ext cx="10515600" cy="4351338"/>
+          </a:xfrm>
+        </p:spPr>
         <p:txBody>
           <a:bodyPr>
             <a:normAutofit/>
@@ -6791,13 +6625,13 @@
             </a:pPr>
             <a:r>
               <a:rPr lang="en-US" sz="3500" dirty="0"/>
-              <a:t>Analog pin</a:t>
+              <a:t>analog pin</a:t>
             </a:r>
           </a:p>
           <a:p>
             <a:r>
               <a:rPr lang="en-US" sz="3500" dirty="0"/>
-              <a:t>This particular pic is a breakout board</a:t>
+              <a:t>This particular picture is a breakout board</a:t>
             </a:r>
           </a:p>
           <a:p>
@@ -6834,7 +6668,7 @@
         </p:blipFill>
         <p:spPr bwMode="auto">
           <a:xfrm>
-            <a:off x="7873033" y="82321"/>
+            <a:off x="7983325" y="-623357"/>
             <a:ext cx="4208675" cy="4208675"/>
           </a:xfrm>
           <a:prstGeom prst="rect">
@@ -6865,7 +6699,7 @@
 </p:sld>
 </file>
 
-<file path=ppt/slides/slide7.xml><?xml version="1.0" encoding="utf-8"?>
+<file path=ppt/slides/slide6.xml><?xml version="1.0" encoding="utf-8"?>
 <p:sld xmlns:a="http://schemas.openxmlformats.org/drawingml/2006/main" xmlns:r="http://schemas.openxmlformats.org/officeDocument/2006/relationships" xmlns:p="http://schemas.openxmlformats.org/presentationml/2006/main">
   <p:cSld>
     <p:spTree>
@@ -6953,7 +6787,7 @@
 </p:sld>
 </file>
 
-<file path=ppt/slides/slide8.xml><?xml version="1.0" encoding="utf-8"?>
+<file path=ppt/slides/slide7.xml><?xml version="1.0" encoding="utf-8"?>
 <p:sld xmlns:a="http://schemas.openxmlformats.org/drawingml/2006/main" xmlns:r="http://schemas.openxmlformats.org/officeDocument/2006/relationships" xmlns:p="http://schemas.openxmlformats.org/presentationml/2006/main">
   <p:cSld>
     <p:spTree>
@@ -7118,7 +6952,7 @@
 </p:sld>
 </file>
 
-<file path=ppt/slides/slide9.xml><?xml version="1.0" encoding="utf-8"?>
+<file path=ppt/slides/slide8.xml><?xml version="1.0" encoding="utf-8"?>
 <p:sld xmlns:a="http://schemas.openxmlformats.org/drawingml/2006/main" xmlns:r="http://schemas.openxmlformats.org/officeDocument/2006/relationships" xmlns:p="http://schemas.openxmlformats.org/presentationml/2006/main">
   <p:cSld>
     <p:spTree>
@@ -7185,13 +7019,13 @@
             </a:pPr>
             <a:r>
               <a:rPr lang="en-US" sz="3500" dirty="0"/>
-              <a:t>Converted into an electrical signal</a:t>
+              <a:t>converted into an electrical signal</a:t>
             </a:r>
           </a:p>
           <a:p>
             <a:r>
               <a:rPr lang="en-US" sz="3500" dirty="0"/>
-              <a:t>Read here by the analog input 0.</a:t>
+              <a:t>Read here by the analog input A0.</a:t>
             </a:r>
           </a:p>
           <a:p>
@@ -7271,6 +7105,118 @@
     <p:extLst>
       <p:ext uri="{BB962C8B-B14F-4D97-AF65-F5344CB8AC3E}">
         <p14:creationId xmlns:p14="http://schemas.microsoft.com/office/powerpoint/2010/main" val="3479329345"/>
+      </p:ext>
+    </p:extLst>
+  </p:cSld>
+  <p:clrMapOvr>
+    <a:masterClrMapping/>
+  </p:clrMapOvr>
+</p:sld>
+</file>
+
+<file path=ppt/slides/slide9.xml><?xml version="1.0" encoding="utf-8"?>
+<p:sld xmlns:a="http://schemas.openxmlformats.org/drawingml/2006/main" xmlns:r="http://schemas.openxmlformats.org/officeDocument/2006/relationships" xmlns:p="http://schemas.openxmlformats.org/presentationml/2006/main">
+  <p:cSld>
+    <p:spTree>
+      <p:nvGrpSpPr>
+        <p:cNvPr id="1" name=""/>
+        <p:cNvGrpSpPr/>
+        <p:nvPr/>
+      </p:nvGrpSpPr>
+      <p:grpSpPr>
+        <a:xfrm>
+          <a:off x="0" y="0"/>
+          <a:ext cx="0" cy="0"/>
+          <a:chOff x="0" y="0"/>
+          <a:chExt cx="0" cy="0"/>
+        </a:xfrm>
+      </p:grpSpPr>
+      <p:sp>
+        <p:nvSpPr>
+          <p:cNvPr id="2" name="Title 1"/>
+          <p:cNvSpPr>
+            <a:spLocks noGrp="1"/>
+          </p:cNvSpPr>
+          <p:nvPr>
+            <p:ph type="title"/>
+          </p:nvPr>
+        </p:nvSpPr>
+        <p:spPr/>
+        <p:txBody>
+          <a:bodyPr/>
+          <a:lstStyle/>
+          <a:p>
+            <a:r>
+              <a:rPr lang="en-US" dirty="0"/>
+              <a:t>Cool thing that looks like an equalizer</a:t>
+            </a:r>
+          </a:p>
+        </p:txBody>
+      </p:sp>
+      <p:sp>
+        <p:nvSpPr>
+          <p:cNvPr id="3" name="Content Placeholder 2"/>
+          <p:cNvSpPr>
+            <a:spLocks noGrp="1"/>
+          </p:cNvSpPr>
+          <p:nvPr>
+            <p:ph idx="1"/>
+          </p:nvPr>
+        </p:nvSpPr>
+        <p:spPr/>
+        <p:txBody>
+          <a:bodyPr/>
+          <a:lstStyle/>
+          <a:p>
+            <a:endParaRPr lang="en-US"/>
+          </a:p>
+        </p:txBody>
+      </p:sp>
+      <p:pic>
+        <p:nvPicPr>
+          <p:cNvPr id="8194" name="Picture 2" descr="https://cdn-learn.adafruit.com/guides/images/000/000/179/medium800/2013_01_12_IMG_1168-1024.jpg?1448301118"/>
+          <p:cNvPicPr>
+            <a:picLocks noChangeAspect="1" noChangeArrowheads="1"/>
+          </p:cNvPicPr>
+          <p:nvPr/>
+        </p:nvPicPr>
+        <p:blipFill>
+          <a:blip r:embed="rId2">
+            <a:extLst>
+              <a:ext uri="{28A0092B-C50C-407E-A947-70E740481C1C}">
+                <a14:useLocalDpi xmlns:a14="http://schemas.microsoft.com/office/drawing/2010/main" val="0"/>
+              </a:ext>
+            </a:extLst>
+          </a:blip>
+          <a:srcRect/>
+          <a:stretch>
+            <a:fillRect/>
+          </a:stretch>
+        </p:blipFill>
+        <p:spPr bwMode="auto">
+          <a:xfrm>
+            <a:off x="2738486" y="1550465"/>
+            <a:ext cx="7620000" cy="5076825"/>
+          </a:xfrm>
+          <a:prstGeom prst="rect">
+            <a:avLst/>
+          </a:prstGeom>
+          <a:noFill/>
+          <a:extLst>
+            <a:ext uri="{909E8E84-426E-40DD-AFC4-6F175D3DCCD1}">
+              <a14:hiddenFill xmlns:a14="http://schemas.microsoft.com/office/drawing/2010/main">
+                <a:solidFill>
+                  <a:srgbClr val="FFFFFF"/>
+                </a:solidFill>
+              </a14:hiddenFill>
+            </a:ext>
+          </a:extLst>
+        </p:spPr>
+      </p:pic>
+    </p:spTree>
+    <p:extLst>
+      <p:ext uri="{BB962C8B-B14F-4D97-AF65-F5344CB8AC3E}">
+        <p14:creationId xmlns:p14="http://schemas.microsoft.com/office/powerpoint/2010/main" val="2204098774"/>
       </p:ext>
     </p:extLst>
   </p:cSld>

</xml_diff>

<commit_message>
Made the powerpoint simpler and more polished. Added the sample Arduino sketches including commenting for proper wiring.
</commit_message>
<xml_diff>
--- a/vishal-sensors-lecture/Sensor Lecture.pptx
+++ b/vishal-sensors-lecture/Sensor Lecture.pptx
@@ -5,26 +5,35 @@
     <p:sldMasterId id="2147483648" r:id="rId1"/>
   </p:sldMasterIdLst>
   <p:notesMasterIdLst>
-    <p:notesMasterId r:id="rId19"/>
+    <p:notesMasterId r:id="rId28"/>
   </p:notesMasterIdLst>
   <p:sldIdLst>
     <p:sldId id="256" r:id="rId2"/>
-    <p:sldId id="257" r:id="rId3"/>
-    <p:sldId id="259" r:id="rId4"/>
-    <p:sldId id="260" r:id="rId5"/>
-    <p:sldId id="261" r:id="rId6"/>
-    <p:sldId id="262" r:id="rId7"/>
-    <p:sldId id="263" r:id="rId8"/>
-    <p:sldId id="264" r:id="rId9"/>
-    <p:sldId id="265" r:id="rId10"/>
-    <p:sldId id="266" r:id="rId11"/>
-    <p:sldId id="267" r:id="rId12"/>
-    <p:sldId id="268" r:id="rId13"/>
-    <p:sldId id="269" r:id="rId14"/>
-    <p:sldId id="270" r:id="rId15"/>
-    <p:sldId id="272" r:id="rId16"/>
-    <p:sldId id="273" r:id="rId17"/>
-    <p:sldId id="271" r:id="rId18"/>
+    <p:sldId id="274" r:id="rId3"/>
+    <p:sldId id="275" r:id="rId4"/>
+    <p:sldId id="276" r:id="rId5"/>
+    <p:sldId id="257" r:id="rId6"/>
+    <p:sldId id="259" r:id="rId7"/>
+    <p:sldId id="262" r:id="rId8"/>
+    <p:sldId id="260" r:id="rId9"/>
+    <p:sldId id="261" r:id="rId10"/>
+    <p:sldId id="263" r:id="rId11"/>
+    <p:sldId id="264" r:id="rId12"/>
+    <p:sldId id="265" r:id="rId13"/>
+    <p:sldId id="266" r:id="rId14"/>
+    <p:sldId id="280" r:id="rId15"/>
+    <p:sldId id="267" r:id="rId16"/>
+    <p:sldId id="268" r:id="rId17"/>
+    <p:sldId id="269" r:id="rId18"/>
+    <p:sldId id="272" r:id="rId19"/>
+    <p:sldId id="273" r:id="rId20"/>
+    <p:sldId id="271" r:id="rId21"/>
+    <p:sldId id="278" r:id="rId22"/>
+    <p:sldId id="277" r:id="rId23"/>
+    <p:sldId id="282" r:id="rId24"/>
+    <p:sldId id="283" r:id="rId25"/>
+    <p:sldId id="279" r:id="rId26"/>
+    <p:sldId id="281" r:id="rId27"/>
   </p:sldIdLst>
   <p:sldSz cx="12192000" cy="6858000"/>
   <p:notesSz cx="6858000" cy="9144000"/>
@@ -217,7 +226,7 @@
           <a:p>
             <a:fld id="{78CA9460-7BF7-4E53-9348-A2D93A4A4960}" type="datetimeFigureOut">
               <a:rPr lang="en-US" smtClean="0"/>
-              <a:t>7/1/2017</a:t>
+              <a:t>9/26/2017</a:t>
             </a:fld>
             <a:endParaRPr lang="en-US"/>
           </a:p>
@@ -552,7 +561,7 @@
           <a:p>
             <a:fld id="{1B057D52-65A4-4642-8DCB-0D0611C8D40C}" type="slidenum">
               <a:rPr lang="en-US" smtClean="0"/>
-              <a:t>15</a:t>
+              <a:t>18</a:t>
             </a:fld>
             <a:endParaRPr lang="en-US"/>
           </a:p>
@@ -639,7 +648,7 @@
           <a:p>
             <a:fld id="{1B057D52-65A4-4642-8DCB-0D0611C8D40C}" type="slidenum">
               <a:rPr lang="en-US" smtClean="0"/>
-              <a:t>17</a:t>
+              <a:t>20</a:t>
             </a:fld>
             <a:endParaRPr lang="en-US"/>
           </a:p>
@@ -787,7 +796,7 @@
           <a:p>
             <a:fld id="{141AF85B-C30D-463B-80F6-39CACF568CE0}" type="datetimeFigureOut">
               <a:rPr lang="en-US" smtClean="0"/>
-              <a:t>7/1/2017</a:t>
+              <a:t>9/26/2017</a:t>
             </a:fld>
             <a:endParaRPr lang="en-US"/>
           </a:p>
@@ -955,7 +964,7 @@
           <a:p>
             <a:fld id="{141AF85B-C30D-463B-80F6-39CACF568CE0}" type="datetimeFigureOut">
               <a:rPr lang="en-US" smtClean="0"/>
-              <a:t>7/1/2017</a:t>
+              <a:t>9/26/2017</a:t>
             </a:fld>
             <a:endParaRPr lang="en-US"/>
           </a:p>
@@ -1133,7 +1142,7 @@
           <a:p>
             <a:fld id="{141AF85B-C30D-463B-80F6-39CACF568CE0}" type="datetimeFigureOut">
               <a:rPr lang="en-US" smtClean="0"/>
-              <a:t>7/1/2017</a:t>
+              <a:t>9/26/2017</a:t>
             </a:fld>
             <a:endParaRPr lang="en-US"/>
           </a:p>
@@ -1301,7 +1310,7 @@
           <a:p>
             <a:fld id="{141AF85B-C30D-463B-80F6-39CACF568CE0}" type="datetimeFigureOut">
               <a:rPr lang="en-US" smtClean="0"/>
-              <a:t>7/1/2017</a:t>
+              <a:t>9/26/2017</a:t>
             </a:fld>
             <a:endParaRPr lang="en-US"/>
           </a:p>
@@ -1546,7 +1555,7 @@
           <a:p>
             <a:fld id="{141AF85B-C30D-463B-80F6-39CACF568CE0}" type="datetimeFigureOut">
               <a:rPr lang="en-US" smtClean="0"/>
-              <a:t>7/1/2017</a:t>
+              <a:t>9/26/2017</a:t>
             </a:fld>
             <a:endParaRPr lang="en-US"/>
           </a:p>
@@ -1775,7 +1784,7 @@
           <a:p>
             <a:fld id="{141AF85B-C30D-463B-80F6-39CACF568CE0}" type="datetimeFigureOut">
               <a:rPr lang="en-US" smtClean="0"/>
-              <a:t>7/1/2017</a:t>
+              <a:t>9/26/2017</a:t>
             </a:fld>
             <a:endParaRPr lang="en-US"/>
           </a:p>
@@ -2139,7 +2148,7 @@
           <a:p>
             <a:fld id="{141AF85B-C30D-463B-80F6-39CACF568CE0}" type="datetimeFigureOut">
               <a:rPr lang="en-US" smtClean="0"/>
-              <a:t>7/1/2017</a:t>
+              <a:t>9/26/2017</a:t>
             </a:fld>
             <a:endParaRPr lang="en-US"/>
           </a:p>
@@ -2256,7 +2265,7 @@
           <a:p>
             <a:fld id="{141AF85B-C30D-463B-80F6-39CACF568CE0}" type="datetimeFigureOut">
               <a:rPr lang="en-US" smtClean="0"/>
-              <a:t>7/1/2017</a:t>
+              <a:t>9/26/2017</a:t>
             </a:fld>
             <a:endParaRPr lang="en-US"/>
           </a:p>
@@ -2351,7 +2360,7 @@
           <a:p>
             <a:fld id="{141AF85B-C30D-463B-80F6-39CACF568CE0}" type="datetimeFigureOut">
               <a:rPr lang="en-US" smtClean="0"/>
-              <a:t>7/1/2017</a:t>
+              <a:t>9/26/2017</a:t>
             </a:fld>
             <a:endParaRPr lang="en-US"/>
           </a:p>
@@ -2626,7 +2635,7 @@
           <a:p>
             <a:fld id="{141AF85B-C30D-463B-80F6-39CACF568CE0}" type="datetimeFigureOut">
               <a:rPr lang="en-US" smtClean="0"/>
-              <a:t>7/1/2017</a:t>
+              <a:t>9/26/2017</a:t>
             </a:fld>
             <a:endParaRPr lang="en-US"/>
           </a:p>
@@ -2878,7 +2887,7 @@
           <a:p>
             <a:fld id="{141AF85B-C30D-463B-80F6-39CACF568CE0}" type="datetimeFigureOut">
               <a:rPr lang="en-US" smtClean="0"/>
-              <a:t>7/1/2017</a:t>
+              <a:t>9/26/2017</a:t>
             </a:fld>
             <a:endParaRPr lang="en-US"/>
           </a:p>
@@ -3089,7 +3098,7 @@
           <a:p>
             <a:fld id="{141AF85B-C30D-463B-80F6-39CACF568CE0}" type="datetimeFigureOut">
               <a:rPr lang="en-US" smtClean="0"/>
-              <a:t>7/1/2017</a:t>
+              <a:t>9/26/2017</a:t>
             </a:fld>
             <a:endParaRPr lang="en-US"/>
           </a:p>
@@ -3504,37 +3513,116 @@
             <p:ph type="ctrTitle"/>
           </p:nvPr>
         </p:nvSpPr>
-        <p:spPr/>
-        <p:txBody>
-          <a:bodyPr/>
-          <a:lstStyle/>
-          <a:p>
-            <a:r>
-              <a:rPr lang="en-US" dirty="0" err="1"/>
-              <a:t>Sensorssss</a:t>
-            </a:r>
-            <a:endParaRPr lang="en-US" dirty="0"/>
-          </a:p>
-        </p:txBody>
-      </p:sp>
-      <p:sp>
-        <p:nvSpPr>
-          <p:cNvPr id="3" name="Subtitle 2"/>
-          <p:cNvSpPr>
-            <a:spLocks noGrp="1"/>
-          </p:cNvSpPr>
-          <p:nvPr>
-            <p:ph type="subTitle" idx="1"/>
-          </p:nvPr>
-        </p:nvSpPr>
-        <p:spPr/>
-        <p:txBody>
-          <a:bodyPr/>
+        <p:spPr>
+          <a:xfrm>
+            <a:off x="1524000" y="-90211"/>
+            <a:ext cx="9144000" cy="2387600"/>
+          </a:xfrm>
+          <a:ln>
+            <a:noFill/>
+          </a:ln>
+          <a:effectLst>
+            <a:outerShdw blurRad="225425" dist="50800" dir="5220000" algn="ctr">
+              <a:srgbClr val="000000">
+                <a:alpha val="33000"/>
+              </a:srgbClr>
+            </a:outerShdw>
+          </a:effectLst>
+          <a:scene3d>
+            <a:camera prst="perspectiveFront" fov="3300000">
+              <a:rot lat="486000" lon="19530000" rev="174000"/>
+            </a:camera>
+            <a:lightRig rig="harsh" dir="t">
+              <a:rot lat="0" lon="0" rev="3000000"/>
+            </a:lightRig>
+          </a:scene3d>
+          <a:sp3d extrusionH="254000" contourW="19050">
+            <a:bevelT w="82550" h="44450" prst="angle"/>
+            <a:bevelB w="82550" h="44450" prst="angle"/>
+            <a:contourClr>
+              <a:srgbClr val="FFFFFF"/>
+            </a:contourClr>
+          </a:sp3d>
+        </p:spPr>
+        <p:txBody>
+          <a:bodyPr>
+            <a:noAutofit/>
+          </a:bodyPr>
+          <a:lstStyle/>
+          <a:p>
+            <a:r>
+              <a:rPr lang="en-US" sz="9900" dirty="0"/>
+              <a:t>Sensors!!</a:t>
+            </a:r>
+          </a:p>
+        </p:txBody>
+      </p:sp>
+      <p:pic>
+        <p:nvPicPr>
+          <p:cNvPr id="7" name="Picture 6">
+            <a:extLst>
+              <a:ext uri="{FF2B5EF4-FFF2-40B4-BE49-F238E27FC236}">
+                <a16:creationId xmlns:a16="http://schemas.microsoft.com/office/drawing/2014/main" id="{2B69179C-30E1-42A3-9802-850712C5D630}"/>
+              </a:ext>
+            </a:extLst>
+          </p:cNvPr>
+          <p:cNvPicPr>
+            <a:picLocks noChangeAspect="1"/>
+          </p:cNvPicPr>
+          <p:nvPr/>
+        </p:nvPicPr>
+        <p:blipFill>
+          <a:blip r:embed="rId2">
+            <a:extLst>
+              <a:ext uri="{28A0092B-C50C-407E-A947-70E740481C1C}">
+                <a14:useLocalDpi xmlns:a14="http://schemas.microsoft.com/office/drawing/2010/main" val="0"/>
+              </a:ext>
+            </a:extLst>
+          </a:blip>
+          <a:stretch>
+            <a:fillRect/>
+          </a:stretch>
+        </p:blipFill>
+        <p:spPr>
+          <a:xfrm>
+            <a:off x="1428510" y="2439397"/>
+            <a:ext cx="9334980" cy="4165814"/>
+          </a:xfrm>
+          <a:prstGeom prst="rect">
+            <a:avLst/>
+          </a:prstGeom>
+        </p:spPr>
+      </p:pic>
+      <p:sp>
+        <p:nvSpPr>
+          <p:cNvPr id="8" name="Rectangle 7">
+            <a:extLst>
+              <a:ext uri="{FF2B5EF4-FFF2-40B4-BE49-F238E27FC236}">
+                <a16:creationId xmlns:a16="http://schemas.microsoft.com/office/drawing/2014/main" id="{8AE2D235-EABD-4AD1-BF8D-9F7E1F6B59D4}"/>
+              </a:ext>
+            </a:extLst>
+          </p:cNvPr>
+          <p:cNvSpPr/>
+          <p:nvPr/>
+        </p:nvSpPr>
+        <p:spPr>
+          <a:xfrm>
+            <a:off x="3591128" y="6420545"/>
+            <a:ext cx="4254370" cy="369332"/>
+          </a:xfrm>
+          <a:prstGeom prst="rect">
+            <a:avLst/>
+          </a:prstGeom>
+        </p:spPr>
+        <p:txBody>
+          <a:bodyPr wrap="none">
+            <a:spAutoFit/>
+          </a:bodyPr>
           <a:lstStyle/>
           <a:p>
             <a:r>
               <a:rPr lang="en-US" dirty="0"/>
-              <a:t>Vishal Jagannathan</a:t>
+              <a:t>https://www.arduino.cc/en/Main/Software</a:t>
             </a:r>
           </a:p>
         </p:txBody>
@@ -3586,6 +3674,445 @@
           <a:p>
             <a:r>
               <a:rPr lang="en-US" dirty="0"/>
+              <a:t>Mic and Speaker</a:t>
+            </a:r>
+          </a:p>
+        </p:txBody>
+      </p:sp>
+      <p:pic>
+        <p:nvPicPr>
+          <p:cNvPr id="4098" name="Picture 2" descr="http://img.dxcdn.com/productimages/sku_138322_2.jpg"/>
+          <p:cNvPicPr>
+            <a:picLocks noGrp="1" noChangeAspect="1" noChangeArrowheads="1"/>
+          </p:cNvPicPr>
+          <p:nvPr>
+            <p:ph idx="1"/>
+          </p:nvPr>
+        </p:nvPicPr>
+        <p:blipFill>
+          <a:blip r:embed="rId2">
+            <a:extLst>
+              <a:ext uri="{28A0092B-C50C-407E-A947-70E740481C1C}">
+                <a14:useLocalDpi xmlns:a14="http://schemas.microsoft.com/office/drawing/2010/main" val="0"/>
+              </a:ext>
+            </a:extLst>
+          </a:blip>
+          <a:srcRect/>
+          <a:stretch>
+            <a:fillRect/>
+          </a:stretch>
+        </p:blipFill>
+        <p:spPr bwMode="auto">
+          <a:xfrm>
+            <a:off x="7144298" y="1690688"/>
+            <a:ext cx="4351338" cy="4351338"/>
+          </a:xfrm>
+          <a:prstGeom prst="rect">
+            <a:avLst/>
+          </a:prstGeom>
+          <a:noFill/>
+          <a:extLst>
+            <a:ext uri="{909E8E84-426E-40DD-AFC4-6F175D3DCCD1}">
+              <a14:hiddenFill xmlns:a14="http://schemas.microsoft.com/office/drawing/2010/main">
+                <a:solidFill>
+                  <a:srgbClr val="FFFFFF"/>
+                </a:solidFill>
+              </a14:hiddenFill>
+            </a:ext>
+          </a:extLst>
+        </p:spPr>
+      </p:pic>
+      <p:sp>
+        <p:nvSpPr>
+          <p:cNvPr id="4" name="TextBox 3"/>
+          <p:cNvSpPr txBox="1"/>
+          <p:nvPr/>
+        </p:nvSpPr>
+        <p:spPr>
+          <a:xfrm>
+            <a:off x="7220932" y="6249971"/>
+            <a:ext cx="4132868" cy="369332"/>
+          </a:xfrm>
+          <a:prstGeom prst="rect">
+            <a:avLst/>
+          </a:prstGeom>
+          <a:noFill/>
+        </p:spPr>
+        <p:txBody>
+          <a:bodyPr wrap="square" rtlCol="0">
+            <a:spAutoFit/>
+          </a:bodyPr>
+          <a:lstStyle/>
+          <a:p>
+            <a:r>
+              <a:rPr lang="en-US" dirty="0"/>
+              <a:t>Technically a speaker/buzzer module</a:t>
+            </a:r>
+          </a:p>
+        </p:txBody>
+      </p:sp>
+      <p:pic>
+        <p:nvPicPr>
+          <p:cNvPr id="4100" name="Picture 4" descr="https://cdn.instructables.com/FK3/AF92/I10JDZZC/FK3AF92I10JDZZC.MEDIUM.jpg"/>
+          <p:cNvPicPr>
+            <a:picLocks noChangeAspect="1" noChangeArrowheads="1"/>
+          </p:cNvPicPr>
+          <p:nvPr/>
+        </p:nvPicPr>
+        <p:blipFill>
+          <a:blip r:embed="rId3">
+            <a:extLst>
+              <a:ext uri="{28A0092B-C50C-407E-A947-70E740481C1C}">
+                <a14:useLocalDpi xmlns:a14="http://schemas.microsoft.com/office/drawing/2010/main" val="0"/>
+              </a:ext>
+            </a:extLst>
+          </a:blip>
+          <a:srcRect/>
+          <a:stretch>
+            <a:fillRect/>
+          </a:stretch>
+        </p:blipFill>
+        <p:spPr bwMode="auto">
+          <a:xfrm>
+            <a:off x="1272618" y="2221976"/>
+            <a:ext cx="4636023" cy="4636023"/>
+          </a:xfrm>
+          <a:prstGeom prst="rect">
+            <a:avLst/>
+          </a:prstGeom>
+          <a:noFill/>
+          <a:extLst>
+            <a:ext uri="{909E8E84-426E-40DD-AFC4-6F175D3DCCD1}">
+              <a14:hiddenFill xmlns:a14="http://schemas.microsoft.com/office/drawing/2010/main">
+                <a:solidFill>
+                  <a:srgbClr val="FFFFFF"/>
+                </a:solidFill>
+              </a14:hiddenFill>
+            </a:ext>
+          </a:extLst>
+        </p:spPr>
+      </p:pic>
+    </p:spTree>
+    <p:extLst>
+      <p:ext uri="{BB962C8B-B14F-4D97-AF65-F5344CB8AC3E}">
+        <p14:creationId xmlns:p14="http://schemas.microsoft.com/office/powerpoint/2010/main" val="3351638273"/>
+      </p:ext>
+    </p:extLst>
+  </p:cSld>
+  <p:clrMapOvr>
+    <a:masterClrMapping/>
+  </p:clrMapOvr>
+</p:sld>
+</file>
+
+<file path=ppt/slides/slide11.xml><?xml version="1.0" encoding="utf-8"?>
+<p:sld xmlns:a="http://schemas.openxmlformats.org/drawingml/2006/main" xmlns:r="http://schemas.openxmlformats.org/officeDocument/2006/relationships" xmlns:p="http://schemas.openxmlformats.org/presentationml/2006/main">
+  <p:cSld>
+    <p:spTree>
+      <p:nvGrpSpPr>
+        <p:cNvPr id="1" name=""/>
+        <p:cNvGrpSpPr/>
+        <p:nvPr/>
+      </p:nvGrpSpPr>
+      <p:grpSpPr>
+        <a:xfrm>
+          <a:off x="0" y="0"/>
+          <a:ext cx="0" cy="0"/>
+          <a:chOff x="0" y="0"/>
+          <a:chExt cx="0" cy="0"/>
+        </a:xfrm>
+      </p:grpSpPr>
+      <p:sp>
+        <p:nvSpPr>
+          <p:cNvPr id="2" name="Title 1"/>
+          <p:cNvSpPr>
+            <a:spLocks noGrp="1"/>
+          </p:cNvSpPr>
+          <p:nvPr>
+            <p:ph type="title"/>
+          </p:nvPr>
+        </p:nvSpPr>
+        <p:spPr/>
+        <p:txBody>
+          <a:bodyPr/>
+          <a:lstStyle/>
+          <a:p>
+            <a:r>
+              <a:rPr lang="en-US" dirty="0"/>
+              <a:t>Mic</a:t>
+            </a:r>
+          </a:p>
+        </p:txBody>
+      </p:sp>
+      <p:sp>
+        <p:nvSpPr>
+          <p:cNvPr id="3" name="Content Placeholder 2"/>
+          <p:cNvSpPr>
+            <a:spLocks noGrp="1"/>
+          </p:cNvSpPr>
+          <p:nvPr>
+            <p:ph idx="1"/>
+          </p:nvPr>
+        </p:nvSpPr>
+        <p:spPr/>
+        <p:txBody>
+          <a:bodyPr>
+            <a:normAutofit/>
+          </a:bodyPr>
+          <a:lstStyle/>
+          <a:p>
+            <a:r>
+              <a:rPr lang="en-US" sz="3500" dirty="0"/>
+              <a:t>When sound waves hit the mic, it is </a:t>
+            </a:r>
+          </a:p>
+          <a:p>
+            <a:pPr marL="0" indent="0">
+              <a:buNone/>
+            </a:pPr>
+            <a:r>
+              <a:rPr lang="en-US" sz="3500" dirty="0"/>
+              <a:t>converted into an electrical signal</a:t>
+            </a:r>
+          </a:p>
+          <a:p>
+            <a:r>
+              <a:rPr lang="en-US" sz="3500" dirty="0"/>
+              <a:t>Read here by the analog input A0.</a:t>
+            </a:r>
+          </a:p>
+          <a:p>
+            <a:r>
+              <a:rPr lang="en-US" sz="3500" dirty="0"/>
+              <a:t>The Arduino can then interpret this </a:t>
+            </a:r>
+          </a:p>
+          <a:p>
+            <a:pPr marL="0" indent="0">
+              <a:buNone/>
+            </a:pPr>
+            <a:r>
+              <a:rPr lang="en-US" sz="3500" dirty="0"/>
+              <a:t>Information and act on it</a:t>
+            </a:r>
+          </a:p>
+          <a:p>
+            <a:pPr marL="0" indent="0">
+              <a:buNone/>
+            </a:pPr>
+            <a:endParaRPr lang="en-US" sz="3500" dirty="0"/>
+          </a:p>
+          <a:p>
+            <a:pPr marL="0" indent="0">
+              <a:buNone/>
+            </a:pPr>
+            <a:r>
+              <a:rPr lang="en-US" sz="3500" dirty="0"/>
+              <a:t>For example….</a:t>
+            </a:r>
+          </a:p>
+        </p:txBody>
+      </p:sp>
+      <p:pic>
+        <p:nvPicPr>
+          <p:cNvPr id="7170" name="Picture 2" descr="Image result for arduino mic"/>
+          <p:cNvPicPr>
+            <a:picLocks noChangeAspect="1" noChangeArrowheads="1"/>
+          </p:cNvPicPr>
+          <p:nvPr/>
+        </p:nvPicPr>
+        <p:blipFill>
+          <a:blip r:embed="rId2">
+            <a:extLst>
+              <a:ext uri="{28A0092B-C50C-407E-A947-70E740481C1C}">
+                <a14:useLocalDpi xmlns:a14="http://schemas.microsoft.com/office/drawing/2010/main" val="0"/>
+              </a:ext>
+            </a:extLst>
+          </a:blip>
+          <a:srcRect/>
+          <a:stretch>
+            <a:fillRect/>
+          </a:stretch>
+        </p:blipFill>
+        <p:spPr bwMode="auto">
+          <a:xfrm>
+            <a:off x="7847519" y="254523"/>
+            <a:ext cx="4204551" cy="5585381"/>
+          </a:xfrm>
+          <a:prstGeom prst="rect">
+            <a:avLst/>
+          </a:prstGeom>
+          <a:noFill/>
+          <a:extLst>
+            <a:ext uri="{909E8E84-426E-40DD-AFC4-6F175D3DCCD1}">
+              <a14:hiddenFill xmlns:a14="http://schemas.microsoft.com/office/drawing/2010/main">
+                <a:solidFill>
+                  <a:srgbClr val="FFFFFF"/>
+                </a:solidFill>
+              </a14:hiddenFill>
+            </a:ext>
+          </a:extLst>
+        </p:spPr>
+      </p:pic>
+    </p:spTree>
+    <p:extLst>
+      <p:ext uri="{BB962C8B-B14F-4D97-AF65-F5344CB8AC3E}">
+        <p14:creationId xmlns:p14="http://schemas.microsoft.com/office/powerpoint/2010/main" val="3479329345"/>
+      </p:ext>
+    </p:extLst>
+  </p:cSld>
+  <p:clrMapOvr>
+    <a:masterClrMapping/>
+  </p:clrMapOvr>
+</p:sld>
+</file>
+
+<file path=ppt/slides/slide12.xml><?xml version="1.0" encoding="utf-8"?>
+<p:sld xmlns:a="http://schemas.openxmlformats.org/drawingml/2006/main" xmlns:r="http://schemas.openxmlformats.org/officeDocument/2006/relationships" xmlns:p="http://schemas.openxmlformats.org/presentationml/2006/main">
+  <p:cSld>
+    <p:spTree>
+      <p:nvGrpSpPr>
+        <p:cNvPr id="1" name=""/>
+        <p:cNvGrpSpPr/>
+        <p:nvPr/>
+      </p:nvGrpSpPr>
+      <p:grpSpPr>
+        <a:xfrm>
+          <a:off x="0" y="0"/>
+          <a:ext cx="0" cy="0"/>
+          <a:chOff x="0" y="0"/>
+          <a:chExt cx="0" cy="0"/>
+        </a:xfrm>
+      </p:grpSpPr>
+      <p:sp>
+        <p:nvSpPr>
+          <p:cNvPr id="2" name="Title 1"/>
+          <p:cNvSpPr>
+            <a:spLocks noGrp="1"/>
+          </p:cNvSpPr>
+          <p:nvPr>
+            <p:ph type="title"/>
+          </p:nvPr>
+        </p:nvSpPr>
+        <p:spPr/>
+        <p:txBody>
+          <a:bodyPr/>
+          <a:lstStyle/>
+          <a:p>
+            <a:r>
+              <a:rPr lang="en-US" dirty="0"/>
+              <a:t>Cool Visualizer effects</a:t>
+            </a:r>
+          </a:p>
+        </p:txBody>
+      </p:sp>
+      <p:sp>
+        <p:nvSpPr>
+          <p:cNvPr id="3" name="Content Placeholder 2"/>
+          <p:cNvSpPr>
+            <a:spLocks noGrp="1"/>
+          </p:cNvSpPr>
+          <p:nvPr>
+            <p:ph idx="1"/>
+          </p:nvPr>
+        </p:nvSpPr>
+        <p:spPr/>
+        <p:txBody>
+          <a:bodyPr/>
+          <a:lstStyle/>
+          <a:p>
+            <a:endParaRPr lang="en-US"/>
+          </a:p>
+        </p:txBody>
+      </p:sp>
+      <p:pic>
+        <p:nvPicPr>
+          <p:cNvPr id="8194" name="Picture 2" descr="https://cdn-learn.adafruit.com/guides/images/000/000/179/medium800/2013_01_12_IMG_1168-1024.jpg?1448301118"/>
+          <p:cNvPicPr>
+            <a:picLocks noChangeAspect="1" noChangeArrowheads="1"/>
+          </p:cNvPicPr>
+          <p:nvPr/>
+        </p:nvPicPr>
+        <p:blipFill>
+          <a:blip r:embed="rId2">
+            <a:extLst>
+              <a:ext uri="{28A0092B-C50C-407E-A947-70E740481C1C}">
+                <a14:useLocalDpi xmlns:a14="http://schemas.microsoft.com/office/drawing/2010/main" val="0"/>
+              </a:ext>
+            </a:extLst>
+          </a:blip>
+          <a:srcRect/>
+          <a:stretch>
+            <a:fillRect/>
+          </a:stretch>
+        </p:blipFill>
+        <p:spPr bwMode="auto">
+          <a:xfrm>
+            <a:off x="2738486" y="1550465"/>
+            <a:ext cx="7620000" cy="5076825"/>
+          </a:xfrm>
+          <a:prstGeom prst="rect">
+            <a:avLst/>
+          </a:prstGeom>
+          <a:noFill/>
+          <a:extLst>
+            <a:ext uri="{909E8E84-426E-40DD-AFC4-6F175D3DCCD1}">
+              <a14:hiddenFill xmlns:a14="http://schemas.microsoft.com/office/drawing/2010/main">
+                <a:solidFill>
+                  <a:srgbClr val="FFFFFF"/>
+                </a:solidFill>
+              </a14:hiddenFill>
+            </a:ext>
+          </a:extLst>
+        </p:spPr>
+      </p:pic>
+    </p:spTree>
+    <p:extLst>
+      <p:ext uri="{BB962C8B-B14F-4D97-AF65-F5344CB8AC3E}">
+        <p14:creationId xmlns:p14="http://schemas.microsoft.com/office/powerpoint/2010/main" val="2204098774"/>
+      </p:ext>
+    </p:extLst>
+  </p:cSld>
+  <p:clrMapOvr>
+    <a:masterClrMapping/>
+  </p:clrMapOvr>
+</p:sld>
+</file>
+
+<file path=ppt/slides/slide13.xml><?xml version="1.0" encoding="utf-8"?>
+<p:sld xmlns:a="http://schemas.openxmlformats.org/drawingml/2006/main" xmlns:r="http://schemas.openxmlformats.org/officeDocument/2006/relationships" xmlns:p="http://schemas.openxmlformats.org/presentationml/2006/main">
+  <p:cSld>
+    <p:spTree>
+      <p:nvGrpSpPr>
+        <p:cNvPr id="1" name=""/>
+        <p:cNvGrpSpPr/>
+        <p:nvPr/>
+      </p:nvGrpSpPr>
+      <p:grpSpPr>
+        <a:xfrm>
+          <a:off x="0" y="0"/>
+          <a:ext cx="0" cy="0"/>
+          <a:chOff x="0" y="0"/>
+          <a:chExt cx="0" cy="0"/>
+        </a:xfrm>
+      </p:grpSpPr>
+      <p:sp>
+        <p:nvSpPr>
+          <p:cNvPr id="2" name="Title 1"/>
+          <p:cNvSpPr>
+            <a:spLocks noGrp="1"/>
+          </p:cNvSpPr>
+          <p:nvPr>
+            <p:ph type="title"/>
+          </p:nvPr>
+        </p:nvSpPr>
+        <p:spPr/>
+        <p:txBody>
+          <a:bodyPr/>
+          <a:lstStyle/>
+          <a:p>
+            <a:r>
+              <a:rPr lang="en-US" dirty="0"/>
               <a:t>Speaker</a:t>
             </a:r>
           </a:p>
@@ -3609,7 +4136,7 @@
         </p:spPr>
         <p:txBody>
           <a:bodyPr>
-            <a:normAutofit/>
+            <a:normAutofit lnSpcReduction="10000"/>
           </a:bodyPr>
           <a:lstStyle/>
           <a:p>
@@ -3639,19 +4166,18 @@
           <a:p>
             <a:r>
               <a:rPr lang="en-US" sz="3500" dirty="0"/>
-              <a:t>(2x check this) To use this, the output wire to the speaker must support Pulse Width Modulation (PWM, denoted by ~ on an Arduino), meaning that you can specify a voltage value from 0 – 5V </a:t>
+              <a:t>To use this, the output wire to the speaker must support Pulse Width Modulation (PWM, denoted by ~ on an Arduino), </a:t>
+            </a:r>
+            <a:r>
+              <a:rPr lang="en-US" sz="3500" u="sng" dirty="0"/>
+              <a:t>meaning that you can specify a voltage value from 0 – 5V </a:t>
             </a:r>
           </a:p>
           <a:p>
             <a:r>
               <a:rPr lang="en-US" sz="3500" dirty="0"/>
-              <a:t>This gives control </a:t>
-            </a:r>
-            <a:r>
-              <a:rPr lang="en-US" sz="3500" dirty="0" err="1"/>
-              <a:t>ove</a:t>
-            </a:r>
-            <a:endParaRPr lang="en-US" sz="3500" dirty="0"/>
+              <a:t>You can pick how much power you want to send and thus the loudness of the speaker</a:t>
+            </a:r>
           </a:p>
         </p:txBody>
       </p:sp>
@@ -3709,7 +4235,7 @@
 </p:sld>
 </file>
 
-<file path=ppt/slides/slide11.xml><?xml version="1.0" encoding="utf-8"?>
+<file path=ppt/slides/slide14.xml><?xml version="1.0" encoding="utf-8"?>
 <p:sld xmlns:a="http://schemas.openxmlformats.org/drawingml/2006/main" xmlns:r="http://schemas.openxmlformats.org/officeDocument/2006/relationships" xmlns:p="http://schemas.openxmlformats.org/presentationml/2006/main">
   <p:cSld>
     <p:spTree>
@@ -3726,6 +4252,151 @@
           <a:chExt cx="0" cy="0"/>
         </a:xfrm>
       </p:grpSpPr>
+      <p:pic>
+        <p:nvPicPr>
+          <p:cNvPr id="1026" name="Picture 2" descr="http://mambohead.com/wp-content/uploads/2011/07/PiezoElements.jpg">
+            <a:extLst>
+              <a:ext uri="{FF2B5EF4-FFF2-40B4-BE49-F238E27FC236}">
+                <a16:creationId xmlns:a16="http://schemas.microsoft.com/office/drawing/2014/main" id="{409E3803-1491-4223-ACE2-BCF21C8E8FEF}"/>
+              </a:ext>
+            </a:extLst>
+          </p:cNvPr>
+          <p:cNvPicPr>
+            <a:picLocks noChangeAspect="1" noChangeArrowheads="1"/>
+          </p:cNvPicPr>
+          <p:nvPr/>
+        </p:nvPicPr>
+        <p:blipFill>
+          <a:blip r:embed="rId2">
+            <a:extLst>
+              <a:ext uri="{28A0092B-C50C-407E-A947-70E740481C1C}">
+                <a14:useLocalDpi xmlns:a14="http://schemas.microsoft.com/office/drawing/2010/main" val="0"/>
+              </a:ext>
+            </a:extLst>
+          </a:blip>
+          <a:srcRect/>
+          <a:stretch>
+            <a:fillRect/>
+          </a:stretch>
+        </p:blipFill>
+        <p:spPr bwMode="auto">
+          <a:xfrm>
+            <a:off x="7485338" y="4102508"/>
+            <a:ext cx="4706662" cy="2755492"/>
+          </a:xfrm>
+          <a:prstGeom prst="rect">
+            <a:avLst/>
+          </a:prstGeom>
+          <a:noFill/>
+          <a:extLst>
+            <a:ext uri="{909E8E84-426E-40DD-AFC4-6F175D3DCCD1}">
+              <a14:hiddenFill xmlns:a14="http://schemas.microsoft.com/office/drawing/2010/main">
+                <a:solidFill>
+                  <a:srgbClr val="FFFFFF"/>
+                </a:solidFill>
+              </a14:hiddenFill>
+            </a:ext>
+          </a:extLst>
+        </p:spPr>
+      </p:pic>
+      <p:sp>
+        <p:nvSpPr>
+          <p:cNvPr id="2" name="Title 1">
+            <a:extLst>
+              <a:ext uri="{FF2B5EF4-FFF2-40B4-BE49-F238E27FC236}">
+                <a16:creationId xmlns:a16="http://schemas.microsoft.com/office/drawing/2014/main" id="{7D4E9070-7D23-4E76-806A-698FB577A931}"/>
+              </a:ext>
+            </a:extLst>
+          </p:cNvPr>
+          <p:cNvSpPr>
+            <a:spLocks noGrp="1"/>
+          </p:cNvSpPr>
+          <p:nvPr>
+            <p:ph type="title"/>
+          </p:nvPr>
+        </p:nvSpPr>
+        <p:spPr/>
+        <p:txBody>
+          <a:bodyPr/>
+          <a:lstStyle/>
+          <a:p>
+            <a:r>
+              <a:rPr lang="en-US" dirty="0"/>
+              <a:t>Piezoelectric Sensors</a:t>
+            </a:r>
+          </a:p>
+        </p:txBody>
+      </p:sp>
+      <p:sp>
+        <p:nvSpPr>
+          <p:cNvPr id="3" name="Content Placeholder 2">
+            <a:extLst>
+              <a:ext uri="{FF2B5EF4-FFF2-40B4-BE49-F238E27FC236}">
+                <a16:creationId xmlns:a16="http://schemas.microsoft.com/office/drawing/2014/main" id="{7FA0A4F6-B946-4055-A9F7-947EA7AE20D1}"/>
+              </a:ext>
+            </a:extLst>
+          </p:cNvPr>
+          <p:cNvSpPr>
+            <a:spLocks noGrp="1"/>
+          </p:cNvSpPr>
+          <p:nvPr>
+            <p:ph idx="1"/>
+          </p:nvPr>
+        </p:nvSpPr>
+        <p:spPr/>
+        <p:txBody>
+          <a:bodyPr/>
+          <a:lstStyle/>
+          <a:p>
+            <a:r>
+              <a:rPr lang="en-US" dirty="0"/>
+              <a:t>Are sensitive to pressure or touch</a:t>
+            </a:r>
+          </a:p>
+          <a:p>
+            <a:r>
+              <a:rPr lang="en-US" dirty="0"/>
+              <a:t>Converts the intensity of the touch into a voltage output to the Arduino</a:t>
+            </a:r>
+          </a:p>
+          <a:p>
+            <a:r>
+              <a:rPr lang="en-US" dirty="0"/>
+              <a:t>Very good for experimenting with different thresholds as the ones we have are fairly sensitive</a:t>
+            </a:r>
+          </a:p>
+        </p:txBody>
+      </p:sp>
+    </p:spTree>
+    <p:extLst>
+      <p:ext uri="{BB962C8B-B14F-4D97-AF65-F5344CB8AC3E}">
+        <p14:creationId xmlns:p14="http://schemas.microsoft.com/office/powerpoint/2010/main" val="2601614782"/>
+      </p:ext>
+    </p:extLst>
+  </p:cSld>
+  <p:clrMapOvr>
+    <a:masterClrMapping/>
+  </p:clrMapOvr>
+</p:sld>
+</file>
+
+<file path=ppt/slides/slide15.xml><?xml version="1.0" encoding="utf-8"?>
+<p:sld xmlns:a="http://schemas.openxmlformats.org/drawingml/2006/main" xmlns:r="http://schemas.openxmlformats.org/officeDocument/2006/relationships" xmlns:p="http://schemas.openxmlformats.org/presentationml/2006/main">
+  <p:cSld>
+    <p:spTree>
+      <p:nvGrpSpPr>
+        <p:cNvPr id="1" name=""/>
+        <p:cNvGrpSpPr/>
+        <p:nvPr/>
+      </p:nvGrpSpPr>
+      <p:grpSpPr>
+        <a:xfrm>
+          <a:off x="0" y="0"/>
+          <a:ext cx="0" cy="0"/>
+          <a:chOff x="0" y="0"/>
+          <a:chExt cx="0" cy="0"/>
+        </a:xfrm>
+      </p:grpSpPr>
       <p:sp>
         <p:nvSpPr>
           <p:cNvPr id="2" name="Title 1"/>
@@ -3748,7 +4419,7 @@
           <a:p>
             <a:r>
               <a:rPr lang="en-US" dirty="0"/>
-              <a:t>RFID</a:t>
+              <a:t>RFID (Advanced)</a:t>
             </a:r>
           </a:p>
         </p:txBody>
@@ -3826,7 +4497,7 @@
 </p:sld>
 </file>
 
-<file path=ppt/slides/slide12.xml><?xml version="1.0" encoding="utf-8"?>
+<file path=ppt/slides/slide16.xml><?xml version="1.0" encoding="utf-8"?>
 <p:sld xmlns:a="http://schemas.openxmlformats.org/drawingml/2006/main" xmlns:r="http://schemas.openxmlformats.org/officeDocument/2006/relationships" xmlns:p="http://schemas.openxmlformats.org/presentationml/2006/main">
   <p:cSld>
     <p:spTree>
@@ -3908,6 +4579,12 @@
             <a:r>
               <a:rPr lang="en-US" sz="3500" dirty="0"/>
               <a:t>This specific chip can also write data to RFID chips</a:t>
+            </a:r>
+          </a:p>
+          <a:p>
+            <a:r>
+              <a:rPr lang="en-US" sz="3500" dirty="0"/>
+              <a:t>This is much more advanced than the other types of sensors previously discussed</a:t>
             </a:r>
           </a:p>
           <a:p>
@@ -4149,7 +4826,7 @@
 </p:sld>
 </file>
 
-<file path=ppt/slides/slide13.xml><?xml version="1.0" encoding="utf-8"?>
+<file path=ppt/slides/slide17.xml><?xml version="1.0" encoding="utf-8"?>
 <p:sld xmlns:a="http://schemas.openxmlformats.org/drawingml/2006/main" xmlns:r="http://schemas.openxmlformats.org/officeDocument/2006/relationships" xmlns:p="http://schemas.openxmlformats.org/presentationml/2006/main">
   <p:cSld>
     <p:spTree>
@@ -4411,124 +5088,7 @@
 </p:sld>
 </file>
 
-<file path=ppt/slides/slide14.xml><?xml version="1.0" encoding="utf-8"?>
-<p:sld xmlns:a="http://schemas.openxmlformats.org/drawingml/2006/main" xmlns:r="http://schemas.openxmlformats.org/officeDocument/2006/relationships" xmlns:p="http://schemas.openxmlformats.org/presentationml/2006/main">
-  <p:cSld>
-    <p:spTree>
-      <p:nvGrpSpPr>
-        <p:cNvPr id="1" name=""/>
-        <p:cNvGrpSpPr/>
-        <p:nvPr/>
-      </p:nvGrpSpPr>
-      <p:grpSpPr>
-        <a:xfrm>
-          <a:off x="0" y="0"/>
-          <a:ext cx="0" cy="0"/>
-          <a:chOff x="0" y="0"/>
-          <a:chExt cx="0" cy="0"/>
-        </a:xfrm>
-      </p:grpSpPr>
-      <p:sp>
-        <p:nvSpPr>
-          <p:cNvPr id="2" name="Title 1"/>
-          <p:cNvSpPr>
-            <a:spLocks noGrp="1"/>
-          </p:cNvSpPr>
-          <p:nvPr>
-            <p:ph type="title"/>
-          </p:nvPr>
-        </p:nvSpPr>
-        <p:spPr/>
-        <p:txBody>
-          <a:bodyPr/>
-          <a:lstStyle/>
-          <a:p>
-            <a:r>
-              <a:rPr lang="en-US" dirty="0"/>
-              <a:t>Details – Arduino Uno</a:t>
-            </a:r>
-          </a:p>
-        </p:txBody>
-      </p:sp>
-      <p:sp>
-        <p:nvSpPr>
-          <p:cNvPr id="3" name="Content Placeholder 2"/>
-          <p:cNvSpPr>
-            <a:spLocks noGrp="1"/>
-          </p:cNvSpPr>
-          <p:nvPr>
-            <p:ph idx="1"/>
-          </p:nvPr>
-        </p:nvSpPr>
-        <p:spPr/>
-        <p:txBody>
-          <a:bodyPr>
-            <a:normAutofit/>
-          </a:bodyPr>
-          <a:lstStyle/>
-          <a:p>
-            <a:r>
-              <a:rPr lang="en-US" sz="3500" dirty="0"/>
-              <a:t>Copy stuff from specs page</a:t>
-            </a:r>
-          </a:p>
-        </p:txBody>
-      </p:sp>
-      <p:pic>
-        <p:nvPicPr>
-          <p:cNvPr id="2050" name="Picture 2" descr="http://static.arduino.org/media/k2/galleries/90/A000066-Arduino-Uno-TH-1front.jpg"/>
-          <p:cNvPicPr>
-            <a:picLocks noChangeAspect="1" noChangeArrowheads="1"/>
-          </p:cNvPicPr>
-          <p:nvPr/>
-        </p:nvPicPr>
-        <p:blipFill>
-          <a:blip r:embed="rId2">
-            <a:extLst>
-              <a:ext uri="{28A0092B-C50C-407E-A947-70E740481C1C}">
-                <a14:useLocalDpi xmlns:a14="http://schemas.microsoft.com/office/drawing/2010/main" val="0"/>
-              </a:ext>
-            </a:extLst>
-          </a:blip>
-          <a:srcRect/>
-          <a:stretch>
-            <a:fillRect/>
-          </a:stretch>
-        </p:blipFill>
-        <p:spPr bwMode="auto">
-          <a:xfrm>
-            <a:off x="6477000" y="0"/>
-            <a:ext cx="5715000" cy="4286250"/>
-          </a:xfrm>
-          <a:prstGeom prst="rect">
-            <a:avLst/>
-          </a:prstGeom>
-          <a:noFill/>
-          <a:extLst>
-            <a:ext uri="{909E8E84-426E-40DD-AFC4-6F175D3DCCD1}">
-              <a14:hiddenFill xmlns:a14="http://schemas.microsoft.com/office/drawing/2010/main">
-                <a:solidFill>
-                  <a:srgbClr val="FFFFFF"/>
-                </a:solidFill>
-              </a14:hiddenFill>
-            </a:ext>
-          </a:extLst>
-        </p:spPr>
-      </p:pic>
-    </p:spTree>
-    <p:extLst>
-      <p:ext uri="{BB962C8B-B14F-4D97-AF65-F5344CB8AC3E}">
-        <p14:creationId xmlns:p14="http://schemas.microsoft.com/office/powerpoint/2010/main" val="2547798084"/>
-      </p:ext>
-    </p:extLst>
-  </p:cSld>
-  <p:clrMapOvr>
-    <a:masterClrMapping/>
-  </p:clrMapOvr>
-</p:sld>
-</file>
-
-<file path=ppt/slides/slide15.xml><?xml version="1.0" encoding="utf-8"?>
+<file path=ppt/slides/slide18.xml><?xml version="1.0" encoding="utf-8"?>
 <p:sld xmlns:a="http://schemas.openxmlformats.org/drawingml/2006/main" xmlns:r="http://schemas.openxmlformats.org/officeDocument/2006/relationships" xmlns:p="http://schemas.openxmlformats.org/presentationml/2006/main">
   <p:cSld>
     <p:spTree>
@@ -4632,7 +5192,7 @@
 </p:sld>
 </file>
 
-<file path=ppt/slides/slide16.xml><?xml version="1.0" encoding="utf-8"?>
+<file path=ppt/slides/slide19.xml><?xml version="1.0" encoding="utf-8"?>
 <p:sld xmlns:a="http://schemas.openxmlformats.org/drawingml/2006/main" xmlns:r="http://schemas.openxmlformats.org/officeDocument/2006/relationships" xmlns:p="http://schemas.openxmlformats.org/presentationml/2006/main">
   <p:cSld>
     <p:spTree>
@@ -4812,7 +5372,107 @@
 </p:sld>
 </file>
 
-<file path=ppt/slides/slide17.xml><?xml version="1.0" encoding="utf-8"?>
+<file path=ppt/slides/slide2.xml><?xml version="1.0" encoding="utf-8"?>
+<p:sld xmlns:a="http://schemas.openxmlformats.org/drawingml/2006/main" xmlns:r="http://schemas.openxmlformats.org/officeDocument/2006/relationships" xmlns:p="http://schemas.openxmlformats.org/presentationml/2006/main">
+  <p:cSld>
+    <p:spTree>
+      <p:nvGrpSpPr>
+        <p:cNvPr id="1" name=""/>
+        <p:cNvGrpSpPr/>
+        <p:nvPr/>
+      </p:nvGrpSpPr>
+      <p:grpSpPr>
+        <a:xfrm>
+          <a:off x="0" y="0"/>
+          <a:ext cx="0" cy="0"/>
+          <a:chOff x="0" y="0"/>
+          <a:chExt cx="0" cy="0"/>
+        </a:xfrm>
+      </p:grpSpPr>
+      <p:sp>
+        <p:nvSpPr>
+          <p:cNvPr id="2" name="Title 1">
+            <a:extLst>
+              <a:ext uri="{FF2B5EF4-FFF2-40B4-BE49-F238E27FC236}">
+                <a16:creationId xmlns:a16="http://schemas.microsoft.com/office/drawing/2014/main" id="{9EE90F48-4714-44F1-B592-63DC16E8BD22}"/>
+              </a:ext>
+            </a:extLst>
+          </p:cNvPr>
+          <p:cNvSpPr>
+            <a:spLocks noGrp="1"/>
+          </p:cNvSpPr>
+          <p:nvPr>
+            <p:ph type="title"/>
+          </p:nvPr>
+        </p:nvSpPr>
+        <p:spPr/>
+        <p:txBody>
+          <a:bodyPr/>
+          <a:lstStyle/>
+          <a:p>
+            <a:r>
+              <a:rPr lang="en-US" dirty="0"/>
+              <a:t>Sensors: What do they do?</a:t>
+            </a:r>
+          </a:p>
+        </p:txBody>
+      </p:sp>
+      <p:sp>
+        <p:nvSpPr>
+          <p:cNvPr id="3" name="Content Placeholder 2">
+            <a:extLst>
+              <a:ext uri="{FF2B5EF4-FFF2-40B4-BE49-F238E27FC236}">
+                <a16:creationId xmlns:a16="http://schemas.microsoft.com/office/drawing/2014/main" id="{CF492ED6-E245-4916-B94A-31892634B08B}"/>
+              </a:ext>
+            </a:extLst>
+          </p:cNvPr>
+          <p:cNvSpPr>
+            <a:spLocks noGrp="1"/>
+          </p:cNvSpPr>
+          <p:nvPr>
+            <p:ph idx="1"/>
+          </p:nvPr>
+        </p:nvSpPr>
+        <p:spPr/>
+        <p:txBody>
+          <a:bodyPr>
+            <a:normAutofit/>
+          </a:bodyPr>
+          <a:lstStyle/>
+          <a:p>
+            <a:r>
+              <a:rPr lang="en-US" sz="3000" dirty="0"/>
+              <a:t>Take real world information and translate it to a way the Arduino / microcontrollers can understand</a:t>
+            </a:r>
+          </a:p>
+          <a:p>
+            <a:r>
+              <a:rPr lang="en-US" sz="3000" dirty="0"/>
+              <a:t>Many types of sensors for various applications (sounds, lights, etc..)</a:t>
+            </a:r>
+          </a:p>
+          <a:p>
+            <a:r>
+              <a:rPr lang="en-US" sz="3000" dirty="0"/>
+              <a:t>You can make your program do special things based on sensory input: when it’s too loud, when the ambient light is really low, and many more</a:t>
+            </a:r>
+          </a:p>
+        </p:txBody>
+      </p:sp>
+    </p:spTree>
+    <p:extLst>
+      <p:ext uri="{BB962C8B-B14F-4D97-AF65-F5344CB8AC3E}">
+        <p14:creationId xmlns:p14="http://schemas.microsoft.com/office/powerpoint/2010/main" val="3022095566"/>
+      </p:ext>
+    </p:extLst>
+  </p:cSld>
+  <p:clrMapOvr>
+    <a:masterClrMapping/>
+  </p:clrMapOvr>
+</p:sld>
+</file>
+
+<file path=ppt/slides/slide20.xml><?xml version="1.0" encoding="utf-8"?>
 <p:sld xmlns:a="http://schemas.openxmlformats.org/drawingml/2006/main" xmlns:r="http://schemas.openxmlformats.org/officeDocument/2006/relationships" xmlns:p="http://schemas.openxmlformats.org/presentationml/2006/main">
   <p:cSld>
     <p:spTree>
@@ -5971,7 +6631,7 @@
 </p:sld>
 </file>
 
-<file path=ppt/slides/slide2.xml><?xml version="1.0" encoding="utf-8"?>
+<file path=ppt/slides/slide21.xml><?xml version="1.0" encoding="utf-8"?>
 <p:sld xmlns:a="http://schemas.openxmlformats.org/drawingml/2006/main" xmlns:r="http://schemas.openxmlformats.org/officeDocument/2006/relationships" xmlns:p="http://schemas.openxmlformats.org/presentationml/2006/main">
   <p:cSld>
     <p:spTree>
@@ -5990,7 +6650,13 @@
       </p:grpSpPr>
       <p:sp>
         <p:nvSpPr>
-          <p:cNvPr id="2" name="Title 1"/>
+          <p:cNvPr id="2" name="Title 1">
+            <a:extLst>
+              <a:ext uri="{FF2B5EF4-FFF2-40B4-BE49-F238E27FC236}">
+                <a16:creationId xmlns:a16="http://schemas.microsoft.com/office/drawing/2014/main" id="{8F532394-AEB2-416C-9236-CB64F7FE22C1}"/>
+              </a:ext>
+            </a:extLst>
+          </p:cNvPr>
           <p:cNvSpPr>
             <a:spLocks noGrp="1"/>
           </p:cNvSpPr>
@@ -6005,14 +6671,20 @@
           <a:p>
             <a:r>
               <a:rPr lang="en-US" dirty="0"/>
-              <a:t>Thermal</a:t>
-            </a:r>
-          </a:p>
-        </p:txBody>
-      </p:sp>
-      <p:sp>
-        <p:nvSpPr>
-          <p:cNvPr id="3" name="Content Placeholder 2"/>
+              <a:t>Serial Monitor</a:t>
+            </a:r>
+          </a:p>
+        </p:txBody>
+      </p:sp>
+      <p:sp>
+        <p:nvSpPr>
+          <p:cNvPr id="3" name="Content Placeholder 2">
+            <a:extLst>
+              <a:ext uri="{FF2B5EF4-FFF2-40B4-BE49-F238E27FC236}">
+                <a16:creationId xmlns:a16="http://schemas.microsoft.com/office/drawing/2014/main" id="{59671919-C3EB-4580-B317-2FDFFA68C2D5}"/>
+              </a:ext>
+            </a:extLst>
+          </p:cNvPr>
           <p:cNvSpPr>
             <a:spLocks noGrp="1"/>
           </p:cNvSpPr>
@@ -6021,58 +6693,322 @@
           </p:nvPr>
         </p:nvSpPr>
         <p:spPr/>
+        <p:txBody>
+          <a:bodyPr/>
+          <a:lstStyle/>
+          <a:p>
+            <a:r>
+              <a:rPr lang="en-US" dirty="0"/>
+              <a:t>The premade sketches will write information here for you to see!</a:t>
+            </a:r>
+          </a:p>
+        </p:txBody>
+      </p:sp>
+      <p:grpSp>
+        <p:nvGrpSpPr>
+          <p:cNvPr id="5" name="Group 4">
+            <a:extLst>
+              <a:ext uri="{FF2B5EF4-FFF2-40B4-BE49-F238E27FC236}">
+                <a16:creationId xmlns:a16="http://schemas.microsoft.com/office/drawing/2014/main" id="{DCD1E2A6-3DA3-4C6A-990D-90A6EECD275E}"/>
+              </a:ext>
+            </a:extLst>
+          </p:cNvPr>
+          <p:cNvGrpSpPr/>
+          <p:nvPr/>
+        </p:nvGrpSpPr>
+        <p:grpSpPr>
+          <a:xfrm>
+            <a:off x="2135671" y="2505075"/>
+            <a:ext cx="6191250" cy="4352925"/>
+            <a:chOff x="1072184" y="1824038"/>
+            <a:chExt cx="6191250" cy="4352925"/>
+          </a:xfrm>
+        </p:grpSpPr>
+        <p:pic>
+          <p:nvPicPr>
+            <p:cNvPr id="1026" name="Picture 2" descr="https://i.gyazo.com/9452bb5104b5824d4c4a506ae42bc5cb.png">
+              <a:extLst>
+                <a:ext uri="{FF2B5EF4-FFF2-40B4-BE49-F238E27FC236}">
+                  <a16:creationId xmlns:a16="http://schemas.microsoft.com/office/drawing/2014/main" id="{082A7161-CF5E-4B28-9D47-AB6E10357F1C}"/>
+                </a:ext>
+              </a:extLst>
+            </p:cNvPr>
+            <p:cNvPicPr>
+              <a:picLocks noChangeAspect="1" noChangeArrowheads="1"/>
+            </p:cNvPicPr>
+            <p:nvPr/>
+          </p:nvPicPr>
+          <p:blipFill>
+            <a:blip r:embed="rId2">
+              <a:extLst>
+                <a:ext uri="{28A0092B-C50C-407E-A947-70E740481C1C}">
+                  <a14:useLocalDpi xmlns:a14="http://schemas.microsoft.com/office/drawing/2010/main" val="0"/>
+                </a:ext>
+              </a:extLst>
+            </a:blip>
+            <a:srcRect/>
+            <a:stretch>
+              <a:fillRect/>
+            </a:stretch>
+          </p:blipFill>
+          <p:spPr bwMode="auto">
+            <a:xfrm>
+              <a:off x="1072184" y="1824038"/>
+              <a:ext cx="6191250" cy="4352925"/>
+            </a:xfrm>
+            <a:prstGeom prst="rect">
+              <a:avLst/>
+            </a:prstGeom>
+            <a:noFill/>
+            <a:extLst>
+              <a:ext uri="{909E8E84-426E-40DD-AFC4-6F175D3DCCD1}">
+                <a14:hiddenFill xmlns:a14="http://schemas.microsoft.com/office/drawing/2010/main">
+                  <a:solidFill>
+                    <a:srgbClr val="FFFFFF"/>
+                  </a:solidFill>
+                </a14:hiddenFill>
+              </a:ext>
+            </a:extLst>
+          </p:spPr>
+        </p:pic>
+        <p:sp>
+          <p:nvSpPr>
+            <p:cNvPr id="4" name="Rectangle 3">
+              <a:extLst>
+                <a:ext uri="{FF2B5EF4-FFF2-40B4-BE49-F238E27FC236}">
+                  <a16:creationId xmlns:a16="http://schemas.microsoft.com/office/drawing/2014/main" id="{34768C43-4EC6-49E5-A34F-E209CC201979}"/>
+                </a:ext>
+              </a:extLst>
+            </p:cNvPr>
+            <p:cNvSpPr/>
+            <p:nvPr/>
+          </p:nvSpPr>
+          <p:spPr>
+            <a:xfrm>
+              <a:off x="2325757" y="3369365"/>
+              <a:ext cx="4055165" cy="248478"/>
+            </a:xfrm>
+            <a:prstGeom prst="rect">
+              <a:avLst/>
+            </a:prstGeom>
+            <a:noFill/>
+            <a:ln>
+              <a:solidFill>
+                <a:srgbClr val="FF0000"/>
+              </a:solidFill>
+            </a:ln>
+          </p:spPr>
+          <p:style>
+            <a:lnRef idx="2">
+              <a:schemeClr val="accent1">
+                <a:shade val="50000"/>
+              </a:schemeClr>
+            </a:lnRef>
+            <a:fillRef idx="1">
+              <a:schemeClr val="accent1"/>
+            </a:fillRef>
+            <a:effectRef idx="0">
+              <a:schemeClr val="accent1"/>
+            </a:effectRef>
+            <a:fontRef idx="minor">
+              <a:schemeClr val="lt1"/>
+            </a:fontRef>
+          </p:style>
+          <p:txBody>
+            <a:bodyPr rtlCol="0" anchor="ctr"/>
+            <a:lstStyle/>
+            <a:p>
+              <a:pPr algn="ctr"/>
+              <a:endParaRPr lang="en-US"/>
+            </a:p>
+          </p:txBody>
+        </p:sp>
+      </p:grpSp>
+    </p:spTree>
+    <p:extLst>
+      <p:ext uri="{BB962C8B-B14F-4D97-AF65-F5344CB8AC3E}">
+        <p14:creationId xmlns:p14="http://schemas.microsoft.com/office/powerpoint/2010/main" val="1825012946"/>
+      </p:ext>
+    </p:extLst>
+  </p:cSld>
+  <p:clrMapOvr>
+    <a:masterClrMapping/>
+  </p:clrMapOvr>
+</p:sld>
+</file>
+
+<file path=ppt/slides/slide22.xml><?xml version="1.0" encoding="utf-8"?>
+<p:sld xmlns:a="http://schemas.openxmlformats.org/drawingml/2006/main" xmlns:r="http://schemas.openxmlformats.org/officeDocument/2006/relationships" xmlns:p="http://schemas.openxmlformats.org/presentationml/2006/main">
+  <p:cSld>
+    <p:spTree>
+      <p:nvGrpSpPr>
+        <p:cNvPr id="1" name=""/>
+        <p:cNvGrpSpPr/>
+        <p:nvPr/>
+      </p:nvGrpSpPr>
+      <p:grpSpPr>
+        <a:xfrm>
+          <a:off x="0" y="0"/>
+          <a:ext cx="0" cy="0"/>
+          <a:chOff x="0" y="0"/>
+          <a:chExt cx="0" cy="0"/>
+        </a:xfrm>
+      </p:grpSpPr>
+      <p:sp>
+        <p:nvSpPr>
+          <p:cNvPr id="2" name="Title 1">
+            <a:extLst>
+              <a:ext uri="{FF2B5EF4-FFF2-40B4-BE49-F238E27FC236}">
+                <a16:creationId xmlns:a16="http://schemas.microsoft.com/office/drawing/2014/main" id="{7A38D2A5-F89A-4A76-A21C-03DC250D3609}"/>
+              </a:ext>
+            </a:extLst>
+          </p:cNvPr>
+          <p:cNvSpPr>
+            <a:spLocks noGrp="1"/>
+          </p:cNvSpPr>
+          <p:nvPr>
+            <p:ph type="title"/>
+          </p:nvPr>
+        </p:nvSpPr>
+        <p:spPr/>
+        <p:txBody>
+          <a:bodyPr/>
+          <a:lstStyle/>
+          <a:p>
+            <a:r>
+              <a:rPr lang="en-US" dirty="0"/>
+              <a:t>Downloadable Sketches</a:t>
+            </a:r>
+          </a:p>
+        </p:txBody>
+      </p:sp>
+      <p:sp>
+        <p:nvSpPr>
+          <p:cNvPr id="5" name="Content Placeholder 2">
+            <a:extLst>
+              <a:ext uri="{FF2B5EF4-FFF2-40B4-BE49-F238E27FC236}">
+                <a16:creationId xmlns:a16="http://schemas.microsoft.com/office/drawing/2014/main" id="{19329EFE-1767-4276-8CD3-D9E1B0D1F8E9}"/>
+              </a:ext>
+            </a:extLst>
+          </p:cNvPr>
+          <p:cNvSpPr>
+            <a:spLocks noGrp="1"/>
+          </p:cNvSpPr>
+          <p:nvPr>
+            <p:ph idx="1"/>
+          </p:nvPr>
+        </p:nvSpPr>
+        <p:spPr>
+          <a:xfrm>
+            <a:off x="758687" y="1521234"/>
+            <a:ext cx="10515600" cy="5773599"/>
+          </a:xfrm>
+        </p:spPr>
         <p:txBody>
           <a:bodyPr>
             <a:normAutofit/>
           </a:bodyPr>
           <a:lstStyle/>
           <a:p>
-            <a:r>
-              <a:rPr lang="en-US" sz="3500" dirty="0"/>
-              <a:t>The output voltage changes based on the temperature</a:t>
-            </a:r>
-          </a:p>
-          <a:p>
-            <a:r>
-              <a:rPr lang="en-US" sz="3500" dirty="0"/>
-              <a:t>Note the conversion factor is based off the microcontroller’s (Arduino’s) analog reading</a:t>
-            </a:r>
-          </a:p>
-          <a:p>
-            <a:r>
-              <a:rPr lang="en-US" sz="3500" dirty="0"/>
-              <a:t>5V is the max pin voltage for this</a:t>
-            </a:r>
-          </a:p>
-          <a:p>
-            <a:pPr marL="0" indent="0">
-              <a:buNone/>
+            <a:pPr>
+              <a:lnSpc>
+                <a:spcPct val="200000"/>
+              </a:lnSpc>
             </a:pPr>
             <a:r>
-              <a:rPr lang="en-US" sz="3500" dirty="0"/>
-              <a:t>specific microcontroller</a:t>
-            </a:r>
-          </a:p>
-          <a:p>
-            <a:endParaRPr lang="en-US" sz="3500" dirty="0"/>
-          </a:p>
-          <a:p>
-            <a:endParaRPr lang="en-US" sz="3500" dirty="0"/>
-          </a:p>
-          <a:p>
-            <a:endParaRPr lang="en-US" sz="3500" dirty="0"/>
-          </a:p>
-          <a:p>
-            <a:endParaRPr lang="en-US" sz="3500" dirty="0"/>
-          </a:p>
-          <a:p>
-            <a:endParaRPr lang="en-US" sz="3500" dirty="0"/>
-          </a:p>
-        </p:txBody>
-      </p:sp>
+              <a:rPr lang="en-US" sz="2400" dirty="0"/>
+              <a:t>Potentiometers control LEDs</a:t>
+            </a:r>
+          </a:p>
+          <a:p>
+            <a:pPr>
+              <a:lnSpc>
+                <a:spcPct val="200000"/>
+              </a:lnSpc>
+            </a:pPr>
+            <a:r>
+              <a:rPr lang="en-US" sz="2400" dirty="0"/>
+              <a:t>Thermal sensors control LEDs</a:t>
+            </a:r>
+          </a:p>
+          <a:p>
+            <a:pPr>
+              <a:lnSpc>
+                <a:spcPct val="200000"/>
+              </a:lnSpc>
+            </a:pPr>
+            <a:r>
+              <a:rPr lang="en-US" sz="2400" dirty="0"/>
+              <a:t>Photoresistor control LEDs</a:t>
+            </a:r>
+          </a:p>
+          <a:p>
+            <a:pPr>
+              <a:lnSpc>
+                <a:spcPct val="200000"/>
+              </a:lnSpc>
+            </a:pPr>
+            <a:r>
+              <a:rPr lang="en-US" sz="2400" dirty="0"/>
+              <a:t>Piezo and Speakers</a:t>
+            </a:r>
+          </a:p>
+          <a:p>
+            <a:pPr>
+              <a:lnSpc>
+                <a:spcPct val="200000"/>
+              </a:lnSpc>
+            </a:pPr>
+            <a:r>
+              <a:rPr lang="en-US" dirty="0">
+                <a:solidFill>
+                  <a:srgbClr val="FF0000"/>
+                </a:solidFill>
+              </a:rPr>
+              <a:t>https://goo.gl/dpqBQH</a:t>
+            </a:r>
+          </a:p>
+        </p:txBody>
+      </p:sp>
+    </p:spTree>
+    <p:extLst>
+      <p:ext uri="{BB962C8B-B14F-4D97-AF65-F5344CB8AC3E}">
+        <p14:creationId xmlns:p14="http://schemas.microsoft.com/office/powerpoint/2010/main" val="654294009"/>
+      </p:ext>
+    </p:extLst>
+  </p:cSld>
+  <p:clrMapOvr>
+    <a:masterClrMapping/>
+  </p:clrMapOvr>
+</p:sld>
+</file>
+
+<file path=ppt/slides/slide23.xml><?xml version="1.0" encoding="utf-8"?>
+<p:sld xmlns:a="http://schemas.openxmlformats.org/drawingml/2006/main" xmlns:r="http://schemas.openxmlformats.org/officeDocument/2006/relationships" xmlns:p="http://schemas.openxmlformats.org/presentationml/2006/main">
+  <p:cSld>
+    <p:spTree>
+      <p:nvGrpSpPr>
+        <p:cNvPr id="1" name=""/>
+        <p:cNvGrpSpPr/>
+        <p:nvPr/>
+      </p:nvGrpSpPr>
+      <p:grpSpPr>
+        <a:xfrm>
+          <a:off x="0" y="0"/>
+          <a:ext cx="0" cy="0"/>
+          <a:chOff x="0" y="0"/>
+          <a:chExt cx="0" cy="0"/>
+        </a:xfrm>
+      </p:grpSpPr>
       <p:pic>
         <p:nvPicPr>
-          <p:cNvPr id="1026" name="Picture 2" descr="https://i.gyazo.com/8e5d2f5d5f544080f64af9a4f231276e.png"/>
+          <p:cNvPr id="4" name="Picture 6" descr="https://i.gyazo.com/54c680e655ecf07a417ea7afef986cb3.png">
+            <a:extLst>
+              <a:ext uri="{FF2B5EF4-FFF2-40B4-BE49-F238E27FC236}">
+                <a16:creationId xmlns:a16="http://schemas.microsoft.com/office/drawing/2014/main" id="{5BB1C005-FC62-4F67-8C8B-241D9B65F33F}"/>
+              </a:ext>
+            </a:extLst>
+          </p:cNvPr>
           <p:cNvPicPr>
             <a:picLocks noChangeAspect="1" noChangeArrowheads="1"/>
           </p:cNvPicPr>
@@ -6093,8 +7029,8 @@
         </p:blipFill>
         <p:spPr bwMode="auto">
           <a:xfrm>
-            <a:off x="5084533" y="230188"/>
-            <a:ext cx="6943725" cy="1266825"/>
+            <a:off x="9355215" y="3248906"/>
+            <a:ext cx="2836785" cy="3062994"/>
           </a:xfrm>
           <a:prstGeom prst="rect">
             <a:avLst/>
@@ -6111,9 +7047,699 @@
           </a:extLst>
         </p:spPr>
       </p:pic>
+      <p:sp>
+        <p:nvSpPr>
+          <p:cNvPr id="2" name="Title 1">
+            <a:extLst>
+              <a:ext uri="{FF2B5EF4-FFF2-40B4-BE49-F238E27FC236}">
+                <a16:creationId xmlns:a16="http://schemas.microsoft.com/office/drawing/2014/main" id="{76F2355D-5EB4-4791-9A04-1592D64FA197}"/>
+              </a:ext>
+            </a:extLst>
+          </p:cNvPr>
+          <p:cNvSpPr>
+            <a:spLocks noGrp="1"/>
+          </p:cNvSpPr>
+          <p:nvPr>
+            <p:ph type="title"/>
+          </p:nvPr>
+        </p:nvSpPr>
+        <p:spPr/>
+        <p:txBody>
+          <a:bodyPr/>
+          <a:lstStyle/>
+          <a:p>
+            <a:r>
+              <a:rPr lang="en-US" dirty="0"/>
+              <a:t>Final Points before starting</a:t>
+            </a:r>
+          </a:p>
+        </p:txBody>
+      </p:sp>
+      <p:sp>
+        <p:nvSpPr>
+          <p:cNvPr id="3" name="Content Placeholder 2">
+            <a:extLst>
+              <a:ext uri="{FF2B5EF4-FFF2-40B4-BE49-F238E27FC236}">
+                <a16:creationId xmlns:a16="http://schemas.microsoft.com/office/drawing/2014/main" id="{F3477A48-7FA2-4A11-ADD0-A60E6FE277BA}"/>
+              </a:ext>
+            </a:extLst>
+          </p:cNvPr>
+          <p:cNvSpPr>
+            <a:spLocks noGrp="1"/>
+          </p:cNvSpPr>
+          <p:nvPr>
+            <p:ph idx="1"/>
+          </p:nvPr>
+        </p:nvSpPr>
+        <p:spPr/>
+        <p:txBody>
+          <a:bodyPr/>
+          <a:lstStyle/>
+          <a:p>
+            <a:r>
+              <a:rPr lang="en-US" dirty="0"/>
+              <a:t>Be sure to place a 330 Ohm resistor in between your sensor and GND to protect the component</a:t>
+            </a:r>
+          </a:p>
+          <a:p>
+            <a:r>
+              <a:rPr lang="en-US" dirty="0"/>
+              <a:t>Ensure that the Thermal sensor, is inserted in the proper orientation</a:t>
+            </a:r>
+          </a:p>
+          <a:p>
+            <a:r>
+              <a:rPr lang="en-US" dirty="0"/>
+              <a:t>Change the board type from default (Arduino Uno) to Mega</a:t>
+            </a:r>
+          </a:p>
+          <a:p>
+            <a:endParaRPr lang="en-US" dirty="0"/>
+          </a:p>
+          <a:p>
+            <a:endParaRPr lang="en-US" dirty="0"/>
+          </a:p>
+          <a:p>
+            <a:endParaRPr lang="en-US" dirty="0"/>
+          </a:p>
+        </p:txBody>
+      </p:sp>
+    </p:spTree>
+    <p:extLst>
+      <p:ext uri="{BB962C8B-B14F-4D97-AF65-F5344CB8AC3E}">
+        <p14:creationId xmlns:p14="http://schemas.microsoft.com/office/powerpoint/2010/main" val="2999494360"/>
+      </p:ext>
+    </p:extLst>
+  </p:cSld>
+  <p:clrMapOvr>
+    <a:masterClrMapping/>
+  </p:clrMapOvr>
+</p:sld>
+</file>
+
+<file path=ppt/slides/slide24.xml><?xml version="1.0" encoding="utf-8"?>
+<p:sld xmlns:a="http://schemas.openxmlformats.org/drawingml/2006/main" xmlns:r="http://schemas.openxmlformats.org/officeDocument/2006/relationships" xmlns:p="http://schemas.openxmlformats.org/presentationml/2006/main">
+  <p:cSld>
+    <p:spTree>
+      <p:nvGrpSpPr>
+        <p:cNvPr id="1" name=""/>
+        <p:cNvGrpSpPr/>
+        <p:nvPr/>
+      </p:nvGrpSpPr>
+      <p:grpSpPr>
+        <a:xfrm>
+          <a:off x="0" y="0"/>
+          <a:ext cx="0" cy="0"/>
+          <a:chOff x="0" y="0"/>
+          <a:chExt cx="0" cy="0"/>
+        </a:xfrm>
+      </p:grpSpPr>
+      <p:pic>
+        <p:nvPicPr>
+          <p:cNvPr id="4" name="Picture 3">
+            <a:extLst>
+              <a:ext uri="{FF2B5EF4-FFF2-40B4-BE49-F238E27FC236}">
+                <a16:creationId xmlns:a16="http://schemas.microsoft.com/office/drawing/2014/main" id="{2DFA1CA0-87B9-4813-8A8D-7211367212EF}"/>
+              </a:ext>
+            </a:extLst>
+          </p:cNvPr>
+          <p:cNvPicPr>
+            <a:picLocks noChangeAspect="1"/>
+          </p:cNvPicPr>
+          <p:nvPr/>
+        </p:nvPicPr>
+        <p:blipFill>
+          <a:blip r:embed="rId2"/>
+          <a:stretch>
+            <a:fillRect/>
+          </a:stretch>
+        </p:blipFill>
+        <p:spPr>
+          <a:xfrm>
+            <a:off x="1503500" y="336480"/>
+            <a:ext cx="9344025" cy="5648325"/>
+          </a:xfrm>
+          <a:prstGeom prst="rect">
+            <a:avLst/>
+          </a:prstGeom>
+        </p:spPr>
+      </p:pic>
+    </p:spTree>
+    <p:extLst>
+      <p:ext uri="{BB962C8B-B14F-4D97-AF65-F5344CB8AC3E}">
+        <p14:creationId xmlns:p14="http://schemas.microsoft.com/office/powerpoint/2010/main" val="92648527"/>
+      </p:ext>
+    </p:extLst>
+  </p:cSld>
+  <p:clrMapOvr>
+    <a:masterClrMapping/>
+  </p:clrMapOvr>
+</p:sld>
+</file>
+
+<file path=ppt/slides/slide25.xml><?xml version="1.0" encoding="utf-8"?>
+<p:sld xmlns:a="http://schemas.openxmlformats.org/drawingml/2006/main" xmlns:r="http://schemas.openxmlformats.org/officeDocument/2006/relationships" xmlns:p="http://schemas.openxmlformats.org/presentationml/2006/main">
+  <p:cSld>
+    <p:spTree>
+      <p:nvGrpSpPr>
+        <p:cNvPr id="1" name=""/>
+        <p:cNvGrpSpPr/>
+        <p:nvPr/>
+      </p:nvGrpSpPr>
+      <p:grpSpPr>
+        <a:xfrm>
+          <a:off x="0" y="0"/>
+          <a:ext cx="0" cy="0"/>
+          <a:chOff x="0" y="0"/>
+          <a:chExt cx="0" cy="0"/>
+        </a:xfrm>
+      </p:grpSpPr>
+      <p:sp>
+        <p:nvSpPr>
+          <p:cNvPr id="2" name="Title 1">
+            <a:extLst>
+              <a:ext uri="{FF2B5EF4-FFF2-40B4-BE49-F238E27FC236}">
+                <a16:creationId xmlns:a16="http://schemas.microsoft.com/office/drawing/2014/main" id="{54448416-A0F0-402D-8285-B5ED99046FAC}"/>
+              </a:ext>
+            </a:extLst>
+          </p:cNvPr>
+          <p:cNvSpPr>
+            <a:spLocks noGrp="1"/>
+          </p:cNvSpPr>
+          <p:nvPr>
+            <p:ph type="title"/>
+          </p:nvPr>
+        </p:nvSpPr>
+        <p:spPr/>
+        <p:txBody>
+          <a:bodyPr/>
+          <a:lstStyle/>
+          <a:p>
+            <a:r>
+              <a:rPr lang="en-US" dirty="0"/>
+              <a:t>Download Sketches at:</a:t>
+            </a:r>
+          </a:p>
+        </p:txBody>
+      </p:sp>
+      <p:sp>
+        <p:nvSpPr>
+          <p:cNvPr id="3" name="Content Placeholder 2">
+            <a:extLst>
+              <a:ext uri="{FF2B5EF4-FFF2-40B4-BE49-F238E27FC236}">
+                <a16:creationId xmlns:a16="http://schemas.microsoft.com/office/drawing/2014/main" id="{864092A5-B3B7-4A7A-995D-63DCA7BF5EE4}"/>
+              </a:ext>
+            </a:extLst>
+          </p:cNvPr>
+          <p:cNvSpPr>
+            <a:spLocks noGrp="1"/>
+          </p:cNvSpPr>
+          <p:nvPr>
+            <p:ph idx="1"/>
+          </p:nvPr>
+        </p:nvSpPr>
+        <p:spPr>
+          <a:xfrm>
+            <a:off x="311425" y="2988502"/>
+            <a:ext cx="12569687" cy="5598906"/>
+          </a:xfrm>
+        </p:spPr>
+        <p:txBody>
+          <a:bodyPr>
+            <a:normAutofit/>
+          </a:bodyPr>
+          <a:lstStyle/>
+          <a:p>
+            <a:pPr marL="0" indent="0">
+              <a:buNone/>
+            </a:pPr>
+            <a:r>
+              <a:rPr lang="en-US" sz="9600" dirty="0">
+                <a:solidFill>
+                  <a:srgbClr val="FF0000"/>
+                </a:solidFill>
+              </a:rPr>
+              <a:t>https://goo.gl/dpqBQH</a:t>
+            </a:r>
+          </a:p>
+          <a:p>
+            <a:endParaRPr lang="en-US" sz="7000" dirty="0"/>
+          </a:p>
+        </p:txBody>
+      </p:sp>
+    </p:spTree>
+    <p:extLst>
+      <p:ext uri="{BB962C8B-B14F-4D97-AF65-F5344CB8AC3E}">
+        <p14:creationId xmlns:p14="http://schemas.microsoft.com/office/powerpoint/2010/main" val="898307606"/>
+      </p:ext>
+    </p:extLst>
+  </p:cSld>
+  <p:clrMapOvr>
+    <a:masterClrMapping/>
+  </p:clrMapOvr>
+</p:sld>
+</file>
+
+<file path=ppt/slides/slide26.xml><?xml version="1.0" encoding="utf-8"?>
+<p:sld xmlns:a="http://schemas.openxmlformats.org/drawingml/2006/main" xmlns:r="http://schemas.openxmlformats.org/officeDocument/2006/relationships" xmlns:p="http://schemas.openxmlformats.org/presentationml/2006/main">
+  <p:cSld>
+    <p:spTree>
+      <p:nvGrpSpPr>
+        <p:cNvPr id="1" name=""/>
+        <p:cNvGrpSpPr/>
+        <p:nvPr/>
+      </p:nvGrpSpPr>
+      <p:grpSpPr>
+        <a:xfrm>
+          <a:off x="0" y="0"/>
+          <a:ext cx="0" cy="0"/>
+          <a:chOff x="0" y="0"/>
+          <a:chExt cx="0" cy="0"/>
+        </a:xfrm>
+      </p:grpSpPr>
+      <p:sp>
+        <p:nvSpPr>
+          <p:cNvPr id="2" name="Title 1">
+            <a:extLst>
+              <a:ext uri="{FF2B5EF4-FFF2-40B4-BE49-F238E27FC236}">
+                <a16:creationId xmlns:a16="http://schemas.microsoft.com/office/drawing/2014/main" id="{84E1584E-52B5-4F0E-BDA1-54E3F46D599E}"/>
+              </a:ext>
+            </a:extLst>
+          </p:cNvPr>
+          <p:cNvSpPr>
+            <a:spLocks noGrp="1"/>
+          </p:cNvSpPr>
+          <p:nvPr>
+            <p:ph type="title"/>
+          </p:nvPr>
+        </p:nvSpPr>
+        <p:spPr/>
+        <p:txBody>
+          <a:bodyPr/>
+          <a:lstStyle/>
+          <a:p>
+            <a:r>
+              <a:rPr lang="en-US" dirty="0"/>
+              <a:t>Wiring for photoresistor sketch</a:t>
+            </a:r>
+          </a:p>
+        </p:txBody>
+      </p:sp>
+      <p:pic>
+        <p:nvPicPr>
+          <p:cNvPr id="2050" name="Picture 2" descr="Picture of The Circuit">
+            <a:extLst>
+              <a:ext uri="{FF2B5EF4-FFF2-40B4-BE49-F238E27FC236}">
+                <a16:creationId xmlns:a16="http://schemas.microsoft.com/office/drawing/2014/main" id="{FA9F28FA-B558-491E-858B-7E6C9A292315}"/>
+              </a:ext>
+            </a:extLst>
+          </p:cNvPr>
+          <p:cNvPicPr>
+            <a:picLocks noChangeAspect="1" noChangeArrowheads="1"/>
+          </p:cNvPicPr>
+          <p:nvPr/>
+        </p:nvPicPr>
+        <p:blipFill>
+          <a:blip r:embed="rId2">
+            <a:extLst>
+              <a:ext uri="{28A0092B-C50C-407E-A947-70E740481C1C}">
+                <a14:useLocalDpi xmlns:a14="http://schemas.microsoft.com/office/drawing/2010/main" val="0"/>
+              </a:ext>
+            </a:extLst>
+          </a:blip>
+          <a:srcRect/>
+          <a:stretch>
+            <a:fillRect/>
+          </a:stretch>
+        </p:blipFill>
+        <p:spPr bwMode="auto">
+          <a:xfrm>
+            <a:off x="1478188" y="1958009"/>
+            <a:ext cx="8335875" cy="4678846"/>
+          </a:xfrm>
+          <a:prstGeom prst="rect">
+            <a:avLst/>
+          </a:prstGeom>
+          <a:noFill/>
+          <a:extLst>
+            <a:ext uri="{909E8E84-426E-40DD-AFC4-6F175D3DCCD1}">
+              <a14:hiddenFill xmlns:a14="http://schemas.microsoft.com/office/drawing/2010/main">
+                <a:solidFill>
+                  <a:srgbClr val="FFFFFF"/>
+                </a:solidFill>
+              </a14:hiddenFill>
+            </a:ext>
+          </a:extLst>
+        </p:spPr>
+      </p:pic>
+    </p:spTree>
+    <p:extLst>
+      <p:ext uri="{BB962C8B-B14F-4D97-AF65-F5344CB8AC3E}">
+        <p14:creationId xmlns:p14="http://schemas.microsoft.com/office/powerpoint/2010/main" val="1045034901"/>
+      </p:ext>
+    </p:extLst>
+  </p:cSld>
+  <p:clrMapOvr>
+    <a:masterClrMapping/>
+  </p:clrMapOvr>
+</p:sld>
+</file>
+
+<file path=ppt/slides/slide3.xml><?xml version="1.0" encoding="utf-8"?>
+<p:sld xmlns:a="http://schemas.openxmlformats.org/drawingml/2006/main" xmlns:r="http://schemas.openxmlformats.org/officeDocument/2006/relationships" xmlns:p="http://schemas.openxmlformats.org/presentationml/2006/main">
+  <p:cSld>
+    <p:spTree>
+      <p:nvGrpSpPr>
+        <p:cNvPr id="1" name=""/>
+        <p:cNvGrpSpPr/>
+        <p:nvPr/>
+      </p:nvGrpSpPr>
+      <p:grpSpPr>
+        <a:xfrm>
+          <a:off x="0" y="0"/>
+          <a:ext cx="0" cy="0"/>
+          <a:chOff x="0" y="0"/>
+          <a:chExt cx="0" cy="0"/>
+        </a:xfrm>
+      </p:grpSpPr>
+      <p:sp>
+        <p:nvSpPr>
+          <p:cNvPr id="2" name="Title 1">
+            <a:extLst>
+              <a:ext uri="{FF2B5EF4-FFF2-40B4-BE49-F238E27FC236}">
+                <a16:creationId xmlns:a16="http://schemas.microsoft.com/office/drawing/2014/main" id="{DD97671F-C569-4D7E-9B84-B866FBA79B67}"/>
+              </a:ext>
+            </a:extLst>
+          </p:cNvPr>
+          <p:cNvSpPr>
+            <a:spLocks noGrp="1"/>
+          </p:cNvSpPr>
+          <p:nvPr>
+            <p:ph type="title"/>
+          </p:nvPr>
+        </p:nvSpPr>
+        <p:spPr/>
+        <p:txBody>
+          <a:bodyPr/>
+          <a:lstStyle/>
+          <a:p>
+            <a:r>
+              <a:rPr lang="en-US" dirty="0"/>
+              <a:t>How do they work?</a:t>
+            </a:r>
+          </a:p>
+        </p:txBody>
+      </p:sp>
+      <p:sp>
+        <p:nvSpPr>
+          <p:cNvPr id="3" name="Content Placeholder 2">
+            <a:extLst>
+              <a:ext uri="{FF2B5EF4-FFF2-40B4-BE49-F238E27FC236}">
+                <a16:creationId xmlns:a16="http://schemas.microsoft.com/office/drawing/2014/main" id="{CF37B45B-1DEB-419C-9570-99C73001EF6D}"/>
+              </a:ext>
+            </a:extLst>
+          </p:cNvPr>
+          <p:cNvSpPr>
+            <a:spLocks noGrp="1"/>
+          </p:cNvSpPr>
+          <p:nvPr>
+            <p:ph idx="1"/>
+          </p:nvPr>
+        </p:nvSpPr>
+        <p:spPr/>
+        <p:txBody>
+          <a:bodyPr>
+            <a:normAutofit/>
+          </a:bodyPr>
+          <a:lstStyle/>
+          <a:p>
+            <a:r>
+              <a:rPr lang="en-US" sz="3000" dirty="0"/>
+              <a:t>Different sensors have different implementations</a:t>
+            </a:r>
+          </a:p>
+          <a:p>
+            <a:r>
+              <a:rPr lang="en-US" sz="3000" dirty="0"/>
+              <a:t>All basic sensors convey information to the Arduino over a single Analog input (more advanced sensors can use more) </a:t>
+            </a:r>
+          </a:p>
+          <a:p>
+            <a:r>
+              <a:rPr lang="en-US" sz="3000" dirty="0"/>
+              <a:t>The rest is up to you! You decide when you want to read the information, and what to do with it</a:t>
+            </a:r>
+          </a:p>
+        </p:txBody>
+      </p:sp>
+    </p:spTree>
+    <p:extLst>
+      <p:ext uri="{BB962C8B-B14F-4D97-AF65-F5344CB8AC3E}">
+        <p14:creationId xmlns:p14="http://schemas.microsoft.com/office/powerpoint/2010/main" val="3030191649"/>
+      </p:ext>
+    </p:extLst>
+  </p:cSld>
+  <p:clrMapOvr>
+    <a:masterClrMapping/>
+  </p:clrMapOvr>
+</p:sld>
+</file>
+
+<file path=ppt/slides/slide4.xml><?xml version="1.0" encoding="utf-8"?>
+<p:sld xmlns:a="http://schemas.openxmlformats.org/drawingml/2006/main" xmlns:r="http://schemas.openxmlformats.org/officeDocument/2006/relationships" xmlns:p="http://schemas.openxmlformats.org/presentationml/2006/main">
+  <p:cSld>
+    <p:spTree>
+      <p:nvGrpSpPr>
+        <p:cNvPr id="1" name=""/>
+        <p:cNvGrpSpPr/>
+        <p:nvPr/>
+      </p:nvGrpSpPr>
+      <p:grpSpPr>
+        <a:xfrm>
+          <a:off x="0" y="0"/>
+          <a:ext cx="0" cy="0"/>
+          <a:chOff x="0" y="0"/>
+          <a:chExt cx="0" cy="0"/>
+        </a:xfrm>
+      </p:grpSpPr>
+      <p:sp>
+        <p:nvSpPr>
+          <p:cNvPr id="2" name="Title 1">
+            <a:extLst>
+              <a:ext uri="{FF2B5EF4-FFF2-40B4-BE49-F238E27FC236}">
+                <a16:creationId xmlns:a16="http://schemas.microsoft.com/office/drawing/2014/main" id="{55576B6F-EEDE-4398-BB25-65CBE1E8C138}"/>
+              </a:ext>
+            </a:extLst>
+          </p:cNvPr>
+          <p:cNvSpPr>
+            <a:spLocks noGrp="1"/>
+          </p:cNvSpPr>
+          <p:nvPr>
+            <p:ph type="title"/>
+          </p:nvPr>
+        </p:nvSpPr>
+        <p:spPr/>
+        <p:txBody>
+          <a:bodyPr/>
+          <a:lstStyle/>
+          <a:p>
+            <a:r>
+              <a:rPr lang="en-US" dirty="0"/>
+              <a:t>Some points before we get started…</a:t>
+            </a:r>
+          </a:p>
+        </p:txBody>
+      </p:sp>
+      <p:sp>
+        <p:nvSpPr>
+          <p:cNvPr id="3" name="Content Placeholder 2">
+            <a:extLst>
+              <a:ext uri="{FF2B5EF4-FFF2-40B4-BE49-F238E27FC236}">
+                <a16:creationId xmlns:a16="http://schemas.microsoft.com/office/drawing/2014/main" id="{86132C74-F8B9-47DB-B3C9-70FB620E8870}"/>
+              </a:ext>
+            </a:extLst>
+          </p:cNvPr>
+          <p:cNvSpPr>
+            <a:spLocks noGrp="1"/>
+          </p:cNvSpPr>
+          <p:nvPr>
+            <p:ph idx="1"/>
+          </p:nvPr>
+        </p:nvSpPr>
+        <p:spPr/>
+        <p:txBody>
+          <a:bodyPr>
+            <a:normAutofit/>
+          </a:bodyPr>
+          <a:lstStyle/>
+          <a:p>
+            <a:r>
+              <a:rPr lang="en-US" sz="3000" dirty="0"/>
+              <a:t>The Arduinos we usually use are 5V. The other most common is 3.3V, which some sensors may require (we will see this later)</a:t>
+            </a:r>
+          </a:p>
+          <a:p>
+            <a:pPr lvl="1"/>
+            <a:r>
+              <a:rPr lang="en-US" sz="2600" dirty="0"/>
+              <a:t>For all basic sensors, we can assume they will use 5V</a:t>
+            </a:r>
+          </a:p>
+          <a:p>
+            <a:endParaRPr lang="en-US" sz="3000" dirty="0"/>
+          </a:p>
+        </p:txBody>
+      </p:sp>
+    </p:spTree>
+    <p:extLst>
+      <p:ext uri="{BB962C8B-B14F-4D97-AF65-F5344CB8AC3E}">
+        <p14:creationId xmlns:p14="http://schemas.microsoft.com/office/powerpoint/2010/main" val="1670477649"/>
+      </p:ext>
+    </p:extLst>
+  </p:cSld>
+  <p:clrMapOvr>
+    <a:masterClrMapping/>
+  </p:clrMapOvr>
+</p:sld>
+</file>
+
+<file path=ppt/slides/slide5.xml><?xml version="1.0" encoding="utf-8"?>
+<p:sld xmlns:a="http://schemas.openxmlformats.org/drawingml/2006/main" xmlns:r="http://schemas.openxmlformats.org/officeDocument/2006/relationships" xmlns:p="http://schemas.openxmlformats.org/presentationml/2006/main">
+  <p:cSld>
+    <p:spTree>
+      <p:nvGrpSpPr>
+        <p:cNvPr id="1" name=""/>
+        <p:cNvGrpSpPr/>
+        <p:nvPr/>
+      </p:nvGrpSpPr>
+      <p:grpSpPr>
+        <a:xfrm>
+          <a:off x="0" y="0"/>
+          <a:ext cx="0" cy="0"/>
+          <a:chOff x="0" y="0"/>
+          <a:chExt cx="0" cy="0"/>
+        </a:xfrm>
+      </p:grpSpPr>
       <p:pic>
         <p:nvPicPr>
           <p:cNvPr id="1028" name="Picture 4" descr="https://i.gyazo.com/bfe1d0246af1adebf356d9d58cc45524.png"/>
+          <p:cNvPicPr>
+            <a:picLocks noChangeAspect="1" noChangeArrowheads="1"/>
+          </p:cNvPicPr>
+          <p:nvPr/>
+        </p:nvPicPr>
+        <p:blipFill>
+          <a:blip r:embed="rId2">
+            <a:extLst>
+              <a:ext uri="{28A0092B-C50C-407E-A947-70E740481C1C}">
+                <a14:useLocalDpi xmlns:a14="http://schemas.microsoft.com/office/drawing/2010/main" val="0"/>
+              </a:ext>
+            </a:extLst>
+          </a:blip>
+          <a:srcRect/>
+          <a:stretch>
+            <a:fillRect/>
+          </a:stretch>
+        </p:blipFill>
+        <p:spPr bwMode="auto">
+          <a:xfrm>
+            <a:off x="7735685" y="3636369"/>
+            <a:ext cx="4392547" cy="3688769"/>
+          </a:xfrm>
+          <a:prstGeom prst="rect">
+            <a:avLst/>
+          </a:prstGeom>
+          <a:noFill/>
+          <a:extLst>
+            <a:ext uri="{909E8E84-426E-40DD-AFC4-6F175D3DCCD1}">
+              <a14:hiddenFill xmlns:a14="http://schemas.microsoft.com/office/drawing/2010/main">
+                <a:solidFill>
+                  <a:srgbClr val="FFFFFF"/>
+                </a:solidFill>
+              </a14:hiddenFill>
+            </a:ext>
+          </a:extLst>
+        </p:spPr>
+      </p:pic>
+      <p:sp>
+        <p:nvSpPr>
+          <p:cNvPr id="2" name="Title 1"/>
+          <p:cNvSpPr>
+            <a:spLocks noGrp="1"/>
+          </p:cNvSpPr>
+          <p:nvPr>
+            <p:ph type="title"/>
+          </p:nvPr>
+        </p:nvSpPr>
+        <p:spPr/>
+        <p:txBody>
+          <a:bodyPr/>
+          <a:lstStyle/>
+          <a:p>
+            <a:r>
+              <a:rPr lang="en-US" dirty="0"/>
+              <a:t>Thermal</a:t>
+            </a:r>
+          </a:p>
+        </p:txBody>
+      </p:sp>
+      <p:sp>
+        <p:nvSpPr>
+          <p:cNvPr id="3" name="Content Placeholder 2"/>
+          <p:cNvSpPr>
+            <a:spLocks noGrp="1"/>
+          </p:cNvSpPr>
+          <p:nvPr>
+            <p:ph idx="1"/>
+          </p:nvPr>
+        </p:nvSpPr>
+        <p:spPr/>
+        <p:txBody>
+          <a:bodyPr>
+            <a:normAutofit/>
+          </a:bodyPr>
+          <a:lstStyle/>
+          <a:p>
+            <a:r>
+              <a:rPr lang="en-US" sz="3500" dirty="0"/>
+              <a:t>The output voltage changes based on the temperature (sent to and read by the Arduino)</a:t>
+            </a:r>
+          </a:p>
+          <a:p>
+            <a:r>
+              <a:rPr lang="en-US" sz="3500" dirty="0"/>
+              <a:t>See Graph: Amount of volts changes with temperature</a:t>
+            </a:r>
+          </a:p>
+          <a:p>
+            <a:pPr marL="0" indent="0">
+              <a:buNone/>
+            </a:pPr>
+            <a:endParaRPr lang="en-US" sz="3500" dirty="0"/>
+          </a:p>
+          <a:p>
+            <a:endParaRPr lang="en-US" sz="3500" dirty="0"/>
+          </a:p>
+          <a:p>
+            <a:endParaRPr lang="en-US" sz="3500" dirty="0"/>
+          </a:p>
+          <a:p>
+            <a:endParaRPr lang="en-US" sz="3500" dirty="0"/>
+          </a:p>
+          <a:p>
+            <a:endParaRPr lang="en-US" sz="3500" dirty="0"/>
+          </a:p>
+        </p:txBody>
+      </p:sp>
+      <p:pic>
+        <p:nvPicPr>
+          <p:cNvPr id="6" name="Picture 6" descr="https://i.gyazo.com/54c680e655ecf07a417ea7afef986cb3.png">
+            <a:extLst>
+              <a:ext uri="{FF2B5EF4-FFF2-40B4-BE49-F238E27FC236}">
+                <a16:creationId xmlns:a16="http://schemas.microsoft.com/office/drawing/2014/main" id="{42F92AC0-E88F-473A-8365-926FC1D7C7A9}"/>
+              </a:ext>
+            </a:extLst>
+          </p:cNvPr>
           <p:cNvPicPr>
             <a:picLocks noChangeAspect="1" noChangeArrowheads="1"/>
           </p:cNvPicPr>
@@ -6134,54 +7760,7 @@
         </p:blipFill>
         <p:spPr bwMode="auto">
           <a:xfrm>
-            <a:off x="7799453" y="3437587"/>
-            <a:ext cx="4392547" cy="3688769"/>
-          </a:xfrm>
-          <a:prstGeom prst="rect">
-            <a:avLst/>
-          </a:prstGeom>
-          <a:noFill/>
-          <a:extLst>
-            <a:ext uri="{909E8E84-426E-40DD-AFC4-6F175D3DCCD1}">
-              <a14:hiddenFill xmlns:a14="http://schemas.microsoft.com/office/drawing/2010/main">
-                <a:solidFill>
-                  <a:srgbClr val="FFFFFF"/>
-                </a:solidFill>
-              </a14:hiddenFill>
-            </a:ext>
-          </a:extLst>
-        </p:spPr>
-      </p:pic>
-      <p:pic>
-        <p:nvPicPr>
-          <p:cNvPr id="6" name="Picture 6" descr="https://i.gyazo.com/54c680e655ecf07a417ea7afef986cb3.png">
-            <a:extLst>
-              <a:ext uri="{FF2B5EF4-FFF2-40B4-BE49-F238E27FC236}">
-                <a16:creationId xmlns:a16="http://schemas.microsoft.com/office/drawing/2014/main" id="{42F92AC0-E88F-473A-8365-926FC1D7C7A9}"/>
-              </a:ext>
-            </a:extLst>
-          </p:cNvPr>
-          <p:cNvPicPr>
-            <a:picLocks noChangeAspect="1" noChangeArrowheads="1"/>
-          </p:cNvPicPr>
-          <p:nvPr/>
-        </p:nvPicPr>
-        <p:blipFill>
-          <a:blip r:embed="rId4">
-            <a:extLst>
-              <a:ext uri="{28A0092B-C50C-407E-A947-70E740481C1C}">
-                <a14:useLocalDpi xmlns:a14="http://schemas.microsoft.com/office/drawing/2010/main" val="0"/>
-              </a:ext>
-            </a:extLst>
-          </a:blip>
-          <a:srcRect/>
-          <a:stretch>
-            <a:fillRect/>
-          </a:stretch>
-        </p:blipFill>
-        <p:spPr bwMode="auto">
-          <a:xfrm>
-            <a:off x="5223850" y="4063362"/>
+            <a:off x="1612632" y="3795006"/>
             <a:ext cx="2836785" cy="3062994"/>
           </a:xfrm>
           <a:prstGeom prst="rect">
@@ -6212,7 +7791,7 @@
 </p:sld>
 </file>
 
-<file path=ppt/slides/slide3.xml><?xml version="1.0" encoding="utf-8"?>
+<file path=ppt/slides/slide6.xml><?xml version="1.0" encoding="utf-8"?>
 <p:sld xmlns:a="http://schemas.openxmlformats.org/drawingml/2006/main" xmlns:r="http://schemas.openxmlformats.org/officeDocument/2006/relationships" xmlns:p="http://schemas.openxmlformats.org/presentationml/2006/main">
   <p:cSld>
     <p:spTree>
@@ -6370,7 +7949,7 @@
 </p:sld>
 </file>
 
-<file path=ppt/slides/slide4.xml><?xml version="1.0" encoding="utf-8"?>
+<file path=ppt/slides/slide7.xml><?xml version="1.0" encoding="utf-8"?>
 <p:sld xmlns:a="http://schemas.openxmlformats.org/drawingml/2006/main" xmlns:r="http://schemas.openxmlformats.org/officeDocument/2006/relationships" xmlns:p="http://schemas.openxmlformats.org/presentationml/2006/main">
   <p:cSld>
     <p:spTree>
@@ -6404,6 +7983,88 @@
           <a:p>
             <a:r>
               <a:rPr lang="en-US" dirty="0"/>
+              <a:t>Photoresistor and Light Sensor</a:t>
+            </a:r>
+          </a:p>
+        </p:txBody>
+      </p:sp>
+      <p:sp>
+        <p:nvSpPr>
+          <p:cNvPr id="3" name="Content Placeholder 2"/>
+          <p:cNvSpPr>
+            <a:spLocks noGrp="1"/>
+          </p:cNvSpPr>
+          <p:nvPr>
+            <p:ph idx="1"/>
+          </p:nvPr>
+        </p:nvSpPr>
+        <p:spPr/>
+        <p:txBody>
+          <a:bodyPr>
+            <a:normAutofit/>
+          </a:bodyPr>
+          <a:lstStyle/>
+          <a:p>
+            <a:r>
+              <a:rPr lang="en-US" sz="3500" dirty="0"/>
+              <a:t>Both serve the same purpose: determine surrounding light levels</a:t>
+            </a:r>
+          </a:p>
+          <a:p>
+            <a:r>
+              <a:rPr lang="en-US" sz="3500" dirty="0"/>
+              <a:t>Different implementations! But in both cases the voltage on the analog pin is higher the more light there is</a:t>
+            </a:r>
+          </a:p>
+        </p:txBody>
+      </p:sp>
+    </p:spTree>
+    <p:extLst>
+      <p:ext uri="{BB962C8B-B14F-4D97-AF65-F5344CB8AC3E}">
+        <p14:creationId xmlns:p14="http://schemas.microsoft.com/office/powerpoint/2010/main" val="1331218805"/>
+      </p:ext>
+    </p:extLst>
+  </p:cSld>
+  <p:clrMapOvr>
+    <a:masterClrMapping/>
+  </p:clrMapOvr>
+</p:sld>
+</file>
+
+<file path=ppt/slides/slide8.xml><?xml version="1.0" encoding="utf-8"?>
+<p:sld xmlns:a="http://schemas.openxmlformats.org/drawingml/2006/main" xmlns:r="http://schemas.openxmlformats.org/officeDocument/2006/relationships" xmlns:p="http://schemas.openxmlformats.org/presentationml/2006/main">
+  <p:cSld>
+    <p:spTree>
+      <p:nvGrpSpPr>
+        <p:cNvPr id="1" name=""/>
+        <p:cNvGrpSpPr/>
+        <p:nvPr/>
+      </p:nvGrpSpPr>
+      <p:grpSpPr>
+        <a:xfrm>
+          <a:off x="0" y="0"/>
+          <a:ext cx="0" cy="0"/>
+          <a:chOff x="0" y="0"/>
+          <a:chExt cx="0" cy="0"/>
+        </a:xfrm>
+      </p:grpSpPr>
+      <p:sp>
+        <p:nvSpPr>
+          <p:cNvPr id="2" name="Title 1"/>
+          <p:cNvSpPr>
+            <a:spLocks noGrp="1"/>
+          </p:cNvSpPr>
+          <p:nvPr>
+            <p:ph type="title"/>
+          </p:nvPr>
+        </p:nvSpPr>
+        <p:spPr/>
+        <p:txBody>
+          <a:bodyPr/>
+          <a:lstStyle/>
+          <a:p>
+            <a:r>
+              <a:rPr lang="en-US" dirty="0"/>
               <a:t>Photoresistor</a:t>
             </a:r>
           </a:p>
@@ -6433,7 +8094,7 @@
           <a:p>
             <a:r>
               <a:rPr lang="en-US" sz="3500" dirty="0"/>
-              <a:t>Acts as a resistor</a:t>
+              <a:t>Acts as a variable resistor </a:t>
             </a:r>
           </a:p>
           <a:p>
@@ -6461,7 +8122,7 @@
           <a:p>
             <a:r>
               <a:rPr lang="en-US" sz="3500" dirty="0"/>
-              <a:t>Can be read by the Arduino as</a:t>
+              <a:t>The amount of voltage dropped </a:t>
             </a:r>
           </a:p>
           <a:p>
@@ -6470,7 +8131,7 @@
             </a:pPr>
             <a:r>
               <a:rPr lang="en-US" sz="3500" dirty="0"/>
-              <a:t>a normal resistor, up to the user </a:t>
+              <a:t>across this resistor (which you can </a:t>
             </a:r>
           </a:p>
           <a:p>
@@ -6479,16 +8140,22 @@
             </a:pPr>
             <a:r>
               <a:rPr lang="en-US" sz="3500" dirty="0"/>
-              <a:t>To make a meaningful interpretation of the data</a:t>
+              <a:t>read on an Arduino) indicates how big the resistance is.</a:t>
             </a:r>
           </a:p>
           <a:p>
             <a:pPr marL="0" indent="0">
               <a:buNone/>
             </a:pPr>
+            <a:endParaRPr lang="en-US" sz="3500" dirty="0"/>
+          </a:p>
+          <a:p>
+            <a:pPr marL="0" indent="0">
+              <a:buNone/>
+            </a:pPr>
             <a:r>
               <a:rPr lang="en-US" sz="3500" dirty="0"/>
-              <a:t>(put serial log pic here)</a:t>
+              <a:t>The darker it is, more voltage is lost across this sensor</a:t>
             </a:r>
           </a:p>
         </p:txBody>
@@ -6547,7 +8214,7 @@
 </p:sld>
 </file>
 
-<file path=ppt/slides/slide5.xml><?xml version="1.0" encoding="utf-8"?>
+<file path=ppt/slides/slide9.xml><?xml version="1.0" encoding="utf-8"?>
 <p:sld xmlns:a="http://schemas.openxmlformats.org/drawingml/2006/main" xmlns:r="http://schemas.openxmlformats.org/officeDocument/2006/relationships" xmlns:p="http://schemas.openxmlformats.org/presentationml/2006/main">
   <p:cSld>
     <p:spTree>
@@ -6564,87 +8231,6 @@
           <a:chExt cx="0" cy="0"/>
         </a:xfrm>
       </p:grpSpPr>
-      <p:sp>
-        <p:nvSpPr>
-          <p:cNvPr id="2" name="Title 1"/>
-          <p:cNvSpPr>
-            <a:spLocks noGrp="1"/>
-          </p:cNvSpPr>
-          <p:nvPr>
-            <p:ph type="title"/>
-          </p:nvPr>
-        </p:nvSpPr>
-        <p:spPr/>
-        <p:txBody>
-          <a:bodyPr/>
-          <a:lstStyle/>
-          <a:p>
-            <a:r>
-              <a:rPr lang="en-US" dirty="0"/>
-              <a:t>Light Sensor</a:t>
-            </a:r>
-          </a:p>
-        </p:txBody>
-      </p:sp>
-      <p:sp>
-        <p:nvSpPr>
-          <p:cNvPr id="3" name="Content Placeholder 2"/>
-          <p:cNvSpPr>
-            <a:spLocks noGrp="1"/>
-          </p:cNvSpPr>
-          <p:nvPr>
-            <p:ph idx="1"/>
-          </p:nvPr>
-        </p:nvSpPr>
-        <p:spPr>
-          <a:xfrm>
-            <a:off x="490330" y="1765990"/>
-            <a:ext cx="10515600" cy="4351338"/>
-          </a:xfrm>
-        </p:spPr>
-        <p:txBody>
-          <a:bodyPr>
-            <a:normAutofit/>
-          </a:bodyPr>
-          <a:lstStyle/>
-          <a:p>
-            <a:r>
-              <a:rPr lang="en-US" sz="3500" dirty="0"/>
-              <a:t>Acts as a transistor</a:t>
-            </a:r>
-          </a:p>
-          <a:p>
-            <a:r>
-              <a:rPr lang="en-US" sz="3500" dirty="0"/>
-              <a:t>More light = sends more voltage to the </a:t>
-            </a:r>
-          </a:p>
-          <a:p>
-            <a:pPr marL="0" indent="0">
-              <a:buNone/>
-            </a:pPr>
-            <a:r>
-              <a:rPr lang="en-US" sz="3500" dirty="0"/>
-              <a:t>analog pin</a:t>
-            </a:r>
-          </a:p>
-          <a:p>
-            <a:r>
-              <a:rPr lang="en-US" sz="3500" dirty="0"/>
-              <a:t>This particular picture is a breakout board</a:t>
-            </a:r>
-          </a:p>
-          <a:p>
-            <a:pPr marL="0" indent="0">
-              <a:buNone/>
-            </a:pPr>
-            <a:r>
-              <a:rPr lang="en-US" sz="3500" dirty="0"/>
-              <a:t> for Arduino and similar devices</a:t>
-            </a:r>
-          </a:p>
-        </p:txBody>
-      </p:sp>
       <p:pic>
         <p:nvPicPr>
           <p:cNvPr id="4" name="Picture 4" descr="SparkFun Ambient Light Sensor Breakout - TEMT6000"/>
@@ -6686,537 +8272,94 @@
           </a:extLst>
         </p:spPr>
       </p:pic>
+      <p:sp>
+        <p:nvSpPr>
+          <p:cNvPr id="2" name="Title 1"/>
+          <p:cNvSpPr>
+            <a:spLocks noGrp="1"/>
+          </p:cNvSpPr>
+          <p:nvPr>
+            <p:ph type="title"/>
+          </p:nvPr>
+        </p:nvSpPr>
+        <p:spPr/>
+        <p:txBody>
+          <a:bodyPr/>
+          <a:lstStyle/>
+          <a:p>
+            <a:r>
+              <a:rPr lang="en-US" dirty="0"/>
+              <a:t>Light Sensor</a:t>
+            </a:r>
+          </a:p>
+        </p:txBody>
+      </p:sp>
+      <p:sp>
+        <p:nvSpPr>
+          <p:cNvPr id="3" name="Content Placeholder 2"/>
+          <p:cNvSpPr>
+            <a:spLocks noGrp="1"/>
+          </p:cNvSpPr>
+          <p:nvPr>
+            <p:ph idx="1"/>
+          </p:nvPr>
+        </p:nvSpPr>
+        <p:spPr>
+          <a:xfrm>
+            <a:off x="490330" y="1765990"/>
+            <a:ext cx="10515600" cy="4351338"/>
+          </a:xfrm>
+        </p:spPr>
+        <p:txBody>
+          <a:bodyPr>
+            <a:normAutofit/>
+          </a:bodyPr>
+          <a:lstStyle/>
+          <a:p>
+            <a:r>
+              <a:rPr lang="en-US" sz="3500" dirty="0"/>
+              <a:t>More light = sends more voltage to the </a:t>
+            </a:r>
+          </a:p>
+          <a:p>
+            <a:pPr marL="0" indent="0">
+              <a:buNone/>
+            </a:pPr>
+            <a:r>
+              <a:rPr lang="en-US" sz="3500" dirty="0"/>
+              <a:t>analog pin</a:t>
+            </a:r>
+          </a:p>
+          <a:p>
+            <a:r>
+              <a:rPr lang="en-US" sz="3500" dirty="0"/>
+              <a:t>Note there are 3 contact points here, so the wiring will be a little different</a:t>
+            </a:r>
+          </a:p>
+          <a:p>
+            <a:r>
+              <a:rPr lang="en-US" sz="3500" dirty="0"/>
+              <a:t>The SIG point will output some voltage depending on how bright it is, which we can use to determine brightness</a:t>
+            </a:r>
+          </a:p>
+          <a:p>
+            <a:pPr marL="0" indent="0">
+              <a:buNone/>
+            </a:pPr>
+            <a:endParaRPr lang="en-US" sz="3500" dirty="0"/>
+          </a:p>
+          <a:p>
+            <a:pPr marL="0" indent="0">
+              <a:buNone/>
+            </a:pPr>
+            <a:endParaRPr lang="en-US" sz="3500" dirty="0"/>
+          </a:p>
+        </p:txBody>
+      </p:sp>
     </p:spTree>
     <p:extLst>
       <p:ext uri="{BB962C8B-B14F-4D97-AF65-F5344CB8AC3E}">
         <p14:creationId xmlns:p14="http://schemas.microsoft.com/office/powerpoint/2010/main" val="360273785"/>
-      </p:ext>
-    </p:extLst>
-  </p:cSld>
-  <p:clrMapOvr>
-    <a:masterClrMapping/>
-  </p:clrMapOvr>
-</p:sld>
-</file>
-
-<file path=ppt/slides/slide6.xml><?xml version="1.0" encoding="utf-8"?>
-<p:sld xmlns:a="http://schemas.openxmlformats.org/drawingml/2006/main" xmlns:r="http://schemas.openxmlformats.org/officeDocument/2006/relationships" xmlns:p="http://schemas.openxmlformats.org/presentationml/2006/main">
-  <p:cSld>
-    <p:spTree>
-      <p:nvGrpSpPr>
-        <p:cNvPr id="1" name=""/>
-        <p:cNvGrpSpPr/>
-        <p:nvPr/>
-      </p:nvGrpSpPr>
-      <p:grpSpPr>
-        <a:xfrm>
-          <a:off x="0" y="0"/>
-          <a:ext cx="0" cy="0"/>
-          <a:chOff x="0" y="0"/>
-          <a:chExt cx="0" cy="0"/>
-        </a:xfrm>
-      </p:grpSpPr>
-      <p:sp>
-        <p:nvSpPr>
-          <p:cNvPr id="2" name="Title 1"/>
-          <p:cNvSpPr>
-            <a:spLocks noGrp="1"/>
-          </p:cNvSpPr>
-          <p:nvPr>
-            <p:ph type="title"/>
-          </p:nvPr>
-        </p:nvSpPr>
-        <p:spPr/>
-        <p:txBody>
-          <a:bodyPr/>
-          <a:lstStyle/>
-          <a:p>
-            <a:r>
-              <a:rPr lang="en-US" dirty="0"/>
-              <a:t>Photoresistor and Light Sensor</a:t>
-            </a:r>
-          </a:p>
-        </p:txBody>
-      </p:sp>
-      <p:sp>
-        <p:nvSpPr>
-          <p:cNvPr id="3" name="Content Placeholder 2"/>
-          <p:cNvSpPr>
-            <a:spLocks noGrp="1"/>
-          </p:cNvSpPr>
-          <p:nvPr>
-            <p:ph idx="1"/>
-          </p:nvPr>
-        </p:nvSpPr>
-        <p:spPr/>
-        <p:txBody>
-          <a:bodyPr>
-            <a:normAutofit/>
-          </a:bodyPr>
-          <a:lstStyle/>
-          <a:p>
-            <a:r>
-              <a:rPr lang="en-US" sz="3500" dirty="0"/>
-              <a:t>Both serve the same purpose: determine surrounding light levels</a:t>
-            </a:r>
-          </a:p>
-          <a:p>
-            <a:r>
-              <a:rPr lang="en-US" sz="3500" dirty="0"/>
-              <a:t>Different implementations but in both cases the voltage on the analog pin is higher in lighted scenarios</a:t>
-            </a:r>
-          </a:p>
-          <a:p>
-            <a:r>
-              <a:rPr lang="en-US" sz="3500" dirty="0"/>
-              <a:t>Different Photoresistors and light sensors act differently so it is important to look at the specification sheet of the particular device you are using!</a:t>
-            </a:r>
-          </a:p>
-        </p:txBody>
-      </p:sp>
-    </p:spTree>
-    <p:extLst>
-      <p:ext uri="{BB962C8B-B14F-4D97-AF65-F5344CB8AC3E}">
-        <p14:creationId xmlns:p14="http://schemas.microsoft.com/office/powerpoint/2010/main" val="1331218805"/>
-      </p:ext>
-    </p:extLst>
-  </p:cSld>
-  <p:clrMapOvr>
-    <a:masterClrMapping/>
-  </p:clrMapOvr>
-</p:sld>
-</file>
-
-<file path=ppt/slides/slide7.xml><?xml version="1.0" encoding="utf-8"?>
-<p:sld xmlns:a="http://schemas.openxmlformats.org/drawingml/2006/main" xmlns:r="http://schemas.openxmlformats.org/officeDocument/2006/relationships" xmlns:p="http://schemas.openxmlformats.org/presentationml/2006/main">
-  <p:cSld>
-    <p:spTree>
-      <p:nvGrpSpPr>
-        <p:cNvPr id="1" name=""/>
-        <p:cNvGrpSpPr/>
-        <p:nvPr/>
-      </p:nvGrpSpPr>
-      <p:grpSpPr>
-        <a:xfrm>
-          <a:off x="0" y="0"/>
-          <a:ext cx="0" cy="0"/>
-          <a:chOff x="0" y="0"/>
-          <a:chExt cx="0" cy="0"/>
-        </a:xfrm>
-      </p:grpSpPr>
-      <p:sp>
-        <p:nvSpPr>
-          <p:cNvPr id="2" name="Title 1"/>
-          <p:cNvSpPr>
-            <a:spLocks noGrp="1"/>
-          </p:cNvSpPr>
-          <p:nvPr>
-            <p:ph type="title"/>
-          </p:nvPr>
-        </p:nvSpPr>
-        <p:spPr/>
-        <p:txBody>
-          <a:bodyPr/>
-          <a:lstStyle/>
-          <a:p>
-            <a:r>
-              <a:rPr lang="en-US" dirty="0"/>
-              <a:t>Mic and Speaker</a:t>
-            </a:r>
-          </a:p>
-        </p:txBody>
-      </p:sp>
-      <p:pic>
-        <p:nvPicPr>
-          <p:cNvPr id="4098" name="Picture 2" descr="http://img.dxcdn.com/productimages/sku_138322_2.jpg"/>
-          <p:cNvPicPr>
-            <a:picLocks noGrp="1" noChangeAspect="1" noChangeArrowheads="1"/>
-          </p:cNvPicPr>
-          <p:nvPr>
-            <p:ph idx="1"/>
-          </p:nvPr>
-        </p:nvPicPr>
-        <p:blipFill>
-          <a:blip r:embed="rId2">
-            <a:extLst>
-              <a:ext uri="{28A0092B-C50C-407E-A947-70E740481C1C}">
-                <a14:useLocalDpi xmlns:a14="http://schemas.microsoft.com/office/drawing/2010/main" val="0"/>
-              </a:ext>
-            </a:extLst>
-          </a:blip>
-          <a:srcRect/>
-          <a:stretch>
-            <a:fillRect/>
-          </a:stretch>
-        </p:blipFill>
-        <p:spPr bwMode="auto">
-          <a:xfrm>
-            <a:off x="7144298" y="1690688"/>
-            <a:ext cx="4351338" cy="4351338"/>
-          </a:xfrm>
-          <a:prstGeom prst="rect">
-            <a:avLst/>
-          </a:prstGeom>
-          <a:noFill/>
-          <a:extLst>
-            <a:ext uri="{909E8E84-426E-40DD-AFC4-6F175D3DCCD1}">
-              <a14:hiddenFill xmlns:a14="http://schemas.microsoft.com/office/drawing/2010/main">
-                <a:solidFill>
-                  <a:srgbClr val="FFFFFF"/>
-                </a:solidFill>
-              </a14:hiddenFill>
-            </a:ext>
-          </a:extLst>
-        </p:spPr>
-      </p:pic>
-      <p:sp>
-        <p:nvSpPr>
-          <p:cNvPr id="4" name="TextBox 3"/>
-          <p:cNvSpPr txBox="1"/>
-          <p:nvPr/>
-        </p:nvSpPr>
-        <p:spPr>
-          <a:xfrm>
-            <a:off x="7220932" y="6249971"/>
-            <a:ext cx="4132868" cy="369332"/>
-          </a:xfrm>
-          <a:prstGeom prst="rect">
-            <a:avLst/>
-          </a:prstGeom>
-          <a:noFill/>
-        </p:spPr>
-        <p:txBody>
-          <a:bodyPr wrap="square" rtlCol="0">
-            <a:spAutoFit/>
-          </a:bodyPr>
-          <a:lstStyle/>
-          <a:p>
-            <a:r>
-              <a:rPr lang="en-US" dirty="0"/>
-              <a:t>Technically a speaker/buzzer module</a:t>
-            </a:r>
-          </a:p>
-        </p:txBody>
-      </p:sp>
-      <p:pic>
-        <p:nvPicPr>
-          <p:cNvPr id="4100" name="Picture 4" descr="https://cdn.instructables.com/FK3/AF92/I10JDZZC/FK3AF92I10JDZZC.MEDIUM.jpg"/>
-          <p:cNvPicPr>
-            <a:picLocks noChangeAspect="1" noChangeArrowheads="1"/>
-          </p:cNvPicPr>
-          <p:nvPr/>
-        </p:nvPicPr>
-        <p:blipFill>
-          <a:blip r:embed="rId3">
-            <a:extLst>
-              <a:ext uri="{28A0092B-C50C-407E-A947-70E740481C1C}">
-                <a14:useLocalDpi xmlns:a14="http://schemas.microsoft.com/office/drawing/2010/main" val="0"/>
-              </a:ext>
-            </a:extLst>
-          </a:blip>
-          <a:srcRect/>
-          <a:stretch>
-            <a:fillRect/>
-          </a:stretch>
-        </p:blipFill>
-        <p:spPr bwMode="auto">
-          <a:xfrm>
-            <a:off x="1272618" y="2221976"/>
-            <a:ext cx="4636023" cy="4636023"/>
-          </a:xfrm>
-          <a:prstGeom prst="rect">
-            <a:avLst/>
-          </a:prstGeom>
-          <a:noFill/>
-          <a:extLst>
-            <a:ext uri="{909E8E84-426E-40DD-AFC4-6F175D3DCCD1}">
-              <a14:hiddenFill xmlns:a14="http://schemas.microsoft.com/office/drawing/2010/main">
-                <a:solidFill>
-                  <a:srgbClr val="FFFFFF"/>
-                </a:solidFill>
-              </a14:hiddenFill>
-            </a:ext>
-          </a:extLst>
-        </p:spPr>
-      </p:pic>
-    </p:spTree>
-    <p:extLst>
-      <p:ext uri="{BB962C8B-B14F-4D97-AF65-F5344CB8AC3E}">
-        <p14:creationId xmlns:p14="http://schemas.microsoft.com/office/powerpoint/2010/main" val="3351638273"/>
-      </p:ext>
-    </p:extLst>
-  </p:cSld>
-  <p:clrMapOvr>
-    <a:masterClrMapping/>
-  </p:clrMapOvr>
-</p:sld>
-</file>
-
-<file path=ppt/slides/slide8.xml><?xml version="1.0" encoding="utf-8"?>
-<p:sld xmlns:a="http://schemas.openxmlformats.org/drawingml/2006/main" xmlns:r="http://schemas.openxmlformats.org/officeDocument/2006/relationships" xmlns:p="http://schemas.openxmlformats.org/presentationml/2006/main">
-  <p:cSld>
-    <p:spTree>
-      <p:nvGrpSpPr>
-        <p:cNvPr id="1" name=""/>
-        <p:cNvGrpSpPr/>
-        <p:nvPr/>
-      </p:nvGrpSpPr>
-      <p:grpSpPr>
-        <a:xfrm>
-          <a:off x="0" y="0"/>
-          <a:ext cx="0" cy="0"/>
-          <a:chOff x="0" y="0"/>
-          <a:chExt cx="0" cy="0"/>
-        </a:xfrm>
-      </p:grpSpPr>
-      <p:sp>
-        <p:nvSpPr>
-          <p:cNvPr id="2" name="Title 1"/>
-          <p:cNvSpPr>
-            <a:spLocks noGrp="1"/>
-          </p:cNvSpPr>
-          <p:nvPr>
-            <p:ph type="title"/>
-          </p:nvPr>
-        </p:nvSpPr>
-        <p:spPr/>
-        <p:txBody>
-          <a:bodyPr/>
-          <a:lstStyle/>
-          <a:p>
-            <a:r>
-              <a:rPr lang="en-US" dirty="0"/>
-              <a:t>Mic</a:t>
-            </a:r>
-          </a:p>
-        </p:txBody>
-      </p:sp>
-      <p:sp>
-        <p:nvSpPr>
-          <p:cNvPr id="3" name="Content Placeholder 2"/>
-          <p:cNvSpPr>
-            <a:spLocks noGrp="1"/>
-          </p:cNvSpPr>
-          <p:nvPr>
-            <p:ph idx="1"/>
-          </p:nvPr>
-        </p:nvSpPr>
-        <p:spPr/>
-        <p:txBody>
-          <a:bodyPr>
-            <a:normAutofit/>
-          </a:bodyPr>
-          <a:lstStyle/>
-          <a:p>
-            <a:r>
-              <a:rPr lang="en-US" sz="3500" dirty="0"/>
-              <a:t>When sound waves hit the mic, it is </a:t>
-            </a:r>
-          </a:p>
-          <a:p>
-            <a:pPr marL="0" indent="0">
-              <a:buNone/>
-            </a:pPr>
-            <a:r>
-              <a:rPr lang="en-US" sz="3500" dirty="0"/>
-              <a:t>converted into an electrical signal</a:t>
-            </a:r>
-          </a:p>
-          <a:p>
-            <a:r>
-              <a:rPr lang="en-US" sz="3500" dirty="0"/>
-              <a:t>Read here by the analog input A0.</a:t>
-            </a:r>
-          </a:p>
-          <a:p>
-            <a:r>
-              <a:rPr lang="en-US" sz="3500" dirty="0"/>
-              <a:t>The Arduino can then interpret this </a:t>
-            </a:r>
-          </a:p>
-          <a:p>
-            <a:pPr marL="0" indent="0">
-              <a:buNone/>
-            </a:pPr>
-            <a:r>
-              <a:rPr lang="en-US" sz="3500" dirty="0"/>
-              <a:t>Information and act on it</a:t>
-            </a:r>
-          </a:p>
-          <a:p>
-            <a:pPr marL="0" indent="0">
-              <a:buNone/>
-            </a:pPr>
-            <a:endParaRPr lang="en-US" sz="3500" dirty="0"/>
-          </a:p>
-          <a:p>
-            <a:pPr marL="0" indent="0">
-              <a:buNone/>
-            </a:pPr>
-            <a:r>
-              <a:rPr lang="en-US" sz="3500" dirty="0"/>
-              <a:t>For example….</a:t>
-            </a:r>
-          </a:p>
-        </p:txBody>
-      </p:sp>
-      <p:pic>
-        <p:nvPicPr>
-          <p:cNvPr id="7170" name="Picture 2" descr="Image result for arduino mic"/>
-          <p:cNvPicPr>
-            <a:picLocks noChangeAspect="1" noChangeArrowheads="1"/>
-          </p:cNvPicPr>
-          <p:nvPr/>
-        </p:nvPicPr>
-        <p:blipFill>
-          <a:blip r:embed="rId2">
-            <a:extLst>
-              <a:ext uri="{28A0092B-C50C-407E-A947-70E740481C1C}">
-                <a14:useLocalDpi xmlns:a14="http://schemas.microsoft.com/office/drawing/2010/main" val="0"/>
-              </a:ext>
-            </a:extLst>
-          </a:blip>
-          <a:srcRect/>
-          <a:stretch>
-            <a:fillRect/>
-          </a:stretch>
-        </p:blipFill>
-        <p:spPr bwMode="auto">
-          <a:xfrm>
-            <a:off x="7847519" y="254523"/>
-            <a:ext cx="4204551" cy="5585381"/>
-          </a:xfrm>
-          <a:prstGeom prst="rect">
-            <a:avLst/>
-          </a:prstGeom>
-          <a:noFill/>
-          <a:extLst>
-            <a:ext uri="{909E8E84-426E-40DD-AFC4-6F175D3DCCD1}">
-              <a14:hiddenFill xmlns:a14="http://schemas.microsoft.com/office/drawing/2010/main">
-                <a:solidFill>
-                  <a:srgbClr val="FFFFFF"/>
-                </a:solidFill>
-              </a14:hiddenFill>
-            </a:ext>
-          </a:extLst>
-        </p:spPr>
-      </p:pic>
-    </p:spTree>
-    <p:extLst>
-      <p:ext uri="{BB962C8B-B14F-4D97-AF65-F5344CB8AC3E}">
-        <p14:creationId xmlns:p14="http://schemas.microsoft.com/office/powerpoint/2010/main" val="3479329345"/>
-      </p:ext>
-    </p:extLst>
-  </p:cSld>
-  <p:clrMapOvr>
-    <a:masterClrMapping/>
-  </p:clrMapOvr>
-</p:sld>
-</file>
-
-<file path=ppt/slides/slide9.xml><?xml version="1.0" encoding="utf-8"?>
-<p:sld xmlns:a="http://schemas.openxmlformats.org/drawingml/2006/main" xmlns:r="http://schemas.openxmlformats.org/officeDocument/2006/relationships" xmlns:p="http://schemas.openxmlformats.org/presentationml/2006/main">
-  <p:cSld>
-    <p:spTree>
-      <p:nvGrpSpPr>
-        <p:cNvPr id="1" name=""/>
-        <p:cNvGrpSpPr/>
-        <p:nvPr/>
-      </p:nvGrpSpPr>
-      <p:grpSpPr>
-        <a:xfrm>
-          <a:off x="0" y="0"/>
-          <a:ext cx="0" cy="0"/>
-          <a:chOff x="0" y="0"/>
-          <a:chExt cx="0" cy="0"/>
-        </a:xfrm>
-      </p:grpSpPr>
-      <p:sp>
-        <p:nvSpPr>
-          <p:cNvPr id="2" name="Title 1"/>
-          <p:cNvSpPr>
-            <a:spLocks noGrp="1"/>
-          </p:cNvSpPr>
-          <p:nvPr>
-            <p:ph type="title"/>
-          </p:nvPr>
-        </p:nvSpPr>
-        <p:spPr/>
-        <p:txBody>
-          <a:bodyPr/>
-          <a:lstStyle/>
-          <a:p>
-            <a:r>
-              <a:rPr lang="en-US" dirty="0"/>
-              <a:t>Cool thing that looks like an equalizer</a:t>
-            </a:r>
-          </a:p>
-        </p:txBody>
-      </p:sp>
-      <p:sp>
-        <p:nvSpPr>
-          <p:cNvPr id="3" name="Content Placeholder 2"/>
-          <p:cNvSpPr>
-            <a:spLocks noGrp="1"/>
-          </p:cNvSpPr>
-          <p:nvPr>
-            <p:ph idx="1"/>
-          </p:nvPr>
-        </p:nvSpPr>
-        <p:spPr/>
-        <p:txBody>
-          <a:bodyPr/>
-          <a:lstStyle/>
-          <a:p>
-            <a:endParaRPr lang="en-US"/>
-          </a:p>
-        </p:txBody>
-      </p:sp>
-      <p:pic>
-        <p:nvPicPr>
-          <p:cNvPr id="8194" name="Picture 2" descr="https://cdn-learn.adafruit.com/guides/images/000/000/179/medium800/2013_01_12_IMG_1168-1024.jpg?1448301118"/>
-          <p:cNvPicPr>
-            <a:picLocks noChangeAspect="1" noChangeArrowheads="1"/>
-          </p:cNvPicPr>
-          <p:nvPr/>
-        </p:nvPicPr>
-        <p:blipFill>
-          <a:blip r:embed="rId2">
-            <a:extLst>
-              <a:ext uri="{28A0092B-C50C-407E-A947-70E740481C1C}">
-                <a14:useLocalDpi xmlns:a14="http://schemas.microsoft.com/office/drawing/2010/main" val="0"/>
-              </a:ext>
-            </a:extLst>
-          </a:blip>
-          <a:srcRect/>
-          <a:stretch>
-            <a:fillRect/>
-          </a:stretch>
-        </p:blipFill>
-        <p:spPr bwMode="auto">
-          <a:xfrm>
-            <a:off x="2738486" y="1550465"/>
-            <a:ext cx="7620000" cy="5076825"/>
-          </a:xfrm>
-          <a:prstGeom prst="rect">
-            <a:avLst/>
-          </a:prstGeom>
-          <a:noFill/>
-          <a:extLst>
-            <a:ext uri="{909E8E84-426E-40DD-AFC4-6F175D3DCCD1}">
-              <a14:hiddenFill xmlns:a14="http://schemas.microsoft.com/office/drawing/2010/main">
-                <a:solidFill>
-                  <a:srgbClr val="FFFFFF"/>
-                </a:solidFill>
-              </a14:hiddenFill>
-            </a:ext>
-          </a:extLst>
-        </p:spPr>
-      </p:pic>
-    </p:spTree>
-    <p:extLst>
-      <p:ext uri="{BB962C8B-B14F-4D97-AF65-F5344CB8AC3E}">
-        <p14:creationId xmlns:p14="http://schemas.microsoft.com/office/powerpoint/2010/main" val="2204098774"/>
       </p:ext>
     </p:extLst>
   </p:cSld>

</xml_diff>